<commit_message>
Added scaling + MapReduce slides.
</commit_message>
<xml_diff>
--- a/Presentation/FHJ_guest_lecture_nosql.pptx
+++ b/Presentation/FHJ_guest_lecture_nosql.pptx
@@ -5,7 +5,7 @@
     <p:sldMasterId id="2147483648" r:id="rId1"/>
   </p:sldMasterIdLst>
   <p:notesMasterIdLst>
-    <p:notesMasterId r:id="rId13"/>
+    <p:notesMasterId r:id="rId24"/>
   </p:notesMasterIdLst>
   <p:sldIdLst>
     <p:sldId id="256" r:id="rId2"/>
@@ -18,7 +18,18 @@
     <p:sldId id="267" r:id="rId9"/>
     <p:sldId id="268" r:id="rId10"/>
     <p:sldId id="269" r:id="rId11"/>
-    <p:sldId id="260" r:id="rId12"/>
+    <p:sldId id="270" r:id="rId12"/>
+    <p:sldId id="271" r:id="rId13"/>
+    <p:sldId id="272" r:id="rId14"/>
+    <p:sldId id="273" r:id="rId15"/>
+    <p:sldId id="274" r:id="rId16"/>
+    <p:sldId id="278" r:id="rId17"/>
+    <p:sldId id="275" r:id="rId18"/>
+    <p:sldId id="276" r:id="rId19"/>
+    <p:sldId id="277" r:id="rId20"/>
+    <p:sldId id="280" r:id="rId21"/>
+    <p:sldId id="279" r:id="rId22"/>
+    <p:sldId id="260" r:id="rId23"/>
   </p:sldIdLst>
   <p:sldSz cx="9144000" cy="6858000" type="screen4x3"/>
   <p:notesSz cx="6858000" cy="9144000"/>
@@ -202,7 +213,7 @@
           <a:p>
             <a:fld id="{7A19BEE0-598C-4858-A439-753E34679212}" type="datetimeFigureOut">
               <a:rPr lang="de-AT" smtClean="0"/>
-              <a:t>28.05.2013</a:t>
+              <a:t>01.06.2013</a:t>
             </a:fld>
             <a:endParaRPr lang="de-AT"/>
           </a:p>
@@ -1208,6 +1219,321 @@
 </p:notes>
 </file>
 
+<file path=ppt/notesSlides/notesSlide6.xml><?xml version="1.0" encoding="utf-8"?>
+<p:notes xmlns:a="http://schemas.openxmlformats.org/drawingml/2006/main" xmlns:r="http://schemas.openxmlformats.org/officeDocument/2006/relationships" xmlns:p="http://schemas.openxmlformats.org/presentationml/2006/main">
+  <p:cSld>
+    <p:spTree>
+      <p:nvGrpSpPr>
+        <p:cNvPr id="1" name=""/>
+        <p:cNvGrpSpPr/>
+        <p:nvPr/>
+      </p:nvGrpSpPr>
+      <p:grpSpPr>
+        <a:xfrm>
+          <a:off x="0" y="0"/>
+          <a:ext cx="0" cy="0"/>
+          <a:chOff x="0" y="0"/>
+          <a:chExt cx="0" cy="0"/>
+        </a:xfrm>
+      </p:grpSpPr>
+      <p:sp>
+        <p:nvSpPr>
+          <p:cNvPr id="2" name="Folienbildplatzhalter 1"/>
+          <p:cNvSpPr>
+            <a:spLocks noGrp="1" noRot="1" noChangeAspect="1"/>
+          </p:cNvSpPr>
+          <p:nvPr>
+            <p:ph type="sldImg"/>
+          </p:nvPr>
+        </p:nvSpPr>
+        <p:spPr/>
+      </p:sp>
+      <p:sp>
+        <p:nvSpPr>
+          <p:cNvPr id="3" name="Notizenplatzhalter 2"/>
+          <p:cNvSpPr>
+            <a:spLocks noGrp="1"/>
+          </p:cNvSpPr>
+          <p:nvPr>
+            <p:ph type="body" idx="1"/>
+          </p:nvPr>
+        </p:nvSpPr>
+        <p:spPr/>
+        <p:txBody>
+          <a:bodyPr/>
+          <a:lstStyle/>
+          <a:p>
+            <a:pPr marL="171450" indent="-171450">
+              <a:buFont typeface="Arial" pitchFamily="34" charset="0"/>
+              <a:buChar char="•"/>
+            </a:pPr>
+            <a:r>
+              <a:rPr lang="en-US" dirty="0" smtClean="0"/>
+              <a:t>Vertical</a:t>
+            </a:r>
+            <a:r>
+              <a:rPr lang="en-US" baseline="0" dirty="0" smtClean="0"/>
+              <a:t> scaling (scale-up): add more resources – more power</a:t>
+            </a:r>
+          </a:p>
+          <a:p>
+            <a:pPr marL="171450" indent="-171450">
+              <a:buFont typeface="Arial" pitchFamily="34" charset="0"/>
+              <a:buChar char="•"/>
+            </a:pPr>
+            <a:r>
+              <a:rPr lang="en-US" baseline="0" dirty="0" smtClean="0"/>
+              <a:t>Horizontal scaling (scale-out): add more nodes – commodity hardware, distributed computing</a:t>
+            </a:r>
+          </a:p>
+          <a:p>
+            <a:pPr marL="171450" indent="-171450">
+              <a:buFont typeface="Arial" pitchFamily="34" charset="0"/>
+              <a:buChar char="•"/>
+            </a:pPr>
+            <a:r>
+              <a:rPr lang="en-US" baseline="0" dirty="0" err="1" smtClean="0"/>
+              <a:t>Sharding</a:t>
+            </a:r>
+            <a:r>
+              <a:rPr lang="en-US" baseline="0" dirty="0" smtClean="0"/>
+              <a:t>: Data splitting – key ranges, hashes</a:t>
+            </a:r>
+            <a:endParaRPr lang="de-AT" dirty="0"/>
+          </a:p>
+        </p:txBody>
+      </p:sp>
+      <p:sp>
+        <p:nvSpPr>
+          <p:cNvPr id="4" name="Foliennummernplatzhalter 3"/>
+          <p:cNvSpPr>
+            <a:spLocks noGrp="1"/>
+          </p:cNvSpPr>
+          <p:nvPr>
+            <p:ph type="sldNum" sz="quarter" idx="10"/>
+          </p:nvPr>
+        </p:nvSpPr>
+        <p:spPr/>
+        <p:txBody>
+          <a:bodyPr/>
+          <a:lstStyle/>
+          <a:p>
+            <a:fld id="{2AFEA223-4F50-4DD6-9CC4-15E4F51256E0}" type="slidenum">
+              <a:rPr lang="de-AT" smtClean="0"/>
+              <a:t>12</a:t>
+            </a:fld>
+            <a:endParaRPr lang="de-AT"/>
+          </a:p>
+        </p:txBody>
+      </p:sp>
+    </p:spTree>
+    <p:extLst>
+      <p:ext uri="{BB962C8B-B14F-4D97-AF65-F5344CB8AC3E}">
+        <p14:creationId xmlns:p14="http://schemas.microsoft.com/office/powerpoint/2010/main" val="110870209"/>
+      </p:ext>
+    </p:extLst>
+  </p:cSld>
+  <p:clrMapOvr>
+    <a:masterClrMapping/>
+  </p:clrMapOvr>
+</p:notes>
+</file>
+
+<file path=ppt/notesSlides/notesSlide7.xml><?xml version="1.0" encoding="utf-8"?>
+<p:notes xmlns:a="http://schemas.openxmlformats.org/drawingml/2006/main" xmlns:r="http://schemas.openxmlformats.org/officeDocument/2006/relationships" xmlns:p="http://schemas.openxmlformats.org/presentationml/2006/main">
+  <p:cSld>
+    <p:spTree>
+      <p:nvGrpSpPr>
+        <p:cNvPr id="1" name=""/>
+        <p:cNvGrpSpPr/>
+        <p:nvPr/>
+      </p:nvGrpSpPr>
+      <p:grpSpPr>
+        <a:xfrm>
+          <a:off x="0" y="0"/>
+          <a:ext cx="0" cy="0"/>
+          <a:chOff x="0" y="0"/>
+          <a:chExt cx="0" cy="0"/>
+        </a:xfrm>
+      </p:grpSpPr>
+      <p:sp>
+        <p:nvSpPr>
+          <p:cNvPr id="2" name="Folienbildplatzhalter 1"/>
+          <p:cNvSpPr>
+            <a:spLocks noGrp="1" noRot="1" noChangeAspect="1"/>
+          </p:cNvSpPr>
+          <p:nvPr>
+            <p:ph type="sldImg"/>
+          </p:nvPr>
+        </p:nvSpPr>
+        <p:spPr/>
+      </p:sp>
+      <p:sp>
+        <p:nvSpPr>
+          <p:cNvPr id="3" name="Notizenplatzhalter 2"/>
+          <p:cNvSpPr>
+            <a:spLocks noGrp="1"/>
+          </p:cNvSpPr>
+          <p:nvPr>
+            <p:ph type="body" idx="1"/>
+          </p:nvPr>
+        </p:nvSpPr>
+        <p:spPr/>
+        <p:txBody>
+          <a:bodyPr/>
+          <a:lstStyle/>
+          <a:p>
+            <a:pPr marL="171450" indent="-171450">
+              <a:buFont typeface="Arial" pitchFamily="34" charset="0"/>
+              <a:buChar char="•"/>
+            </a:pPr>
+            <a:r>
+              <a:rPr lang="en-US" dirty="0" smtClean="0"/>
+              <a:t>Developed by Google for </a:t>
+            </a:r>
+            <a:r>
+              <a:rPr lang="en-US" dirty="0" err="1" smtClean="0"/>
+              <a:t>BigTable</a:t>
+            </a:r>
+            <a:endParaRPr lang="en-US" dirty="0" smtClean="0"/>
+          </a:p>
+          <a:p>
+            <a:pPr marL="171450" indent="-171450">
+              <a:buFont typeface="Arial" pitchFamily="34" charset="0"/>
+              <a:buChar char="•"/>
+            </a:pPr>
+            <a:endParaRPr lang="de-AT" dirty="0"/>
+          </a:p>
+        </p:txBody>
+      </p:sp>
+      <p:sp>
+        <p:nvSpPr>
+          <p:cNvPr id="4" name="Foliennummernplatzhalter 3"/>
+          <p:cNvSpPr>
+            <a:spLocks noGrp="1"/>
+          </p:cNvSpPr>
+          <p:nvPr>
+            <p:ph type="sldNum" sz="quarter" idx="10"/>
+          </p:nvPr>
+        </p:nvSpPr>
+        <p:spPr/>
+        <p:txBody>
+          <a:bodyPr/>
+          <a:lstStyle/>
+          <a:p>
+            <a:fld id="{2AFEA223-4F50-4DD6-9CC4-15E4F51256E0}" type="slidenum">
+              <a:rPr lang="de-AT" smtClean="0"/>
+              <a:t>13</a:t>
+            </a:fld>
+            <a:endParaRPr lang="de-AT"/>
+          </a:p>
+        </p:txBody>
+      </p:sp>
+    </p:spTree>
+    <p:extLst>
+      <p:ext uri="{BB962C8B-B14F-4D97-AF65-F5344CB8AC3E}">
+        <p14:creationId xmlns:p14="http://schemas.microsoft.com/office/powerpoint/2010/main" val="239857995"/>
+      </p:ext>
+    </p:extLst>
+  </p:cSld>
+  <p:clrMapOvr>
+    <a:masterClrMapping/>
+  </p:clrMapOvr>
+</p:notes>
+</file>
+
+<file path=ppt/notesSlides/notesSlide8.xml><?xml version="1.0" encoding="utf-8"?>
+<p:notes xmlns:a="http://schemas.openxmlformats.org/drawingml/2006/main" xmlns:r="http://schemas.openxmlformats.org/officeDocument/2006/relationships" xmlns:p="http://schemas.openxmlformats.org/presentationml/2006/main">
+  <p:cSld>
+    <p:spTree>
+      <p:nvGrpSpPr>
+        <p:cNvPr id="1" name=""/>
+        <p:cNvGrpSpPr/>
+        <p:nvPr/>
+      </p:nvGrpSpPr>
+      <p:grpSpPr>
+        <a:xfrm>
+          <a:off x="0" y="0"/>
+          <a:ext cx="0" cy="0"/>
+          <a:chOff x="0" y="0"/>
+          <a:chExt cx="0" cy="0"/>
+        </a:xfrm>
+      </p:grpSpPr>
+      <p:sp>
+        <p:nvSpPr>
+          <p:cNvPr id="2" name="Folienbildplatzhalter 1"/>
+          <p:cNvSpPr>
+            <a:spLocks noGrp="1" noRot="1" noChangeAspect="1"/>
+          </p:cNvSpPr>
+          <p:nvPr>
+            <p:ph type="sldImg"/>
+          </p:nvPr>
+        </p:nvSpPr>
+        <p:spPr/>
+      </p:sp>
+      <p:sp>
+        <p:nvSpPr>
+          <p:cNvPr id="3" name="Notizenplatzhalter 2"/>
+          <p:cNvSpPr>
+            <a:spLocks noGrp="1"/>
+          </p:cNvSpPr>
+          <p:nvPr>
+            <p:ph type="body" idx="1"/>
+          </p:nvPr>
+        </p:nvSpPr>
+        <p:spPr/>
+        <p:txBody>
+          <a:bodyPr/>
+          <a:lstStyle/>
+          <a:p>
+            <a:r>
+              <a:rPr lang="en-US" dirty="0" smtClean="0"/>
+              <a:t>Explain, maybe board</a:t>
+            </a:r>
+            <a:r>
+              <a:rPr lang="en-US" baseline="0" dirty="0" smtClean="0"/>
+              <a:t> drawing</a:t>
+            </a:r>
+            <a:endParaRPr lang="de-AT" dirty="0"/>
+          </a:p>
+        </p:txBody>
+      </p:sp>
+      <p:sp>
+        <p:nvSpPr>
+          <p:cNvPr id="4" name="Foliennummernplatzhalter 3"/>
+          <p:cNvSpPr>
+            <a:spLocks noGrp="1"/>
+          </p:cNvSpPr>
+          <p:nvPr>
+            <p:ph type="sldNum" sz="quarter" idx="10"/>
+          </p:nvPr>
+        </p:nvSpPr>
+        <p:spPr/>
+        <p:txBody>
+          <a:bodyPr/>
+          <a:lstStyle/>
+          <a:p>
+            <a:fld id="{2AFEA223-4F50-4DD6-9CC4-15E4F51256E0}" type="slidenum">
+              <a:rPr lang="de-AT" smtClean="0"/>
+              <a:t>14</a:t>
+            </a:fld>
+            <a:endParaRPr lang="de-AT"/>
+          </a:p>
+        </p:txBody>
+      </p:sp>
+    </p:spTree>
+    <p:extLst>
+      <p:ext uri="{BB962C8B-B14F-4D97-AF65-F5344CB8AC3E}">
+        <p14:creationId xmlns:p14="http://schemas.microsoft.com/office/powerpoint/2010/main" val="2320396553"/>
+      </p:ext>
+    </p:extLst>
+  </p:cSld>
+  <p:clrMapOvr>
+    <a:masterClrMapping/>
+  </p:clrMapOvr>
+</p:notes>
+</file>
+
 <file path=ppt/slideLayouts/slideLayout1.xml><?xml version="1.0" encoding="utf-8"?>
 <p:sldLayout xmlns:a="http://schemas.openxmlformats.org/drawingml/2006/main" xmlns:r="http://schemas.openxmlformats.org/officeDocument/2006/relationships" xmlns:p="http://schemas.openxmlformats.org/presentationml/2006/main" type="title" preserve="1">
   <p:cSld name="Titelfolie">
@@ -1540,7 +1866,7 @@
           <a:p>
             <a:fld id="{BD334F44-700B-E44C-96AB-E83A6820DFD3}" type="datetimeFigureOut">
               <a:rPr lang="de-DE" smtClean="0"/>
-              <a:t>28.05.2013</a:t>
+              <a:t>01.06.2013</a:t>
             </a:fld>
             <a:endParaRPr lang="de-DE"/>
           </a:p>
@@ -1720,7 +2046,7 @@
           <a:p>
             <a:fld id="{BD334F44-700B-E44C-96AB-E83A6820DFD3}" type="datetimeFigureOut">
               <a:rPr lang="de-DE" smtClean="0"/>
-              <a:t>28.05.2013</a:t>
+              <a:t>01.06.2013</a:t>
             </a:fld>
             <a:endParaRPr lang="de-DE"/>
           </a:p>
@@ -1900,7 +2226,7 @@
           <a:p>
             <a:fld id="{BD334F44-700B-E44C-96AB-E83A6820DFD3}" type="datetimeFigureOut">
               <a:rPr lang="de-DE" smtClean="0"/>
-              <a:t>28.05.2013</a:t>
+              <a:t>01.06.2013</a:t>
             </a:fld>
             <a:endParaRPr lang="de-DE"/>
           </a:p>
@@ -2153,7 +2479,7 @@
           <a:p>
             <a:fld id="{BD334F44-700B-E44C-96AB-E83A6820DFD3}" type="datetimeFigureOut">
               <a:rPr lang="de-DE" smtClean="0"/>
-              <a:t>28.05.2013</a:t>
+              <a:t>01.06.2013</a:t>
             </a:fld>
             <a:endParaRPr lang="de-DE"/>
           </a:p>
@@ -2441,7 +2767,7 @@
           <a:p>
             <a:fld id="{BD334F44-700B-E44C-96AB-E83A6820DFD3}" type="datetimeFigureOut">
               <a:rPr lang="de-DE" smtClean="0"/>
-              <a:t>28.05.2013</a:t>
+              <a:t>01.06.2013</a:t>
             </a:fld>
             <a:endParaRPr lang="de-DE"/>
           </a:p>
@@ -2863,7 +3189,7 @@
           <a:p>
             <a:fld id="{BD334F44-700B-E44C-96AB-E83A6820DFD3}" type="datetimeFigureOut">
               <a:rPr lang="de-DE" smtClean="0"/>
-              <a:t>28.05.2013</a:t>
+              <a:t>01.06.2013</a:t>
             </a:fld>
             <a:endParaRPr lang="de-DE"/>
           </a:p>
@@ -2981,7 +3307,7 @@
           <a:p>
             <a:fld id="{BD334F44-700B-E44C-96AB-E83A6820DFD3}" type="datetimeFigureOut">
               <a:rPr lang="de-DE" smtClean="0"/>
-              <a:t>28.05.2013</a:t>
+              <a:t>01.06.2013</a:t>
             </a:fld>
             <a:endParaRPr lang="de-DE"/>
           </a:p>
@@ -3076,7 +3402,7 @@
           <a:p>
             <a:fld id="{BD334F44-700B-E44C-96AB-E83A6820DFD3}" type="datetimeFigureOut">
               <a:rPr lang="de-DE" smtClean="0"/>
-              <a:t>28.05.2013</a:t>
+              <a:t>01.06.2013</a:t>
             </a:fld>
             <a:endParaRPr lang="de-DE"/>
           </a:p>
@@ -3399,7 +3725,7 @@
           <a:p>
             <a:fld id="{BD334F44-700B-E44C-96AB-E83A6820DFD3}" type="datetimeFigureOut">
               <a:rPr lang="de-DE" smtClean="0"/>
-              <a:t>28.05.2013</a:t>
+              <a:t>01.06.2013</a:t>
             </a:fld>
             <a:endParaRPr lang="de-DE"/>
           </a:p>
@@ -3652,7 +3978,7 @@
           <a:p>
             <a:fld id="{BD334F44-700B-E44C-96AB-E83A6820DFD3}" type="datetimeFigureOut">
               <a:rPr lang="de-DE" smtClean="0"/>
-              <a:t>28.05.2013</a:t>
+              <a:t>01.06.2013</a:t>
             </a:fld>
             <a:endParaRPr lang="de-DE"/>
           </a:p>
@@ -3865,7 +4191,7 @@
           <a:p>
             <a:fld id="{BD334F44-700B-E44C-96AB-E83A6820DFD3}" type="datetimeFigureOut">
               <a:rPr lang="de-DE" smtClean="0"/>
-              <a:t>28.05.2013</a:t>
+              <a:t>01.06.2013</a:t>
             </a:fld>
             <a:endParaRPr lang="de-DE"/>
           </a:p>
@@ -4103,13 +4429,20 @@
           <a:spcPct val="0"/>
         </a:spcBef>
         <a:buNone/>
-        <a:defRPr sz="4400" kern="1200">
+        <a:defRPr sz="4400" b="0" kern="1200">
           <a:solidFill>
             <a:schemeClr val="tx1"/>
           </a:solidFill>
-          <a:latin typeface="+mj-lt"/>
+          <a:effectLst>
+            <a:outerShdw blurRad="38100" dist="38100" dir="2700000" algn="tl">
+              <a:srgbClr val="000000">
+                <a:alpha val="43137"/>
+              </a:srgbClr>
+            </a:outerShdw>
+          </a:effectLst>
+          <a:latin typeface="Segoe UI" pitchFamily="34" charset="0"/>
           <a:ea typeface="+mj-ea"/>
-          <a:cs typeface="+mj-cs"/>
+          <a:cs typeface="Segoe UI" pitchFamily="34" charset="0"/>
         </a:defRPr>
       </a:lvl1pPr>
     </p:titleStyle>
@@ -4124,7 +4457,7 @@
           <a:solidFill>
             <a:schemeClr val="tx1"/>
           </a:solidFill>
-          <a:latin typeface="+mn-lt"/>
+          <a:latin typeface="Ubuntu Light" pitchFamily="34" charset="0"/>
           <a:ea typeface="+mn-ea"/>
           <a:cs typeface="+mn-cs"/>
         </a:defRPr>
@@ -4139,7 +4472,7 @@
           <a:solidFill>
             <a:schemeClr val="tx1"/>
           </a:solidFill>
-          <a:latin typeface="+mn-lt"/>
+          <a:latin typeface="Ubuntu Light" pitchFamily="34" charset="0"/>
           <a:ea typeface="+mn-ea"/>
           <a:cs typeface="+mn-cs"/>
         </a:defRPr>
@@ -4154,7 +4487,7 @@
           <a:solidFill>
             <a:schemeClr val="tx1"/>
           </a:solidFill>
-          <a:latin typeface="+mn-lt"/>
+          <a:latin typeface="Ubuntu Light" pitchFamily="34" charset="0"/>
           <a:ea typeface="+mn-ea"/>
           <a:cs typeface="+mn-cs"/>
         </a:defRPr>
@@ -4169,7 +4502,7 @@
           <a:solidFill>
             <a:schemeClr val="tx1"/>
           </a:solidFill>
-          <a:latin typeface="+mn-lt"/>
+          <a:latin typeface="Ubuntu Light" pitchFamily="34" charset="0"/>
           <a:ea typeface="+mn-ea"/>
           <a:cs typeface="+mn-cs"/>
         </a:defRPr>
@@ -4184,7 +4517,7 @@
           <a:solidFill>
             <a:schemeClr val="tx1"/>
           </a:solidFill>
-          <a:latin typeface="+mn-lt"/>
+          <a:latin typeface="Ubuntu Light" pitchFamily="34" charset="0"/>
           <a:ea typeface="+mn-ea"/>
           <a:cs typeface="+mn-cs"/>
         </a:defRPr>
@@ -4390,19 +4723,21 @@
           <a:p>
             <a:pPr algn="ctr"/>
             <a:r>
-              <a:rPr lang="de-DE" sz="5400" dirty="0" err="1" smtClean="0">
+              <a:rPr lang="de-DE" sz="5400" b="1" dirty="0" err="1" smtClean="0">
                 <a:solidFill>
                   <a:schemeClr val="bg1"/>
                 </a:solidFill>
+                <a:latin typeface="Segoe UI" pitchFamily="34" charset="0"/>
+                <a:cs typeface="Segoe UI" pitchFamily="34" charset="0"/>
               </a:rPr>
               <a:t>NoSQL</a:t>
             </a:r>
-            <a:endParaRPr lang="de-DE" sz="5400" i="1" dirty="0">
+            <a:endParaRPr lang="de-DE" sz="5400" b="1" i="1" dirty="0">
               <a:solidFill>
                 <a:schemeClr val="bg1"/>
               </a:solidFill>
-              <a:latin typeface="Georgia"/>
-              <a:cs typeface="Georgia"/>
+              <a:latin typeface="Segoe UI" pitchFamily="34" charset="0"/>
+              <a:cs typeface="Segoe UI" pitchFamily="34" charset="0"/>
             </a:endParaRPr>
           </a:p>
         </p:txBody>
@@ -4632,19 +4967,2090 @@
       </p:grpSpPr>
       <p:sp>
         <p:nvSpPr>
-          <p:cNvPr id="3" name="Textfeld 2"/>
+          <p:cNvPr id="2" name="Titel 1"/>
+          <p:cNvSpPr>
+            <a:spLocks noGrp="1"/>
+          </p:cNvSpPr>
+          <p:nvPr>
+            <p:ph type="title"/>
+          </p:nvPr>
+        </p:nvSpPr>
+        <p:spPr/>
+        <p:txBody>
+          <a:bodyPr/>
+          <a:lstStyle/>
+          <a:p>
+            <a:r>
+              <a:rPr lang="en-US" dirty="0" smtClean="0"/>
+              <a:t>Scaling</a:t>
+            </a:r>
+            <a:endParaRPr lang="de-AT" dirty="0"/>
+          </a:p>
+        </p:txBody>
+      </p:sp>
+      <p:sp>
+        <p:nvSpPr>
+          <p:cNvPr id="3" name="Inhaltsplatzhalter 2"/>
+          <p:cNvSpPr>
+            <a:spLocks noGrp="1"/>
+          </p:cNvSpPr>
+          <p:nvPr>
+            <p:ph idx="1"/>
+          </p:nvPr>
+        </p:nvSpPr>
+        <p:spPr/>
+        <p:txBody>
+          <a:bodyPr/>
+          <a:lstStyle/>
+          <a:p>
+            <a:endParaRPr lang="en-US" dirty="0" smtClean="0"/>
+          </a:p>
+          <a:p>
+            <a:r>
+              <a:rPr lang="en-US" dirty="0" smtClean="0"/>
+              <a:t>Requests</a:t>
+            </a:r>
+          </a:p>
+          <a:p>
+            <a:r>
+              <a:rPr lang="en-US" dirty="0" smtClean="0"/>
+              <a:t>Data capacity</a:t>
+            </a:r>
+          </a:p>
+          <a:p>
+            <a:r>
+              <a:rPr lang="en-US" dirty="0" smtClean="0"/>
+              <a:t>Performance</a:t>
+            </a:r>
+            <a:endParaRPr lang="de-AT" dirty="0"/>
+          </a:p>
+        </p:txBody>
+      </p:sp>
+      <p:pic>
+        <p:nvPicPr>
+          <p:cNvPr id="5" name="Grafik 4"/>
+          <p:cNvPicPr>
+            <a:picLocks noChangeAspect="1"/>
+          </p:cNvPicPr>
+          <p:nvPr/>
+        </p:nvPicPr>
+        <p:blipFill>
+          <a:blip r:embed="rId2">
+            <a:extLst>
+              <a:ext uri="{28A0092B-C50C-407E-A947-70E740481C1C}">
+                <a14:useLocalDpi xmlns:a14="http://schemas.microsoft.com/office/drawing/2010/main" val="0"/>
+              </a:ext>
+            </a:extLst>
+          </a:blip>
+          <a:stretch>
+            <a:fillRect/>
+          </a:stretch>
+        </p:blipFill>
+        <p:spPr>
+          <a:xfrm>
+            <a:off x="6753003" y="2689305"/>
+            <a:ext cx="1311836" cy="2739971"/>
+          </a:xfrm>
+          <a:prstGeom prst="rect">
+            <a:avLst/>
+          </a:prstGeom>
+        </p:spPr>
+      </p:pic>
+    </p:spTree>
+    <p:extLst>
+      <p:ext uri="{BB962C8B-B14F-4D97-AF65-F5344CB8AC3E}">
+        <p14:creationId xmlns:p14="http://schemas.microsoft.com/office/powerpoint/2010/main" val="3127889702"/>
+      </p:ext>
+    </p:extLst>
+  </p:cSld>
+  <p:clrMapOvr>
+    <a:masterClrMapping/>
+  </p:clrMapOvr>
+  <p:timing>
+    <p:tnLst>
+      <p:par>
+        <p:cTn id="1" dur="indefinite" restart="never" nodeType="tmRoot"/>
+      </p:par>
+    </p:tnLst>
+  </p:timing>
+</p:sld>
+</file>
+
+<file path=ppt/slides/slide12.xml><?xml version="1.0" encoding="utf-8"?>
+<p:sld xmlns:a="http://schemas.openxmlformats.org/drawingml/2006/main" xmlns:r="http://schemas.openxmlformats.org/officeDocument/2006/relationships" xmlns:p="http://schemas.openxmlformats.org/presentationml/2006/main">
+  <p:cSld>
+    <p:spTree>
+      <p:nvGrpSpPr>
+        <p:cNvPr id="1" name=""/>
+        <p:cNvGrpSpPr/>
+        <p:nvPr/>
+      </p:nvGrpSpPr>
+      <p:grpSpPr>
+        <a:xfrm>
+          <a:off x="0" y="0"/>
+          <a:ext cx="0" cy="0"/>
+          <a:chOff x="0" y="0"/>
+          <a:chExt cx="0" cy="0"/>
+        </a:xfrm>
+      </p:grpSpPr>
+      <p:sp>
+        <p:nvSpPr>
+          <p:cNvPr id="2" name="Titel 1"/>
+          <p:cNvSpPr>
+            <a:spLocks noGrp="1"/>
+          </p:cNvSpPr>
+          <p:nvPr>
+            <p:ph type="title"/>
+          </p:nvPr>
+        </p:nvSpPr>
+        <p:spPr/>
+        <p:txBody>
+          <a:bodyPr/>
+          <a:lstStyle/>
+          <a:p>
+            <a:r>
+              <a:rPr lang="en-US" dirty="0" smtClean="0"/>
+              <a:t>Scaling approaches</a:t>
+            </a:r>
+            <a:endParaRPr lang="de-AT" dirty="0"/>
+          </a:p>
+        </p:txBody>
+      </p:sp>
+      <p:pic>
+        <p:nvPicPr>
+          <p:cNvPr id="5" name="Grafik 4"/>
+          <p:cNvPicPr>
+            <a:picLocks noChangeAspect="1"/>
+          </p:cNvPicPr>
+          <p:nvPr/>
+        </p:nvPicPr>
+        <p:blipFill>
+          <a:blip r:embed="rId3">
+            <a:extLst>
+              <a:ext uri="{28A0092B-C50C-407E-A947-70E740481C1C}">
+                <a14:useLocalDpi xmlns:a14="http://schemas.microsoft.com/office/drawing/2010/main" val="0"/>
+              </a:ext>
+            </a:extLst>
+          </a:blip>
+          <a:stretch>
+            <a:fillRect/>
+          </a:stretch>
+        </p:blipFill>
+        <p:spPr>
+          <a:xfrm>
+            <a:off x="1371257" y="3557238"/>
+            <a:ext cx="1072429" cy="1072429"/>
+          </a:xfrm>
+          <a:prstGeom prst="rect">
+            <a:avLst/>
+          </a:prstGeom>
+        </p:spPr>
+      </p:pic>
+      <p:pic>
+        <p:nvPicPr>
+          <p:cNvPr id="6" name="Grafik 5"/>
+          <p:cNvPicPr>
+            <a:picLocks noChangeAspect="1"/>
+          </p:cNvPicPr>
+          <p:nvPr/>
+        </p:nvPicPr>
+        <p:blipFill>
+          <a:blip r:embed="rId4">
+            <a:extLst>
+              <a:ext uri="{28A0092B-C50C-407E-A947-70E740481C1C}">
+                <a14:useLocalDpi xmlns:a14="http://schemas.microsoft.com/office/drawing/2010/main" val="0"/>
+              </a:ext>
+            </a:extLst>
+          </a:blip>
+          <a:stretch>
+            <a:fillRect/>
+          </a:stretch>
+        </p:blipFill>
+        <p:spPr>
+          <a:xfrm>
+            <a:off x="1128574" y="1727762"/>
+            <a:ext cx="1557796" cy="1893418"/>
+          </a:xfrm>
+          <a:prstGeom prst="rect">
+            <a:avLst/>
+          </a:prstGeom>
+        </p:spPr>
+      </p:pic>
+      <p:sp>
+        <p:nvSpPr>
+          <p:cNvPr id="7" name="Inhaltsplatzhalter 6"/>
+          <p:cNvSpPr>
+            <a:spLocks noGrp="1"/>
+          </p:cNvSpPr>
+          <p:nvPr>
+            <p:ph idx="1"/>
+          </p:nvPr>
+        </p:nvSpPr>
+        <p:spPr>
+          <a:xfrm>
+            <a:off x="457200" y="2007520"/>
+            <a:ext cx="8229600" cy="4283403"/>
+          </a:xfrm>
+        </p:spPr>
+        <p:txBody>
+          <a:bodyPr/>
+          <a:lstStyle/>
+          <a:p>
+            <a:pPr marL="0" indent="0" algn="ctr">
+              <a:buNone/>
+            </a:pPr>
+            <a:endParaRPr lang="en-US" dirty="0" smtClean="0"/>
+          </a:p>
+          <a:p>
+            <a:pPr marL="0" indent="0" algn="ctr">
+              <a:buNone/>
+            </a:pPr>
+            <a:endParaRPr lang="en-US" dirty="0"/>
+          </a:p>
+          <a:p>
+            <a:pPr marL="0" indent="0" algn="ctr">
+              <a:buNone/>
+            </a:pPr>
+            <a:endParaRPr lang="en-US" dirty="0" smtClean="0"/>
+          </a:p>
+          <a:p>
+            <a:pPr marL="0" indent="0" algn="ctr">
+              <a:buNone/>
+            </a:pPr>
+            <a:r>
+              <a:rPr lang="en-US" dirty="0" smtClean="0"/>
+              <a:t>vs.</a:t>
+            </a:r>
+            <a:endParaRPr lang="de-AT" dirty="0"/>
+          </a:p>
+        </p:txBody>
+      </p:sp>
+      <p:pic>
+        <p:nvPicPr>
+          <p:cNvPr id="9" name="Grafik 8"/>
+          <p:cNvPicPr>
+            <a:picLocks noChangeAspect="1"/>
+          </p:cNvPicPr>
+          <p:nvPr/>
+        </p:nvPicPr>
+        <p:blipFill>
+          <a:blip r:embed="rId5">
+            <a:extLst>
+              <a:ext uri="{28A0092B-C50C-407E-A947-70E740481C1C}">
+                <a14:useLocalDpi xmlns:a14="http://schemas.microsoft.com/office/drawing/2010/main" val="0"/>
+              </a:ext>
+            </a:extLst>
+          </a:blip>
+          <a:stretch>
+            <a:fillRect/>
+          </a:stretch>
+        </p:blipFill>
+        <p:spPr>
+          <a:xfrm>
+            <a:off x="1338611" y="4683860"/>
+            <a:ext cx="1137720" cy="1744505"/>
+          </a:xfrm>
+          <a:prstGeom prst="rect">
+            <a:avLst/>
+          </a:prstGeom>
+        </p:spPr>
+      </p:pic>
+      <p:pic>
+        <p:nvPicPr>
+          <p:cNvPr id="10" name="Grafik 9"/>
+          <p:cNvPicPr>
+            <a:picLocks noChangeAspect="1"/>
+          </p:cNvPicPr>
+          <p:nvPr/>
+        </p:nvPicPr>
+        <p:blipFill>
+          <a:blip r:embed="rId5">
+            <a:extLst>
+              <a:ext uri="{28A0092B-C50C-407E-A947-70E740481C1C}">
+                <a14:useLocalDpi xmlns:a14="http://schemas.microsoft.com/office/drawing/2010/main" val="0"/>
+              </a:ext>
+            </a:extLst>
+          </a:blip>
+          <a:stretch>
+            <a:fillRect/>
+          </a:stretch>
+        </p:blipFill>
+        <p:spPr>
+          <a:xfrm>
+            <a:off x="7619963" y="1802217"/>
+            <a:ext cx="1137720" cy="1744505"/>
+          </a:xfrm>
+          <a:prstGeom prst="rect">
+            <a:avLst/>
+          </a:prstGeom>
+        </p:spPr>
+      </p:pic>
+      <p:pic>
+        <p:nvPicPr>
+          <p:cNvPr id="11" name="Grafik 10"/>
+          <p:cNvPicPr>
+            <a:picLocks noChangeAspect="1"/>
+          </p:cNvPicPr>
+          <p:nvPr/>
+        </p:nvPicPr>
+        <p:blipFill>
+          <a:blip r:embed="rId5">
+            <a:extLst>
+              <a:ext uri="{28A0092B-C50C-407E-A947-70E740481C1C}">
+                <a14:useLocalDpi xmlns:a14="http://schemas.microsoft.com/office/drawing/2010/main" val="0"/>
+              </a:ext>
+            </a:extLst>
+          </a:blip>
+          <a:stretch>
+            <a:fillRect/>
+          </a:stretch>
+        </p:blipFill>
+        <p:spPr>
+          <a:xfrm>
+            <a:off x="5247428" y="1802218"/>
+            <a:ext cx="1137720" cy="1744505"/>
+          </a:xfrm>
+          <a:prstGeom prst="rect">
+            <a:avLst/>
+          </a:prstGeom>
+        </p:spPr>
+      </p:pic>
+      <p:pic>
+        <p:nvPicPr>
+          <p:cNvPr id="12" name="Grafik 11"/>
+          <p:cNvPicPr>
+            <a:picLocks noChangeAspect="1"/>
+          </p:cNvPicPr>
+          <p:nvPr/>
+        </p:nvPicPr>
+        <p:blipFill>
+          <a:blip r:embed="rId5">
+            <a:extLst>
+              <a:ext uri="{28A0092B-C50C-407E-A947-70E740481C1C}">
+                <a14:useLocalDpi xmlns:a14="http://schemas.microsoft.com/office/drawing/2010/main" val="0"/>
+              </a:ext>
+            </a:extLst>
+          </a:blip>
+          <a:stretch>
+            <a:fillRect/>
+          </a:stretch>
+        </p:blipFill>
+        <p:spPr>
+          <a:xfrm>
+            <a:off x="7619963" y="4737092"/>
+            <a:ext cx="1137720" cy="1744505"/>
+          </a:xfrm>
+          <a:prstGeom prst="rect">
+            <a:avLst/>
+          </a:prstGeom>
+        </p:spPr>
+      </p:pic>
+      <p:pic>
+        <p:nvPicPr>
+          <p:cNvPr id="13" name="Grafik 12"/>
+          <p:cNvPicPr>
+            <a:picLocks noChangeAspect="1"/>
+          </p:cNvPicPr>
+          <p:nvPr/>
+        </p:nvPicPr>
+        <p:blipFill>
+          <a:blip r:embed="rId5">
+            <a:extLst>
+              <a:ext uri="{28A0092B-C50C-407E-A947-70E740481C1C}">
+                <a14:useLocalDpi xmlns:a14="http://schemas.microsoft.com/office/drawing/2010/main" val="0"/>
+              </a:ext>
+            </a:extLst>
+          </a:blip>
+          <a:stretch>
+            <a:fillRect/>
+          </a:stretch>
+        </p:blipFill>
+        <p:spPr>
+          <a:xfrm>
+            <a:off x="5247428" y="4737093"/>
+            <a:ext cx="1137720" cy="1744505"/>
+          </a:xfrm>
+          <a:prstGeom prst="rect">
+            <a:avLst/>
+          </a:prstGeom>
+        </p:spPr>
+      </p:pic>
+      <p:pic>
+        <p:nvPicPr>
+          <p:cNvPr id="14" name="Grafik 13"/>
+          <p:cNvPicPr>
+            <a:picLocks noChangeAspect="1"/>
+          </p:cNvPicPr>
+          <p:nvPr/>
+        </p:nvPicPr>
+        <p:blipFill>
+          <a:blip r:embed="rId5">
+            <a:extLst>
+              <a:ext uri="{28A0092B-C50C-407E-A947-70E740481C1C}">
+                <a14:useLocalDpi xmlns:a14="http://schemas.microsoft.com/office/drawing/2010/main" val="0"/>
+              </a:ext>
+            </a:extLst>
+          </a:blip>
+          <a:stretch>
+            <a:fillRect/>
+          </a:stretch>
+        </p:blipFill>
+        <p:spPr>
+          <a:xfrm>
+            <a:off x="6482243" y="3155741"/>
+            <a:ext cx="1137720" cy="1744505"/>
+          </a:xfrm>
+          <a:prstGeom prst="rect">
+            <a:avLst/>
+          </a:prstGeom>
+        </p:spPr>
+      </p:pic>
+    </p:spTree>
+    <p:extLst>
+      <p:ext uri="{BB962C8B-B14F-4D97-AF65-F5344CB8AC3E}">
+        <p14:creationId xmlns:p14="http://schemas.microsoft.com/office/powerpoint/2010/main" val="1166029142"/>
+      </p:ext>
+    </p:extLst>
+  </p:cSld>
+  <p:clrMapOvr>
+    <a:masterClrMapping/>
+  </p:clrMapOvr>
+  <p:timing>
+    <p:tnLst>
+      <p:par>
+        <p:cTn id="1" dur="indefinite" restart="never" nodeType="tmRoot"/>
+      </p:par>
+    </p:tnLst>
+  </p:timing>
+</p:sld>
+</file>
+
+<file path=ppt/slides/slide13.xml><?xml version="1.0" encoding="utf-8"?>
+<p:sld xmlns:a="http://schemas.openxmlformats.org/drawingml/2006/main" xmlns:r="http://schemas.openxmlformats.org/officeDocument/2006/relationships" xmlns:p="http://schemas.openxmlformats.org/presentationml/2006/main">
+  <p:cSld>
+    <p:spTree>
+      <p:nvGrpSpPr>
+        <p:cNvPr id="1" name=""/>
+        <p:cNvGrpSpPr/>
+        <p:nvPr/>
+      </p:nvGrpSpPr>
+      <p:grpSpPr>
+        <a:xfrm>
+          <a:off x="0" y="0"/>
+          <a:ext cx="0" cy="0"/>
+          <a:chOff x="0" y="0"/>
+          <a:chExt cx="0" cy="0"/>
+        </a:xfrm>
+      </p:grpSpPr>
+      <p:sp>
+        <p:nvSpPr>
+          <p:cNvPr id="2" name="Titel 1"/>
+          <p:cNvSpPr>
+            <a:spLocks noGrp="1"/>
+          </p:cNvSpPr>
+          <p:nvPr>
+            <p:ph type="title"/>
+          </p:nvPr>
+        </p:nvSpPr>
+        <p:spPr/>
+        <p:txBody>
+          <a:bodyPr/>
+          <a:lstStyle/>
+          <a:p>
+            <a:r>
+              <a:rPr lang="en-US" dirty="0" err="1" smtClean="0"/>
+              <a:t>MapReduce</a:t>
+            </a:r>
+            <a:endParaRPr lang="de-AT" dirty="0"/>
+          </a:p>
+        </p:txBody>
+      </p:sp>
+      <p:sp>
+        <p:nvSpPr>
+          <p:cNvPr id="3" name="Inhaltsplatzhalter 2"/>
+          <p:cNvSpPr>
+            <a:spLocks noGrp="1"/>
+          </p:cNvSpPr>
+          <p:nvPr>
+            <p:ph idx="1"/>
+          </p:nvPr>
+        </p:nvSpPr>
+        <p:spPr/>
+        <p:txBody>
+          <a:bodyPr/>
+          <a:lstStyle/>
+          <a:p>
+            <a:endParaRPr lang="en-US" dirty="0" smtClean="0"/>
+          </a:p>
+          <a:p>
+            <a:r>
+              <a:rPr lang="en-US" dirty="0" smtClean="0"/>
+              <a:t>Huge amounts of data</a:t>
+            </a:r>
+          </a:p>
+          <a:p>
+            <a:r>
+              <a:rPr lang="en-US" dirty="0" smtClean="0"/>
+              <a:t>Parallel computing</a:t>
+            </a:r>
+          </a:p>
+          <a:p>
+            <a:r>
+              <a:rPr lang="en-US" dirty="0" smtClean="0"/>
+              <a:t>Distribution</a:t>
+            </a:r>
+          </a:p>
+          <a:p>
+            <a:r>
+              <a:rPr lang="en-US" dirty="0" smtClean="0"/>
+              <a:t>Efficiency</a:t>
+            </a:r>
+            <a:endParaRPr lang="de-AT" dirty="0"/>
+          </a:p>
+        </p:txBody>
+      </p:sp>
+      <p:grpSp>
+        <p:nvGrpSpPr>
+          <p:cNvPr id="8" name="Gruppieren 7"/>
+          <p:cNvGrpSpPr/>
+          <p:nvPr/>
+        </p:nvGrpSpPr>
+        <p:grpSpPr>
+          <a:xfrm>
+            <a:off x="5025080" y="2080702"/>
+            <a:ext cx="3964571" cy="3820128"/>
+            <a:chOff x="4328950" y="2171319"/>
+            <a:chExt cx="4660702" cy="4490896"/>
+          </a:xfrm>
+        </p:grpSpPr>
+        <p:pic>
+          <p:nvPicPr>
+            <p:cNvPr id="4" name="Grafik 3"/>
+            <p:cNvPicPr>
+              <a:picLocks noChangeAspect="1"/>
+            </p:cNvPicPr>
+            <p:nvPr/>
+          </p:nvPicPr>
+          <p:blipFill>
+            <a:blip r:embed="rId3">
+              <a:extLst>
+                <a:ext uri="{28A0092B-C50C-407E-A947-70E740481C1C}">
+                  <a14:useLocalDpi xmlns:a14="http://schemas.microsoft.com/office/drawing/2010/main" val="0"/>
+                </a:ext>
+              </a:extLst>
+            </a:blip>
+            <a:stretch>
+              <a:fillRect/>
+            </a:stretch>
+          </p:blipFill>
+          <p:spPr>
+            <a:xfrm>
+              <a:off x="6091394" y="2171319"/>
+              <a:ext cx="1137720" cy="1744505"/>
+            </a:xfrm>
+            <a:prstGeom prst="rect">
+              <a:avLst/>
+            </a:prstGeom>
+          </p:spPr>
+        </p:pic>
+        <p:pic>
+          <p:nvPicPr>
+            <p:cNvPr id="5" name="Grafik 4"/>
+            <p:cNvPicPr>
+              <a:picLocks noChangeAspect="1"/>
+            </p:cNvPicPr>
+            <p:nvPr/>
+          </p:nvPicPr>
+          <p:blipFill>
+            <a:blip r:embed="rId3">
+              <a:extLst>
+                <a:ext uri="{28A0092B-C50C-407E-A947-70E740481C1C}">
+                  <a14:useLocalDpi xmlns:a14="http://schemas.microsoft.com/office/drawing/2010/main" val="0"/>
+                </a:ext>
+              </a:extLst>
+            </a:blip>
+            <a:stretch>
+              <a:fillRect/>
+            </a:stretch>
+          </p:blipFill>
+          <p:spPr>
+            <a:xfrm>
+              <a:off x="4328950" y="4917709"/>
+              <a:ext cx="1137720" cy="1744505"/>
+            </a:xfrm>
+            <a:prstGeom prst="rect">
+              <a:avLst/>
+            </a:prstGeom>
+          </p:spPr>
+        </p:pic>
+        <p:pic>
+          <p:nvPicPr>
+            <p:cNvPr id="6" name="Grafik 5"/>
+            <p:cNvPicPr>
+              <a:picLocks noChangeAspect="1"/>
+            </p:cNvPicPr>
+            <p:nvPr/>
+          </p:nvPicPr>
+          <p:blipFill>
+            <a:blip r:embed="rId3">
+              <a:extLst>
+                <a:ext uri="{28A0092B-C50C-407E-A947-70E740481C1C}">
+                  <a14:useLocalDpi xmlns:a14="http://schemas.microsoft.com/office/drawing/2010/main" val="0"/>
+                </a:ext>
+              </a:extLst>
+            </a:blip>
+            <a:stretch>
+              <a:fillRect/>
+            </a:stretch>
+          </p:blipFill>
+          <p:spPr>
+            <a:xfrm>
+              <a:off x="6091394" y="4917710"/>
+              <a:ext cx="1137720" cy="1744505"/>
+            </a:xfrm>
+            <a:prstGeom prst="rect">
+              <a:avLst/>
+            </a:prstGeom>
+          </p:spPr>
+        </p:pic>
+        <p:pic>
+          <p:nvPicPr>
+            <p:cNvPr id="7" name="Grafik 6"/>
+            <p:cNvPicPr>
+              <a:picLocks noChangeAspect="1"/>
+            </p:cNvPicPr>
+            <p:nvPr/>
+          </p:nvPicPr>
+          <p:blipFill>
+            <a:blip r:embed="rId3">
+              <a:extLst>
+                <a:ext uri="{28A0092B-C50C-407E-A947-70E740481C1C}">
+                  <a14:useLocalDpi xmlns:a14="http://schemas.microsoft.com/office/drawing/2010/main" val="0"/>
+                </a:ext>
+              </a:extLst>
+            </a:blip>
+            <a:stretch>
+              <a:fillRect/>
+            </a:stretch>
+          </p:blipFill>
+          <p:spPr>
+            <a:xfrm>
+              <a:off x="7851932" y="4917708"/>
+              <a:ext cx="1137720" cy="1744505"/>
+            </a:xfrm>
+            <a:prstGeom prst="rect">
+              <a:avLst/>
+            </a:prstGeom>
+          </p:spPr>
+        </p:pic>
+        <p:sp>
+          <p:nvSpPr>
+            <p:cNvPr id="10" name="Pfeil nach unten 9"/>
+            <p:cNvSpPr/>
+            <p:nvPr/>
+          </p:nvSpPr>
+          <p:spPr>
+            <a:xfrm>
+              <a:off x="6417938" y="3995350"/>
+              <a:ext cx="484632" cy="839980"/>
+            </a:xfrm>
+            <a:prstGeom prst="downArrow">
+              <a:avLst/>
+            </a:prstGeom>
+          </p:spPr>
+          <p:style>
+            <a:lnRef idx="1">
+              <a:schemeClr val="accent1"/>
+            </a:lnRef>
+            <a:fillRef idx="3">
+              <a:schemeClr val="accent1"/>
+            </a:fillRef>
+            <a:effectRef idx="2">
+              <a:schemeClr val="accent1"/>
+            </a:effectRef>
+            <a:fontRef idx="minor">
+              <a:schemeClr val="lt1"/>
+            </a:fontRef>
+          </p:style>
+          <p:txBody>
+            <a:bodyPr rtlCol="0" anchor="ctr"/>
+            <a:lstStyle/>
+            <a:p>
+              <a:pPr algn="ctr"/>
+              <a:endParaRPr lang="de-AT"/>
+            </a:p>
+          </p:txBody>
+        </p:sp>
+        <p:sp>
+          <p:nvSpPr>
+            <p:cNvPr id="11" name="Pfeil nach unten 10"/>
+            <p:cNvSpPr/>
+            <p:nvPr/>
+          </p:nvSpPr>
+          <p:spPr>
+            <a:xfrm rot="2700000">
+              <a:off x="5349078" y="3842951"/>
+              <a:ext cx="484632" cy="839980"/>
+            </a:xfrm>
+            <a:prstGeom prst="downArrow">
+              <a:avLst/>
+            </a:prstGeom>
+          </p:spPr>
+          <p:style>
+            <a:lnRef idx="1">
+              <a:schemeClr val="accent1"/>
+            </a:lnRef>
+            <a:fillRef idx="3">
+              <a:schemeClr val="accent1"/>
+            </a:fillRef>
+            <a:effectRef idx="2">
+              <a:schemeClr val="accent1"/>
+            </a:effectRef>
+            <a:fontRef idx="minor">
+              <a:schemeClr val="lt1"/>
+            </a:fontRef>
+          </p:style>
+          <p:txBody>
+            <a:bodyPr rtlCol="0" anchor="ctr"/>
+            <a:lstStyle/>
+            <a:p>
+              <a:pPr algn="ctr"/>
+              <a:endParaRPr lang="de-AT"/>
+            </a:p>
+          </p:txBody>
+        </p:sp>
+        <p:sp>
+          <p:nvSpPr>
+            <p:cNvPr id="12" name="Pfeil nach unten 11"/>
+            <p:cNvSpPr/>
+            <p:nvPr/>
+          </p:nvSpPr>
+          <p:spPr>
+            <a:xfrm rot="-2700000">
+              <a:off x="7455119" y="3846930"/>
+              <a:ext cx="484632" cy="839980"/>
+            </a:xfrm>
+            <a:prstGeom prst="downArrow">
+              <a:avLst/>
+            </a:prstGeom>
+          </p:spPr>
+          <p:style>
+            <a:lnRef idx="1">
+              <a:schemeClr val="accent1"/>
+            </a:lnRef>
+            <a:fillRef idx="3">
+              <a:schemeClr val="accent1"/>
+            </a:fillRef>
+            <a:effectRef idx="2">
+              <a:schemeClr val="accent1"/>
+            </a:effectRef>
+            <a:fontRef idx="minor">
+              <a:schemeClr val="lt1"/>
+            </a:fontRef>
+          </p:style>
+          <p:txBody>
+            <a:bodyPr rtlCol="0" anchor="ctr"/>
+            <a:lstStyle/>
+            <a:p>
+              <a:pPr algn="ctr"/>
+              <a:endParaRPr lang="de-AT"/>
+            </a:p>
+          </p:txBody>
+        </p:sp>
+      </p:grpSp>
+    </p:spTree>
+    <p:extLst>
+      <p:ext uri="{BB962C8B-B14F-4D97-AF65-F5344CB8AC3E}">
+        <p14:creationId xmlns:p14="http://schemas.microsoft.com/office/powerpoint/2010/main" val="606824678"/>
+      </p:ext>
+    </p:extLst>
+  </p:cSld>
+  <p:clrMapOvr>
+    <a:masterClrMapping/>
+  </p:clrMapOvr>
+  <p:timing>
+    <p:tnLst>
+      <p:par>
+        <p:cTn id="1" dur="indefinite" restart="never" nodeType="tmRoot"/>
+      </p:par>
+    </p:tnLst>
+  </p:timing>
+</p:sld>
+</file>
+
+<file path=ppt/slides/slide14.xml><?xml version="1.0" encoding="utf-8"?>
+<p:sld xmlns:a="http://schemas.openxmlformats.org/drawingml/2006/main" xmlns:r="http://schemas.openxmlformats.org/officeDocument/2006/relationships" xmlns:p="http://schemas.openxmlformats.org/presentationml/2006/main">
+  <p:cSld>
+    <p:spTree>
+      <p:nvGrpSpPr>
+        <p:cNvPr id="1" name=""/>
+        <p:cNvGrpSpPr/>
+        <p:nvPr/>
+      </p:nvGrpSpPr>
+      <p:grpSpPr>
+        <a:xfrm>
+          <a:off x="0" y="0"/>
+          <a:ext cx="0" cy="0"/>
+          <a:chOff x="0" y="0"/>
+          <a:chExt cx="0" cy="0"/>
+        </a:xfrm>
+      </p:grpSpPr>
+      <p:sp>
+        <p:nvSpPr>
+          <p:cNvPr id="2" name="Titel 1"/>
+          <p:cNvSpPr>
+            <a:spLocks noGrp="1"/>
+          </p:cNvSpPr>
+          <p:nvPr>
+            <p:ph type="title"/>
+          </p:nvPr>
+        </p:nvSpPr>
+        <p:spPr/>
+        <p:txBody>
+          <a:bodyPr/>
+          <a:lstStyle/>
+          <a:p>
+            <a:r>
+              <a:rPr lang="en-US" dirty="0" err="1" smtClean="0"/>
+              <a:t>MapReduce</a:t>
+            </a:r>
+            <a:endParaRPr lang="de-AT" dirty="0"/>
+          </a:p>
+        </p:txBody>
+      </p:sp>
+      <p:pic>
+        <p:nvPicPr>
+          <p:cNvPr id="4" name="Inhaltsplatzhalter 3"/>
+          <p:cNvPicPr>
+            <a:picLocks noGrp="1" noChangeAspect="1"/>
+          </p:cNvPicPr>
+          <p:nvPr>
+            <p:ph idx="1"/>
+          </p:nvPr>
+        </p:nvPicPr>
+        <p:blipFill>
+          <a:blip r:embed="rId3">
+            <a:extLst>
+              <a:ext uri="{28A0092B-C50C-407E-A947-70E740481C1C}">
+                <a14:useLocalDpi xmlns:a14="http://schemas.microsoft.com/office/drawing/2010/main" val="0"/>
+              </a:ext>
+            </a:extLst>
+          </a:blip>
+          <a:stretch>
+            <a:fillRect/>
+          </a:stretch>
+        </p:blipFill>
+        <p:spPr>
+          <a:xfrm>
+            <a:off x="2072423" y="2836446"/>
+            <a:ext cx="4999154" cy="2296359"/>
+          </a:xfrm>
+        </p:spPr>
+      </p:pic>
+    </p:spTree>
+    <p:extLst>
+      <p:ext uri="{BB962C8B-B14F-4D97-AF65-F5344CB8AC3E}">
+        <p14:creationId xmlns:p14="http://schemas.microsoft.com/office/powerpoint/2010/main" val="3158652491"/>
+      </p:ext>
+    </p:extLst>
+  </p:cSld>
+  <p:clrMapOvr>
+    <a:masterClrMapping/>
+  </p:clrMapOvr>
+  <p:timing>
+    <p:tnLst>
+      <p:par>
+        <p:cTn id="1" dur="indefinite" restart="never" nodeType="tmRoot"/>
+      </p:par>
+    </p:tnLst>
+  </p:timing>
+</p:sld>
+</file>
+
+<file path=ppt/slides/slide15.xml><?xml version="1.0" encoding="utf-8"?>
+<p:sld xmlns:a="http://schemas.openxmlformats.org/drawingml/2006/main" xmlns:r="http://schemas.openxmlformats.org/officeDocument/2006/relationships" xmlns:p="http://schemas.openxmlformats.org/presentationml/2006/main">
+  <p:cSld>
+    <p:spTree>
+      <p:nvGrpSpPr>
+        <p:cNvPr id="1" name=""/>
+        <p:cNvGrpSpPr/>
+        <p:nvPr/>
+      </p:nvGrpSpPr>
+      <p:grpSpPr>
+        <a:xfrm>
+          <a:off x="0" y="0"/>
+          <a:ext cx="0" cy="0"/>
+          <a:chOff x="0" y="0"/>
+          <a:chExt cx="0" cy="0"/>
+        </a:xfrm>
+      </p:grpSpPr>
+      <p:sp>
+        <p:nvSpPr>
+          <p:cNvPr id="2" name="Titel 1"/>
+          <p:cNvSpPr>
+            <a:spLocks noGrp="1"/>
+          </p:cNvSpPr>
+          <p:nvPr>
+            <p:ph type="title"/>
+          </p:nvPr>
+        </p:nvSpPr>
+        <p:spPr/>
+        <p:txBody>
+          <a:bodyPr/>
+          <a:lstStyle/>
+          <a:p>
+            <a:r>
+              <a:rPr lang="en-US" dirty="0" smtClean="0"/>
+              <a:t>Example – word count</a:t>
+            </a:r>
+            <a:endParaRPr lang="de-AT" dirty="0"/>
+          </a:p>
+        </p:txBody>
+      </p:sp>
+      <p:sp>
+        <p:nvSpPr>
+          <p:cNvPr id="3" name="Inhaltsplatzhalter 2"/>
+          <p:cNvSpPr>
+            <a:spLocks noGrp="1"/>
+          </p:cNvSpPr>
+          <p:nvPr>
+            <p:ph idx="1"/>
+          </p:nvPr>
+        </p:nvSpPr>
+        <p:spPr/>
+        <p:txBody>
+          <a:bodyPr>
+            <a:normAutofit/>
+          </a:bodyPr>
+          <a:lstStyle/>
+          <a:p>
+            <a:pPr marL="0" indent="0">
+              <a:buNone/>
+            </a:pPr>
+            <a:endParaRPr lang="en-US" sz="2400" dirty="0" smtClean="0"/>
+          </a:p>
+          <a:p>
+            <a:pPr marL="0" indent="0">
+              <a:buNone/>
+            </a:pPr>
+            <a:endParaRPr lang="en-US" sz="2400" dirty="0"/>
+          </a:p>
+          <a:p>
+            <a:pPr marL="0" indent="0">
+              <a:buNone/>
+            </a:pPr>
+            <a:r>
+              <a:rPr lang="en-US" sz="2400" dirty="0" smtClean="0"/>
+              <a:t>grumpy cat</a:t>
+            </a:r>
+            <a:br>
+              <a:rPr lang="en-US" sz="2400" dirty="0" smtClean="0"/>
+            </a:br>
+            <a:r>
+              <a:rPr lang="en-US" sz="2400" dirty="0" err="1" smtClean="0"/>
+              <a:t>steven</a:t>
+            </a:r>
+            <a:r>
+              <a:rPr lang="en-US" sz="2400" dirty="0" smtClean="0"/>
+              <a:t> </a:t>
+            </a:r>
+            <a:r>
+              <a:rPr lang="en-US" sz="2400" dirty="0" err="1" smtClean="0"/>
+              <a:t>seagal</a:t>
+            </a:r>
+            <a:r>
+              <a:rPr lang="en-US" sz="2400" dirty="0" smtClean="0"/>
+              <a:t/>
+            </a:r>
+            <a:br>
+              <a:rPr lang="en-US" sz="2400" dirty="0" smtClean="0"/>
+            </a:br>
+            <a:r>
+              <a:rPr lang="en-US" sz="2400" dirty="0" err="1" smtClean="0"/>
+              <a:t>jake</a:t>
+            </a:r>
+            <a:r>
+              <a:rPr lang="en-US" sz="2400" dirty="0" smtClean="0"/>
+              <a:t> the dog</a:t>
+            </a:r>
+            <a:br>
+              <a:rPr lang="en-US" sz="2400" dirty="0" smtClean="0"/>
+            </a:br>
+            <a:r>
+              <a:rPr lang="en-US" sz="2400" dirty="0" err="1" smtClean="0"/>
+              <a:t>finn</a:t>
+            </a:r>
+            <a:r>
+              <a:rPr lang="en-US" sz="2400" dirty="0" smtClean="0"/>
+              <a:t> the human</a:t>
+            </a:r>
+            <a:br>
+              <a:rPr lang="en-US" sz="2400" dirty="0" smtClean="0"/>
+            </a:br>
+            <a:r>
+              <a:rPr lang="en-US" sz="2400" dirty="0" smtClean="0"/>
+              <a:t>hover cat</a:t>
+            </a:r>
+            <a:br>
+              <a:rPr lang="en-US" sz="2400" dirty="0" smtClean="0"/>
+            </a:br>
+            <a:r>
+              <a:rPr lang="en-US" sz="2400" dirty="0" smtClean="0"/>
+              <a:t>grumpy grandma</a:t>
+            </a:r>
+            <a:endParaRPr lang="de-AT" sz="2400" dirty="0"/>
+          </a:p>
+        </p:txBody>
+      </p:sp>
+    </p:spTree>
+    <p:extLst>
+      <p:ext uri="{BB962C8B-B14F-4D97-AF65-F5344CB8AC3E}">
+        <p14:creationId xmlns:p14="http://schemas.microsoft.com/office/powerpoint/2010/main" val="461514523"/>
+      </p:ext>
+    </p:extLst>
+  </p:cSld>
+  <p:clrMapOvr>
+    <a:masterClrMapping/>
+  </p:clrMapOvr>
+  <p:timing>
+    <p:tnLst>
+      <p:par>
+        <p:cTn id="1" dur="indefinite" restart="never" nodeType="tmRoot"/>
+      </p:par>
+    </p:tnLst>
+  </p:timing>
+</p:sld>
+</file>
+
+<file path=ppt/slides/slide16.xml><?xml version="1.0" encoding="utf-8"?>
+<p:sld xmlns:a="http://schemas.openxmlformats.org/drawingml/2006/main" xmlns:r="http://schemas.openxmlformats.org/officeDocument/2006/relationships" xmlns:p="http://schemas.openxmlformats.org/presentationml/2006/main">
+  <p:cSld>
+    <p:spTree>
+      <p:nvGrpSpPr>
+        <p:cNvPr id="1" name=""/>
+        <p:cNvGrpSpPr/>
+        <p:nvPr/>
+      </p:nvGrpSpPr>
+      <p:grpSpPr>
+        <a:xfrm>
+          <a:off x="0" y="0"/>
+          <a:ext cx="0" cy="0"/>
+          <a:chOff x="0" y="0"/>
+          <a:chExt cx="0" cy="0"/>
+        </a:xfrm>
+      </p:grpSpPr>
+      <p:sp>
+        <p:nvSpPr>
+          <p:cNvPr id="2" name="Titel 1"/>
+          <p:cNvSpPr>
+            <a:spLocks noGrp="1"/>
+          </p:cNvSpPr>
+          <p:nvPr>
+            <p:ph type="title"/>
+          </p:nvPr>
+        </p:nvSpPr>
+        <p:spPr/>
+        <p:txBody>
+          <a:bodyPr/>
+          <a:lstStyle/>
+          <a:p>
+            <a:r>
+              <a:rPr lang="en-US" dirty="0" smtClean="0"/>
+              <a:t>Map phase</a:t>
+            </a:r>
+            <a:endParaRPr lang="de-AT" dirty="0"/>
+          </a:p>
+        </p:txBody>
+      </p:sp>
+      <p:sp>
+        <p:nvSpPr>
+          <p:cNvPr id="3" name="Inhaltsplatzhalter 2"/>
+          <p:cNvSpPr>
+            <a:spLocks noGrp="1"/>
+          </p:cNvSpPr>
+          <p:nvPr>
+            <p:ph idx="1"/>
+          </p:nvPr>
+        </p:nvSpPr>
+        <p:spPr/>
+        <p:txBody>
+          <a:bodyPr>
+            <a:normAutofit/>
+          </a:bodyPr>
+          <a:lstStyle/>
+          <a:p>
+            <a:pPr marL="0" indent="0">
+              <a:buNone/>
+            </a:pPr>
+            <a:endParaRPr lang="en-US" sz="2400" dirty="0" smtClean="0"/>
+          </a:p>
+          <a:p>
+            <a:pPr marL="0" indent="0">
+              <a:buNone/>
+            </a:pPr>
+            <a:endParaRPr lang="en-US" sz="2400" dirty="0"/>
+          </a:p>
+          <a:p>
+            <a:pPr marL="0" indent="0">
+              <a:buNone/>
+            </a:pPr>
+            <a:r>
+              <a:rPr lang="en-US" sz="2400" dirty="0" smtClean="0"/>
+              <a:t>grumpy cat</a:t>
+            </a:r>
+            <a:br>
+              <a:rPr lang="en-US" sz="2400" dirty="0" smtClean="0"/>
+            </a:br>
+            <a:r>
+              <a:rPr lang="en-US" sz="2400" dirty="0" err="1" smtClean="0"/>
+              <a:t>steven</a:t>
+            </a:r>
+            <a:r>
+              <a:rPr lang="en-US" sz="2400" dirty="0" smtClean="0"/>
+              <a:t> </a:t>
+            </a:r>
+            <a:r>
+              <a:rPr lang="en-US" sz="2400" dirty="0" err="1" smtClean="0"/>
+              <a:t>seagal</a:t>
+            </a:r>
+            <a:r>
+              <a:rPr lang="en-US" sz="2400" dirty="0" smtClean="0"/>
+              <a:t/>
+            </a:r>
+            <a:br>
+              <a:rPr lang="en-US" sz="2400" dirty="0" smtClean="0"/>
+            </a:br>
+            <a:r>
+              <a:rPr lang="en-US" sz="2400" dirty="0" err="1" smtClean="0"/>
+              <a:t>jake</a:t>
+            </a:r>
+            <a:r>
+              <a:rPr lang="en-US" sz="2400" dirty="0" smtClean="0"/>
+              <a:t> the dog</a:t>
+            </a:r>
+            <a:br>
+              <a:rPr lang="en-US" sz="2400" dirty="0" smtClean="0"/>
+            </a:br>
+            <a:r>
+              <a:rPr lang="en-US" sz="2400" dirty="0" err="1" smtClean="0"/>
+              <a:t>finn</a:t>
+            </a:r>
+            <a:r>
+              <a:rPr lang="en-US" sz="2400" dirty="0" smtClean="0"/>
+              <a:t> the human</a:t>
+            </a:r>
+            <a:br>
+              <a:rPr lang="en-US" sz="2400" dirty="0" smtClean="0"/>
+            </a:br>
+            <a:r>
+              <a:rPr lang="en-US" sz="2400" dirty="0" smtClean="0"/>
+              <a:t>hover cat</a:t>
+            </a:r>
+            <a:br>
+              <a:rPr lang="en-US" sz="2400" dirty="0" smtClean="0"/>
+            </a:br>
+            <a:r>
+              <a:rPr lang="en-US" sz="2400" dirty="0" smtClean="0"/>
+              <a:t>grumpy grandma</a:t>
+            </a:r>
+            <a:endParaRPr lang="de-AT" sz="2400" dirty="0"/>
+          </a:p>
+        </p:txBody>
+      </p:sp>
+      <p:sp>
+        <p:nvSpPr>
+          <p:cNvPr id="4" name="Abgerundetes Rechteck 3"/>
+          <p:cNvSpPr/>
+          <p:nvPr/>
+        </p:nvSpPr>
+        <p:spPr>
+          <a:xfrm>
+            <a:off x="5338119" y="2397209"/>
+            <a:ext cx="1458097" cy="691979"/>
+          </a:xfrm>
+          <a:prstGeom prst="roundRect">
+            <a:avLst/>
+          </a:prstGeom>
+        </p:spPr>
+        <p:style>
+          <a:lnRef idx="1">
+            <a:schemeClr val="accent1"/>
+          </a:lnRef>
+          <a:fillRef idx="3">
+            <a:schemeClr val="accent1"/>
+          </a:fillRef>
+          <a:effectRef idx="2">
+            <a:schemeClr val="accent1"/>
+          </a:effectRef>
+          <a:fontRef idx="minor">
+            <a:schemeClr val="lt1"/>
+          </a:fontRef>
+        </p:style>
+        <p:txBody>
+          <a:bodyPr rtlCol="0" anchor="ctr"/>
+          <a:lstStyle/>
+          <a:p>
+            <a:pPr algn="ctr"/>
+            <a:r>
+              <a:rPr lang="en-US" dirty="0" smtClean="0"/>
+              <a:t>Map 1</a:t>
+            </a:r>
+            <a:endParaRPr lang="de-AT" dirty="0"/>
+          </a:p>
+        </p:txBody>
+      </p:sp>
+      <p:sp>
+        <p:nvSpPr>
+          <p:cNvPr id="5" name="Abgerundetes Rechteck 4"/>
+          <p:cNvSpPr/>
+          <p:nvPr/>
+        </p:nvSpPr>
+        <p:spPr>
+          <a:xfrm>
+            <a:off x="5338118" y="4724398"/>
+            <a:ext cx="1458097" cy="691979"/>
+          </a:xfrm>
+          <a:prstGeom prst="roundRect">
+            <a:avLst/>
+          </a:prstGeom>
+        </p:spPr>
+        <p:style>
+          <a:lnRef idx="1">
+            <a:schemeClr val="accent1"/>
+          </a:lnRef>
+          <a:fillRef idx="3">
+            <a:schemeClr val="accent1"/>
+          </a:fillRef>
+          <a:effectRef idx="2">
+            <a:schemeClr val="accent1"/>
+          </a:effectRef>
+          <a:fontRef idx="minor">
+            <a:schemeClr val="lt1"/>
+          </a:fontRef>
+        </p:style>
+        <p:txBody>
+          <a:bodyPr rtlCol="0" anchor="ctr"/>
+          <a:lstStyle/>
+          <a:p>
+            <a:pPr algn="ctr"/>
+            <a:r>
+              <a:rPr lang="en-US" dirty="0" smtClean="0"/>
+              <a:t>Map 3</a:t>
+            </a:r>
+            <a:endParaRPr lang="de-AT" dirty="0"/>
+          </a:p>
+        </p:txBody>
+      </p:sp>
+      <p:sp>
+        <p:nvSpPr>
+          <p:cNvPr id="6" name="Abgerundetes Rechteck 5"/>
+          <p:cNvSpPr/>
+          <p:nvPr/>
+        </p:nvSpPr>
+        <p:spPr>
+          <a:xfrm>
+            <a:off x="5338119" y="3583458"/>
+            <a:ext cx="1458097" cy="691979"/>
+          </a:xfrm>
+          <a:prstGeom prst="roundRect">
+            <a:avLst/>
+          </a:prstGeom>
+        </p:spPr>
+        <p:style>
+          <a:lnRef idx="1">
+            <a:schemeClr val="accent1"/>
+          </a:lnRef>
+          <a:fillRef idx="3">
+            <a:schemeClr val="accent1"/>
+          </a:fillRef>
+          <a:effectRef idx="2">
+            <a:schemeClr val="accent1"/>
+          </a:effectRef>
+          <a:fontRef idx="minor">
+            <a:schemeClr val="lt1"/>
+          </a:fontRef>
+        </p:style>
+        <p:txBody>
+          <a:bodyPr rtlCol="0" anchor="ctr"/>
+          <a:lstStyle/>
+          <a:p>
+            <a:pPr algn="ctr"/>
+            <a:r>
+              <a:rPr lang="en-US" dirty="0" smtClean="0"/>
+              <a:t>Map 2</a:t>
+            </a:r>
+            <a:endParaRPr lang="de-AT" dirty="0"/>
+          </a:p>
+        </p:txBody>
+      </p:sp>
+      <p:cxnSp>
+        <p:nvCxnSpPr>
+          <p:cNvPr id="8" name="Gerade Verbindung mit Pfeil 7"/>
+          <p:cNvCxnSpPr/>
+          <p:nvPr/>
+        </p:nvCxnSpPr>
+        <p:spPr>
+          <a:xfrm flipV="1">
+            <a:off x="2858530" y="2660822"/>
+            <a:ext cx="2364259" cy="288324"/>
+          </a:xfrm>
+          <a:prstGeom prst="straightConnector1">
+            <a:avLst/>
+          </a:prstGeom>
+          <a:ln>
+            <a:tailEnd type="arrow"/>
+          </a:ln>
+        </p:spPr>
+        <p:style>
+          <a:lnRef idx="2">
+            <a:schemeClr val="accent1"/>
+          </a:lnRef>
+          <a:fillRef idx="0">
+            <a:schemeClr val="accent1"/>
+          </a:fillRef>
+          <a:effectRef idx="1">
+            <a:schemeClr val="accent1"/>
+          </a:effectRef>
+          <a:fontRef idx="minor">
+            <a:schemeClr val="tx1"/>
+          </a:fontRef>
+        </p:style>
+      </p:cxnSp>
+      <p:cxnSp>
+        <p:nvCxnSpPr>
+          <p:cNvPr id="10" name="Gerade Verbindung mit Pfeil 9"/>
+          <p:cNvCxnSpPr/>
+          <p:nvPr/>
+        </p:nvCxnSpPr>
+        <p:spPr>
+          <a:xfrm>
+            <a:off x="2858530" y="3352800"/>
+            <a:ext cx="2364259" cy="469557"/>
+          </a:xfrm>
+          <a:prstGeom prst="straightConnector1">
+            <a:avLst/>
+          </a:prstGeom>
+          <a:ln>
+            <a:tailEnd type="arrow"/>
+          </a:ln>
+        </p:spPr>
+        <p:style>
+          <a:lnRef idx="2">
+            <a:schemeClr val="accent1"/>
+          </a:lnRef>
+          <a:fillRef idx="0">
+            <a:schemeClr val="accent1"/>
+          </a:fillRef>
+          <a:effectRef idx="1">
+            <a:schemeClr val="accent1"/>
+          </a:effectRef>
+          <a:fontRef idx="minor">
+            <a:schemeClr val="tx1"/>
+          </a:fontRef>
+        </p:style>
+      </p:cxnSp>
+      <p:cxnSp>
+        <p:nvCxnSpPr>
+          <p:cNvPr id="12" name="Gerade Verbindung mit Pfeil 11"/>
+          <p:cNvCxnSpPr/>
+          <p:nvPr/>
+        </p:nvCxnSpPr>
+        <p:spPr>
+          <a:xfrm>
+            <a:off x="2858530" y="3748216"/>
+            <a:ext cx="2364259" cy="1202725"/>
+          </a:xfrm>
+          <a:prstGeom prst="straightConnector1">
+            <a:avLst/>
+          </a:prstGeom>
+          <a:ln>
+            <a:tailEnd type="arrow"/>
+          </a:ln>
+        </p:spPr>
+        <p:style>
+          <a:lnRef idx="2">
+            <a:schemeClr val="accent1"/>
+          </a:lnRef>
+          <a:fillRef idx="0">
+            <a:schemeClr val="accent1"/>
+          </a:fillRef>
+          <a:effectRef idx="1">
+            <a:schemeClr val="accent1"/>
+          </a:effectRef>
+          <a:fontRef idx="minor">
+            <a:schemeClr val="tx1"/>
+          </a:fontRef>
+        </p:style>
+      </p:cxnSp>
+      <p:cxnSp>
+        <p:nvCxnSpPr>
+          <p:cNvPr id="15" name="Gerade Verbindung mit Pfeil 14"/>
+          <p:cNvCxnSpPr/>
+          <p:nvPr/>
+        </p:nvCxnSpPr>
+        <p:spPr>
+          <a:xfrm flipV="1">
+            <a:off x="2858530" y="2875005"/>
+            <a:ext cx="2364259" cy="1145060"/>
+          </a:xfrm>
+          <a:prstGeom prst="straightConnector1">
+            <a:avLst/>
+          </a:prstGeom>
+          <a:ln>
+            <a:solidFill>
+              <a:schemeClr val="accent3">
+                <a:lumMod val="75000"/>
+              </a:schemeClr>
+            </a:solidFill>
+            <a:tailEnd type="arrow"/>
+          </a:ln>
+        </p:spPr>
+        <p:style>
+          <a:lnRef idx="2">
+            <a:schemeClr val="accent1"/>
+          </a:lnRef>
+          <a:fillRef idx="0">
+            <a:schemeClr val="accent1"/>
+          </a:fillRef>
+          <a:effectRef idx="1">
+            <a:schemeClr val="accent1"/>
+          </a:effectRef>
+          <a:fontRef idx="minor">
+            <a:schemeClr val="tx1"/>
+          </a:fontRef>
+        </p:style>
+      </p:cxnSp>
+      <p:cxnSp>
+        <p:nvCxnSpPr>
+          <p:cNvPr id="17" name="Gerade Verbindung mit Pfeil 16"/>
+          <p:cNvCxnSpPr/>
+          <p:nvPr/>
+        </p:nvCxnSpPr>
+        <p:spPr>
+          <a:xfrm flipV="1">
+            <a:off x="2858530" y="4020065"/>
+            <a:ext cx="2364259" cy="434545"/>
+          </a:xfrm>
+          <a:prstGeom prst="straightConnector1">
+            <a:avLst/>
+          </a:prstGeom>
+          <a:ln>
+            <a:solidFill>
+              <a:schemeClr val="accent3">
+                <a:lumMod val="75000"/>
+              </a:schemeClr>
+            </a:solidFill>
+            <a:tailEnd type="arrow"/>
+          </a:ln>
+        </p:spPr>
+        <p:style>
+          <a:lnRef idx="2">
+            <a:schemeClr val="accent1"/>
+          </a:lnRef>
+          <a:fillRef idx="0">
+            <a:schemeClr val="accent1"/>
+          </a:fillRef>
+          <a:effectRef idx="1">
+            <a:schemeClr val="accent1"/>
+          </a:effectRef>
+          <a:fontRef idx="minor">
+            <a:schemeClr val="tx1"/>
+          </a:fontRef>
+        </p:style>
+      </p:cxnSp>
+      <p:cxnSp>
+        <p:nvCxnSpPr>
+          <p:cNvPr id="19" name="Gerade Verbindung mit Pfeil 18"/>
+          <p:cNvCxnSpPr/>
+          <p:nvPr/>
+        </p:nvCxnSpPr>
+        <p:spPr>
+          <a:xfrm>
+            <a:off x="2858530" y="4815016"/>
+            <a:ext cx="2364259" cy="350108"/>
+          </a:xfrm>
+          <a:prstGeom prst="straightConnector1">
+            <a:avLst/>
+          </a:prstGeom>
+          <a:ln>
+            <a:solidFill>
+              <a:schemeClr val="accent3">
+                <a:lumMod val="75000"/>
+              </a:schemeClr>
+            </a:solidFill>
+            <a:tailEnd type="arrow"/>
+          </a:ln>
+        </p:spPr>
+        <p:style>
+          <a:lnRef idx="2">
+            <a:schemeClr val="accent1"/>
+          </a:lnRef>
+          <a:fillRef idx="0">
+            <a:schemeClr val="accent1"/>
+          </a:fillRef>
+          <a:effectRef idx="1">
+            <a:schemeClr val="accent1"/>
+          </a:effectRef>
+          <a:fontRef idx="minor">
+            <a:schemeClr val="tx1"/>
+          </a:fontRef>
+        </p:style>
+      </p:cxnSp>
+    </p:spTree>
+    <p:extLst>
+      <p:ext uri="{BB962C8B-B14F-4D97-AF65-F5344CB8AC3E}">
+        <p14:creationId xmlns:p14="http://schemas.microsoft.com/office/powerpoint/2010/main" val="1848859316"/>
+      </p:ext>
+    </p:extLst>
+  </p:cSld>
+  <p:clrMapOvr>
+    <a:masterClrMapping/>
+  </p:clrMapOvr>
+  <p:timing>
+    <p:tnLst>
+      <p:par>
+        <p:cTn id="1" dur="indefinite" restart="never" nodeType="tmRoot"/>
+      </p:par>
+    </p:tnLst>
+  </p:timing>
+</p:sld>
+</file>
+
+<file path=ppt/slides/slide17.xml><?xml version="1.0" encoding="utf-8"?>
+<p:sld xmlns:a="http://schemas.openxmlformats.org/drawingml/2006/main" xmlns:r="http://schemas.openxmlformats.org/officeDocument/2006/relationships" xmlns:p="http://schemas.openxmlformats.org/presentationml/2006/main">
+  <p:cSld>
+    <p:spTree>
+      <p:nvGrpSpPr>
+        <p:cNvPr id="1" name=""/>
+        <p:cNvGrpSpPr/>
+        <p:nvPr/>
+      </p:nvGrpSpPr>
+      <p:grpSpPr>
+        <a:xfrm>
+          <a:off x="0" y="0"/>
+          <a:ext cx="0" cy="0"/>
+          <a:chOff x="0" y="0"/>
+          <a:chExt cx="0" cy="0"/>
+        </a:xfrm>
+      </p:grpSpPr>
+      <p:sp>
+        <p:nvSpPr>
+          <p:cNvPr id="2" name="Titel 1"/>
+          <p:cNvSpPr>
+            <a:spLocks noGrp="1"/>
+          </p:cNvSpPr>
+          <p:nvPr>
+            <p:ph type="title"/>
+          </p:nvPr>
+        </p:nvSpPr>
+        <p:spPr/>
+        <p:txBody>
+          <a:bodyPr/>
+          <a:lstStyle/>
+          <a:p>
+            <a:r>
+              <a:rPr lang="en-US" dirty="0" smtClean="0"/>
+              <a:t>Map function</a:t>
+            </a:r>
+            <a:endParaRPr lang="de-AT" dirty="0"/>
+          </a:p>
+        </p:txBody>
+      </p:sp>
+      <p:sp>
+        <p:nvSpPr>
+          <p:cNvPr id="3" name="Inhaltsplatzhalter 2"/>
+          <p:cNvSpPr>
+            <a:spLocks noGrp="1"/>
+          </p:cNvSpPr>
+          <p:nvPr>
+            <p:ph idx="1"/>
+          </p:nvPr>
+        </p:nvSpPr>
+        <p:spPr/>
+        <p:txBody>
+          <a:bodyPr>
+            <a:normAutofit/>
+          </a:bodyPr>
+          <a:lstStyle/>
+          <a:p>
+            <a:pPr marL="0" indent="0">
+              <a:buNone/>
+            </a:pPr>
+            <a:endParaRPr lang="en-US" sz="2800" dirty="0" smtClean="0">
+              <a:latin typeface="Ubuntu Mono" pitchFamily="49" charset="0"/>
+              <a:cs typeface="Courier New" pitchFamily="49" charset="0"/>
+            </a:endParaRPr>
+          </a:p>
+          <a:p>
+            <a:pPr marL="0" indent="0">
+              <a:buNone/>
+            </a:pPr>
+            <a:r>
+              <a:rPr lang="en-US" sz="2800" dirty="0" smtClean="0">
+                <a:latin typeface="Ubuntu Mono" pitchFamily="49" charset="0"/>
+                <a:cs typeface="Courier New" pitchFamily="49" charset="0"/>
+              </a:rPr>
+              <a:t>function </a:t>
+            </a:r>
+            <a:r>
+              <a:rPr lang="en-US" sz="2800" dirty="0" smtClean="0">
+                <a:latin typeface="Ubuntu Mono" pitchFamily="49" charset="0"/>
+                <a:cs typeface="Courier New" pitchFamily="49" charset="0"/>
+              </a:rPr>
+              <a:t>map(line) {</a:t>
+            </a:r>
+          </a:p>
+          <a:p>
+            <a:pPr marL="0" indent="0">
+              <a:buNone/>
+            </a:pPr>
+            <a:r>
+              <a:rPr lang="en-US" sz="2800" dirty="0" smtClean="0">
+                <a:latin typeface="Ubuntu Mono" pitchFamily="49" charset="0"/>
+                <a:cs typeface="Courier New" pitchFamily="49" charset="0"/>
+              </a:rPr>
+              <a:t>	</a:t>
+            </a:r>
+            <a:r>
+              <a:rPr lang="en-US" sz="2800" dirty="0" err="1" smtClean="0">
+                <a:latin typeface="Ubuntu Mono" pitchFamily="49" charset="0"/>
+                <a:cs typeface="Courier New" pitchFamily="49" charset="0"/>
+              </a:rPr>
+              <a:t>line.split</a:t>
+            </a:r>
+            <a:r>
+              <a:rPr lang="en-US" sz="2800" dirty="0" smtClean="0">
+                <a:latin typeface="Ubuntu Mono" pitchFamily="49" charset="0"/>
+                <a:cs typeface="Courier New" pitchFamily="49" charset="0"/>
+              </a:rPr>
+              <a:t>(“ </a:t>
+            </a:r>
+            <a:r>
+              <a:rPr lang="en-US" sz="2800" dirty="0" smtClean="0">
+                <a:latin typeface="Ubuntu Mono" pitchFamily="49" charset="0"/>
+                <a:cs typeface="Courier New" pitchFamily="49" charset="0"/>
+              </a:rPr>
+              <a:t>”).</a:t>
+            </a:r>
+            <a:r>
+              <a:rPr lang="en-US" sz="2800" dirty="0" err="1" smtClean="0">
+                <a:latin typeface="Ubuntu Mono" pitchFamily="49" charset="0"/>
+                <a:cs typeface="Courier New" pitchFamily="49" charset="0"/>
+              </a:rPr>
+              <a:t>forEach</a:t>
+            </a:r>
+            <a:r>
+              <a:rPr lang="en-US" sz="2800" dirty="0" smtClean="0">
+                <a:latin typeface="Ubuntu Mono" pitchFamily="49" charset="0"/>
+                <a:cs typeface="Courier New" pitchFamily="49" charset="0"/>
+              </a:rPr>
+              <a:t>(function (word) {</a:t>
+            </a:r>
+          </a:p>
+          <a:p>
+            <a:pPr marL="0" indent="0">
+              <a:buNone/>
+            </a:pPr>
+            <a:r>
+              <a:rPr lang="en-US" sz="2800" dirty="0">
+                <a:latin typeface="Ubuntu Mono" pitchFamily="49" charset="0"/>
+                <a:cs typeface="Courier New" pitchFamily="49" charset="0"/>
+              </a:rPr>
+              <a:t>	</a:t>
+            </a:r>
+            <a:r>
+              <a:rPr lang="en-US" sz="2800" dirty="0" smtClean="0">
+                <a:latin typeface="Ubuntu Mono" pitchFamily="49" charset="0"/>
+                <a:cs typeface="Courier New" pitchFamily="49" charset="0"/>
+              </a:rPr>
+              <a:t>	emit(word, </a:t>
+            </a:r>
+            <a:r>
+              <a:rPr lang="en-US" sz="2800" dirty="0">
+                <a:latin typeface="Ubuntu Mono" pitchFamily="49" charset="0"/>
+                <a:cs typeface="Courier New" pitchFamily="49" charset="0"/>
+              </a:rPr>
+              <a:t>1</a:t>
+            </a:r>
+            <a:r>
+              <a:rPr lang="en-US" sz="2800" dirty="0" smtClean="0">
+                <a:latin typeface="Ubuntu Mono" pitchFamily="49" charset="0"/>
+                <a:cs typeface="Courier New" pitchFamily="49" charset="0"/>
+              </a:rPr>
+              <a:t>);</a:t>
+            </a:r>
+          </a:p>
+          <a:p>
+            <a:pPr marL="0" indent="0">
+              <a:buNone/>
+            </a:pPr>
+            <a:r>
+              <a:rPr lang="en-US" sz="2800" dirty="0" smtClean="0">
+                <a:latin typeface="Ubuntu Mono" pitchFamily="49" charset="0"/>
+                <a:cs typeface="Courier New" pitchFamily="49" charset="0"/>
+              </a:rPr>
+              <a:t>	});</a:t>
+            </a:r>
+            <a:endParaRPr lang="en-US" sz="2800" dirty="0">
+              <a:latin typeface="Ubuntu Mono" pitchFamily="49" charset="0"/>
+              <a:cs typeface="Courier New" pitchFamily="49" charset="0"/>
+            </a:endParaRPr>
+          </a:p>
+          <a:p>
+            <a:pPr marL="0" indent="0">
+              <a:buNone/>
+            </a:pPr>
+            <a:r>
+              <a:rPr lang="en-US" sz="2800" dirty="0" smtClean="0">
+                <a:latin typeface="Ubuntu Mono" pitchFamily="49" charset="0"/>
+                <a:cs typeface="Courier New" pitchFamily="49" charset="0"/>
+              </a:rPr>
+              <a:t>}</a:t>
+            </a:r>
+            <a:endParaRPr lang="de-AT" sz="2800" dirty="0">
+              <a:latin typeface="Ubuntu Mono" pitchFamily="49" charset="0"/>
+              <a:cs typeface="Courier New" pitchFamily="49" charset="0"/>
+            </a:endParaRPr>
+          </a:p>
+        </p:txBody>
+      </p:sp>
+    </p:spTree>
+    <p:extLst>
+      <p:ext uri="{BB962C8B-B14F-4D97-AF65-F5344CB8AC3E}">
+        <p14:creationId xmlns:p14="http://schemas.microsoft.com/office/powerpoint/2010/main" val="1515621653"/>
+      </p:ext>
+    </p:extLst>
+  </p:cSld>
+  <p:clrMapOvr>
+    <a:masterClrMapping/>
+  </p:clrMapOvr>
+  <p:timing>
+    <p:tnLst>
+      <p:par>
+        <p:cTn id="1" dur="indefinite" restart="never" nodeType="tmRoot"/>
+      </p:par>
+    </p:tnLst>
+  </p:timing>
+</p:sld>
+</file>
+
+<file path=ppt/slides/slide18.xml><?xml version="1.0" encoding="utf-8"?>
+<p:sld xmlns:a="http://schemas.openxmlformats.org/drawingml/2006/main" xmlns:r="http://schemas.openxmlformats.org/officeDocument/2006/relationships" xmlns:p="http://schemas.openxmlformats.org/presentationml/2006/main">
+  <p:cSld>
+    <p:spTree>
+      <p:nvGrpSpPr>
+        <p:cNvPr id="1" name=""/>
+        <p:cNvGrpSpPr/>
+        <p:nvPr/>
+      </p:nvGrpSpPr>
+      <p:grpSpPr>
+        <a:xfrm>
+          <a:off x="0" y="0"/>
+          <a:ext cx="0" cy="0"/>
+          <a:chOff x="0" y="0"/>
+          <a:chExt cx="0" cy="0"/>
+        </a:xfrm>
+      </p:grpSpPr>
+      <p:sp>
+        <p:nvSpPr>
+          <p:cNvPr id="2" name="Titel 1"/>
+          <p:cNvSpPr>
+            <a:spLocks noGrp="1"/>
+          </p:cNvSpPr>
+          <p:nvPr>
+            <p:ph type="title"/>
+          </p:nvPr>
+        </p:nvSpPr>
+        <p:spPr/>
+        <p:txBody>
+          <a:bodyPr/>
+          <a:lstStyle/>
+          <a:p>
+            <a:r>
+              <a:rPr lang="en-US" dirty="0" smtClean="0"/>
+              <a:t>Map output</a:t>
+            </a:r>
+            <a:endParaRPr lang="de-AT" dirty="0"/>
+          </a:p>
+        </p:txBody>
+      </p:sp>
+      <p:sp>
+        <p:nvSpPr>
+          <p:cNvPr id="3" name="Inhaltsplatzhalter 2"/>
+          <p:cNvSpPr>
+            <a:spLocks noGrp="1"/>
+          </p:cNvSpPr>
+          <p:nvPr>
+            <p:ph idx="1"/>
+          </p:nvPr>
+        </p:nvSpPr>
+        <p:spPr/>
+        <p:txBody>
+          <a:bodyPr>
+            <a:normAutofit fontScale="77500" lnSpcReduction="20000"/>
+          </a:bodyPr>
+          <a:lstStyle/>
+          <a:p>
+            <a:pPr marL="0" indent="0">
+              <a:buNone/>
+            </a:pPr>
+            <a:endParaRPr lang="en-US" dirty="0" smtClean="0">
+              <a:latin typeface="Ubuntu Mono" pitchFamily="49" charset="0"/>
+            </a:endParaRPr>
+          </a:p>
+          <a:p>
+            <a:pPr marL="400050" lvl="1" indent="0">
+              <a:buNone/>
+            </a:pPr>
+            <a:r>
+              <a:rPr lang="en-US" dirty="0" smtClean="0">
+                <a:latin typeface="Ubuntu Mono" pitchFamily="49" charset="0"/>
+              </a:rPr>
+              <a:t>grumpy, 1</a:t>
+            </a:r>
+            <a:br>
+              <a:rPr lang="en-US" dirty="0" smtClean="0">
+                <a:latin typeface="Ubuntu Mono" pitchFamily="49" charset="0"/>
+              </a:rPr>
+            </a:br>
+            <a:r>
+              <a:rPr lang="en-US" dirty="0" smtClean="0">
+                <a:latin typeface="Ubuntu Mono" pitchFamily="49" charset="0"/>
+              </a:rPr>
+              <a:t>cat, 1</a:t>
+            </a:r>
+            <a:r>
+              <a:rPr lang="en-US" dirty="0">
+                <a:latin typeface="Ubuntu Mono" pitchFamily="49" charset="0"/>
+              </a:rPr>
+              <a:t/>
+            </a:r>
+            <a:br>
+              <a:rPr lang="en-US" dirty="0">
+                <a:latin typeface="Ubuntu Mono" pitchFamily="49" charset="0"/>
+              </a:rPr>
+            </a:br>
+            <a:r>
+              <a:rPr lang="en-US" dirty="0" err="1" smtClean="0">
+                <a:latin typeface="Ubuntu Mono" pitchFamily="49" charset="0"/>
+              </a:rPr>
+              <a:t>steven</a:t>
+            </a:r>
+            <a:r>
+              <a:rPr lang="en-US" dirty="0" smtClean="0">
+                <a:latin typeface="Ubuntu Mono" pitchFamily="49" charset="0"/>
+              </a:rPr>
+              <a:t>, 1</a:t>
+            </a:r>
+            <a:r>
+              <a:rPr lang="en-US" dirty="0">
+                <a:latin typeface="Ubuntu Mono" pitchFamily="49" charset="0"/>
+              </a:rPr>
+              <a:t/>
+            </a:r>
+            <a:br>
+              <a:rPr lang="en-US" dirty="0">
+                <a:latin typeface="Ubuntu Mono" pitchFamily="49" charset="0"/>
+              </a:rPr>
+            </a:br>
+            <a:r>
+              <a:rPr lang="en-US" dirty="0" err="1" smtClean="0">
+                <a:latin typeface="Ubuntu Mono" pitchFamily="49" charset="0"/>
+              </a:rPr>
+              <a:t>seagal</a:t>
+            </a:r>
+            <a:r>
+              <a:rPr lang="en-US" dirty="0" smtClean="0">
+                <a:latin typeface="Ubuntu Mono" pitchFamily="49" charset="0"/>
+              </a:rPr>
+              <a:t>, </a:t>
+            </a:r>
+            <a:r>
+              <a:rPr lang="en-US" dirty="0">
+                <a:latin typeface="Ubuntu Mono" pitchFamily="49" charset="0"/>
+              </a:rPr>
+              <a:t>1</a:t>
+            </a:r>
+            <a:br>
+              <a:rPr lang="en-US" dirty="0">
+                <a:latin typeface="Ubuntu Mono" pitchFamily="49" charset="0"/>
+              </a:rPr>
+            </a:br>
+            <a:r>
+              <a:rPr lang="en-US" dirty="0" err="1" smtClean="0">
+                <a:latin typeface="Ubuntu Mono" pitchFamily="49" charset="0"/>
+              </a:rPr>
+              <a:t>jake</a:t>
+            </a:r>
+            <a:r>
+              <a:rPr lang="en-US" dirty="0" smtClean="0">
+                <a:latin typeface="Ubuntu Mono" pitchFamily="49" charset="0"/>
+              </a:rPr>
+              <a:t>, 1</a:t>
+            </a:r>
+            <a:br>
+              <a:rPr lang="en-US" dirty="0" smtClean="0">
+                <a:latin typeface="Ubuntu Mono" pitchFamily="49" charset="0"/>
+              </a:rPr>
+            </a:br>
+            <a:r>
+              <a:rPr lang="en-US" dirty="0" smtClean="0">
+                <a:latin typeface="Ubuntu Mono" pitchFamily="49" charset="0"/>
+              </a:rPr>
+              <a:t>the, 1</a:t>
+            </a:r>
+            <a:br>
+              <a:rPr lang="en-US" dirty="0" smtClean="0">
+                <a:latin typeface="Ubuntu Mono" pitchFamily="49" charset="0"/>
+              </a:rPr>
+            </a:br>
+            <a:r>
+              <a:rPr lang="en-US" dirty="0" smtClean="0">
+                <a:latin typeface="Ubuntu Mono" pitchFamily="49" charset="0"/>
+              </a:rPr>
+              <a:t>dog, </a:t>
+            </a:r>
+            <a:r>
+              <a:rPr lang="en-US" dirty="0">
+                <a:latin typeface="Ubuntu Mono" pitchFamily="49" charset="0"/>
+              </a:rPr>
+              <a:t>1</a:t>
+            </a:r>
+            <a:br>
+              <a:rPr lang="en-US" dirty="0">
+                <a:latin typeface="Ubuntu Mono" pitchFamily="49" charset="0"/>
+              </a:rPr>
+            </a:br>
+            <a:r>
+              <a:rPr lang="en-US" dirty="0" err="1" smtClean="0">
+                <a:latin typeface="Ubuntu Mono" pitchFamily="49" charset="0"/>
+              </a:rPr>
+              <a:t>finn</a:t>
+            </a:r>
+            <a:r>
+              <a:rPr lang="en-US" dirty="0" smtClean="0">
+                <a:latin typeface="Ubuntu Mono" pitchFamily="49" charset="0"/>
+              </a:rPr>
+              <a:t>, 1</a:t>
+            </a:r>
+            <a:br>
+              <a:rPr lang="en-US" dirty="0" smtClean="0">
+                <a:latin typeface="Ubuntu Mono" pitchFamily="49" charset="0"/>
+              </a:rPr>
+            </a:br>
+            <a:r>
+              <a:rPr lang="en-US" dirty="0" smtClean="0">
+                <a:latin typeface="Ubuntu Mono" pitchFamily="49" charset="0"/>
+              </a:rPr>
+              <a:t>the, 1</a:t>
+            </a:r>
+            <a:br>
+              <a:rPr lang="en-US" dirty="0" smtClean="0">
+                <a:latin typeface="Ubuntu Mono" pitchFamily="49" charset="0"/>
+              </a:rPr>
+            </a:br>
+            <a:r>
+              <a:rPr lang="en-US" dirty="0" smtClean="0">
+                <a:latin typeface="Ubuntu Mono" pitchFamily="49" charset="0"/>
+              </a:rPr>
+              <a:t>human, </a:t>
+            </a:r>
+            <a:r>
+              <a:rPr lang="en-US" dirty="0">
+                <a:latin typeface="Ubuntu Mono" pitchFamily="49" charset="0"/>
+              </a:rPr>
+              <a:t>1</a:t>
+            </a:r>
+            <a:br>
+              <a:rPr lang="en-US" dirty="0">
+                <a:latin typeface="Ubuntu Mono" pitchFamily="49" charset="0"/>
+              </a:rPr>
+            </a:br>
+            <a:r>
+              <a:rPr lang="en-US" dirty="0" smtClean="0">
+                <a:latin typeface="Ubuntu Mono" pitchFamily="49" charset="0"/>
+              </a:rPr>
+              <a:t>hover, 1</a:t>
+            </a:r>
+            <a:br>
+              <a:rPr lang="en-US" dirty="0" smtClean="0">
+                <a:latin typeface="Ubuntu Mono" pitchFamily="49" charset="0"/>
+              </a:rPr>
+            </a:br>
+            <a:r>
+              <a:rPr lang="en-US" dirty="0" smtClean="0">
+                <a:latin typeface="Ubuntu Mono" pitchFamily="49" charset="0"/>
+              </a:rPr>
+              <a:t>cat, </a:t>
+            </a:r>
+            <a:r>
+              <a:rPr lang="en-US" dirty="0">
+                <a:latin typeface="Ubuntu Mono" pitchFamily="49" charset="0"/>
+              </a:rPr>
+              <a:t>1</a:t>
+            </a:r>
+            <a:br>
+              <a:rPr lang="en-US" dirty="0">
+                <a:latin typeface="Ubuntu Mono" pitchFamily="49" charset="0"/>
+              </a:rPr>
+            </a:br>
+            <a:r>
+              <a:rPr lang="en-US" dirty="0" smtClean="0">
+                <a:latin typeface="Ubuntu Mono" pitchFamily="49" charset="0"/>
+              </a:rPr>
+              <a:t>grumpy, 1</a:t>
+            </a:r>
+            <a:br>
+              <a:rPr lang="en-US" dirty="0" smtClean="0">
+                <a:latin typeface="Ubuntu Mono" pitchFamily="49" charset="0"/>
+              </a:rPr>
+            </a:br>
+            <a:r>
+              <a:rPr lang="en-US" dirty="0" smtClean="0">
+                <a:latin typeface="Ubuntu Mono" pitchFamily="49" charset="0"/>
+              </a:rPr>
+              <a:t>grandma, </a:t>
+            </a:r>
+            <a:r>
+              <a:rPr lang="en-US" dirty="0">
+                <a:latin typeface="Ubuntu Mono" pitchFamily="49" charset="0"/>
+              </a:rPr>
+              <a:t>1</a:t>
+            </a:r>
+            <a:endParaRPr lang="de-AT" dirty="0">
+              <a:latin typeface="Ubuntu Mono" pitchFamily="49" charset="0"/>
+            </a:endParaRPr>
+          </a:p>
+          <a:p>
+            <a:pPr marL="0" indent="0">
+              <a:buNone/>
+            </a:pPr>
+            <a:endParaRPr lang="de-AT" dirty="0">
+              <a:latin typeface="Ubuntu Mono" pitchFamily="49" charset="0"/>
+            </a:endParaRPr>
+          </a:p>
+        </p:txBody>
+      </p:sp>
+      <p:sp>
+        <p:nvSpPr>
+          <p:cNvPr id="4" name="Textfeld 3"/>
           <p:cNvSpPr txBox="1"/>
           <p:nvPr/>
         </p:nvSpPr>
         <p:spPr>
           <a:xfrm>
-            <a:off x="280588" y="1319497"/>
-            <a:ext cx="7760446" cy="2308324"/>
+            <a:off x="6012923" y="1934639"/>
+            <a:ext cx="1047600" cy="646331"/>
           </a:xfrm>
           <a:prstGeom prst="rect">
             <a:avLst/>
           </a:prstGeom>
           <a:noFill/>
+          <a:ln>
+            <a:solidFill>
+              <a:schemeClr val="tx1"/>
+            </a:solidFill>
+          </a:ln>
         </p:spPr>
         <p:txBody>
           <a:bodyPr wrap="square" rtlCol="0">
@@ -4652,100 +7058,1118 @@
           </a:bodyPr>
           <a:lstStyle/>
           <a:p>
-            <a:r>
-              <a:rPr lang="de-DE" sz="4000" dirty="0" smtClean="0">
-                <a:solidFill>
-                  <a:schemeClr val="bg1"/>
-                </a:solidFill>
-              </a:rPr>
-              <a:t>Trennseite Calibri </a:t>
-            </a:r>
-            <a:r>
-              <a:rPr lang="de-DE" sz="4000" dirty="0">
-                <a:solidFill>
-                  <a:schemeClr val="bg1"/>
-                </a:solidFill>
-              </a:rPr>
-              <a:t>40 </a:t>
-            </a:r>
-            <a:r>
-              <a:rPr lang="de-DE" sz="4000" dirty="0" err="1">
-                <a:solidFill>
-                  <a:schemeClr val="bg1"/>
-                </a:solidFill>
-              </a:rPr>
-              <a:t>pkt</a:t>
-            </a:r>
-            <a:endParaRPr lang="de-DE" sz="4000" dirty="0">
-              <a:solidFill>
-                <a:schemeClr val="bg1"/>
-              </a:solidFill>
+            <a:pPr algn="ctr"/>
+            <a:r>
+              <a:rPr lang="en-US" dirty="0" smtClean="0">
+                <a:latin typeface="Ubuntu Mono" pitchFamily="49" charset="0"/>
+              </a:rPr>
+              <a:t>grumpy</a:t>
+            </a:r>
+          </a:p>
+          <a:p>
+            <a:pPr algn="ctr"/>
+            <a:r>
+              <a:rPr lang="en-US" dirty="0" smtClean="0">
+                <a:latin typeface="Ubuntu Mono" pitchFamily="49" charset="0"/>
+              </a:rPr>
+              <a:t>1, 1</a:t>
+            </a:r>
+            <a:endParaRPr lang="de-AT" dirty="0">
+              <a:latin typeface="Ubuntu Mono" pitchFamily="49" charset="0"/>
             </a:endParaRPr>
           </a:p>
-          <a:p>
-            <a:r>
-              <a:rPr lang="de-DE" sz="4000" dirty="0">
-                <a:solidFill>
-                  <a:schemeClr val="bg1"/>
-                </a:solidFill>
-              </a:rPr>
-              <a:t>FH JOANNEUM IN </a:t>
-            </a:r>
-            <a:r>
-              <a:rPr lang="de-DE" sz="4000" i="1" dirty="0" smtClean="0">
-                <a:solidFill>
-                  <a:schemeClr val="bg1"/>
-                </a:solidFill>
-                <a:latin typeface="Georgia"/>
-                <a:cs typeface="Georgia"/>
-              </a:rPr>
-              <a:t>Bewegung</a:t>
-            </a:r>
-          </a:p>
-          <a:p>
-            <a:endParaRPr lang="de-DE" sz="4000" i="1" dirty="0" smtClean="0">
-              <a:solidFill>
-                <a:schemeClr val="bg1"/>
-              </a:solidFill>
-              <a:latin typeface="Georgia"/>
-              <a:cs typeface="Georgia"/>
+        </p:txBody>
+      </p:sp>
+      <p:sp>
+        <p:nvSpPr>
+          <p:cNvPr id="5" name="Textfeld 4"/>
+          <p:cNvSpPr txBox="1"/>
+          <p:nvPr/>
+        </p:nvSpPr>
+        <p:spPr>
+          <a:xfrm>
+            <a:off x="6012924" y="2696924"/>
+            <a:ext cx="1047600" cy="646331"/>
+          </a:xfrm>
+          <a:prstGeom prst="rect">
+            <a:avLst/>
+          </a:prstGeom>
+          <a:noFill/>
+          <a:ln>
+            <a:solidFill>
+              <a:schemeClr val="tx1"/>
+            </a:solidFill>
+          </a:ln>
+        </p:spPr>
+        <p:txBody>
+          <a:bodyPr wrap="square" rtlCol="0">
+            <a:spAutoFit/>
+          </a:bodyPr>
+          <a:lstStyle/>
+          <a:p>
+            <a:pPr algn="ctr"/>
+            <a:r>
+              <a:rPr lang="en-US" dirty="0" smtClean="0">
+                <a:latin typeface="Ubuntu Mono" pitchFamily="49" charset="0"/>
+              </a:rPr>
+              <a:t>cat</a:t>
+            </a:r>
+          </a:p>
+          <a:p>
+            <a:pPr algn="ctr"/>
+            <a:r>
+              <a:rPr lang="en-US" dirty="0" smtClean="0">
+                <a:latin typeface="Ubuntu Mono" pitchFamily="49" charset="0"/>
+              </a:rPr>
+              <a:t>1, 1</a:t>
+            </a:r>
+            <a:endParaRPr lang="de-AT" dirty="0">
+              <a:latin typeface="Ubuntu Mono" pitchFamily="49" charset="0"/>
             </a:endParaRPr>
           </a:p>
-          <a:p>
-            <a:r>
-              <a:rPr lang="de-DE" sz="2400" i="1" dirty="0" smtClean="0">
-                <a:solidFill>
-                  <a:schemeClr val="bg1"/>
-                </a:solidFill>
-                <a:latin typeface="Georgia"/>
-                <a:cs typeface="Georgia"/>
-              </a:rPr>
-              <a:t>Auszeichnungen Georgia 24 </a:t>
-            </a:r>
-            <a:r>
-              <a:rPr lang="de-DE" sz="2400" i="1" dirty="0" err="1" smtClean="0">
-                <a:solidFill>
-                  <a:schemeClr val="bg1"/>
-                </a:solidFill>
-                <a:latin typeface="Georgia"/>
-                <a:cs typeface="Georgia"/>
-              </a:rPr>
-              <a:t>pkt</a:t>
-            </a:r>
-            <a:endParaRPr lang="de-DE" sz="2400" i="1" dirty="0">
-              <a:solidFill>
-                <a:schemeClr val="bg1"/>
-              </a:solidFill>
-              <a:latin typeface="Georgia"/>
-              <a:cs typeface="Georgia"/>
+        </p:txBody>
+      </p:sp>
+      <p:sp>
+        <p:nvSpPr>
+          <p:cNvPr id="6" name="Textfeld 5"/>
+          <p:cNvSpPr txBox="1"/>
+          <p:nvPr/>
+        </p:nvSpPr>
+        <p:spPr>
+          <a:xfrm>
+            <a:off x="6012923" y="3457035"/>
+            <a:ext cx="1047600" cy="646331"/>
+          </a:xfrm>
+          <a:prstGeom prst="rect">
+            <a:avLst/>
+          </a:prstGeom>
+          <a:noFill/>
+          <a:ln>
+            <a:solidFill>
+              <a:schemeClr val="tx1"/>
+            </a:solidFill>
+          </a:ln>
+        </p:spPr>
+        <p:txBody>
+          <a:bodyPr wrap="square" rtlCol="0">
+            <a:spAutoFit/>
+          </a:bodyPr>
+          <a:lstStyle/>
+          <a:p>
+            <a:pPr algn="ctr"/>
+            <a:r>
+              <a:rPr lang="en-US" dirty="0" err="1" smtClean="0">
+                <a:latin typeface="Ubuntu Mono" pitchFamily="49" charset="0"/>
+              </a:rPr>
+              <a:t>steven</a:t>
+            </a:r>
+            <a:endParaRPr lang="en-US" dirty="0" smtClean="0">
+              <a:latin typeface="Ubuntu Mono" pitchFamily="49" charset="0"/>
             </a:endParaRPr>
+          </a:p>
+          <a:p>
+            <a:pPr algn="ctr"/>
+            <a:r>
+              <a:rPr lang="en-US" dirty="0" smtClean="0">
+                <a:latin typeface="Ubuntu Mono" pitchFamily="49" charset="0"/>
+              </a:rPr>
+              <a:t>1</a:t>
+            </a:r>
+            <a:endParaRPr lang="de-AT" dirty="0">
+              <a:latin typeface="Ubuntu Mono" pitchFamily="49" charset="0"/>
+            </a:endParaRPr>
+          </a:p>
+        </p:txBody>
+      </p:sp>
+      <p:sp>
+        <p:nvSpPr>
+          <p:cNvPr id="7" name="Textfeld 6"/>
+          <p:cNvSpPr txBox="1"/>
+          <p:nvPr/>
+        </p:nvSpPr>
+        <p:spPr>
+          <a:xfrm>
+            <a:off x="6012923" y="4204448"/>
+            <a:ext cx="1047600" cy="646331"/>
+          </a:xfrm>
+          <a:prstGeom prst="rect">
+            <a:avLst/>
+          </a:prstGeom>
+          <a:noFill/>
+          <a:ln>
+            <a:solidFill>
+              <a:schemeClr val="tx1"/>
+            </a:solidFill>
+          </a:ln>
+        </p:spPr>
+        <p:txBody>
+          <a:bodyPr wrap="square" rtlCol="0">
+            <a:spAutoFit/>
+          </a:bodyPr>
+          <a:lstStyle/>
+          <a:p>
+            <a:pPr algn="ctr"/>
+            <a:r>
+              <a:rPr lang="en-US" dirty="0" err="1" smtClean="0">
+                <a:latin typeface="Ubuntu Mono" pitchFamily="49" charset="0"/>
+              </a:rPr>
+              <a:t>seagal</a:t>
+            </a:r>
+            <a:endParaRPr lang="en-US" dirty="0" smtClean="0">
+              <a:latin typeface="Ubuntu Mono" pitchFamily="49" charset="0"/>
+            </a:endParaRPr>
+          </a:p>
+          <a:p>
+            <a:pPr algn="ctr"/>
+            <a:r>
+              <a:rPr lang="en-US" dirty="0" smtClean="0">
+                <a:latin typeface="Ubuntu Mono" pitchFamily="49" charset="0"/>
+              </a:rPr>
+              <a:t>1</a:t>
+            </a:r>
+            <a:endParaRPr lang="de-AT" dirty="0">
+              <a:latin typeface="Ubuntu Mono" pitchFamily="49" charset="0"/>
+            </a:endParaRPr>
+          </a:p>
+        </p:txBody>
+      </p:sp>
+      <p:sp>
+        <p:nvSpPr>
+          <p:cNvPr id="8" name="Textfeld 7"/>
+          <p:cNvSpPr txBox="1"/>
+          <p:nvPr/>
+        </p:nvSpPr>
+        <p:spPr>
+          <a:xfrm>
+            <a:off x="6012923" y="4937616"/>
+            <a:ext cx="1047600" cy="646331"/>
+          </a:xfrm>
+          <a:prstGeom prst="rect">
+            <a:avLst/>
+          </a:prstGeom>
+          <a:noFill/>
+          <a:ln>
+            <a:solidFill>
+              <a:schemeClr val="tx1"/>
+            </a:solidFill>
+          </a:ln>
+        </p:spPr>
+        <p:txBody>
+          <a:bodyPr wrap="square" rtlCol="0">
+            <a:spAutoFit/>
+          </a:bodyPr>
+          <a:lstStyle/>
+          <a:p>
+            <a:pPr algn="ctr"/>
+            <a:r>
+              <a:rPr lang="en-US" dirty="0" err="1" smtClean="0">
+                <a:latin typeface="Ubuntu Mono" pitchFamily="49" charset="0"/>
+              </a:rPr>
+              <a:t>jake</a:t>
+            </a:r>
+            <a:endParaRPr lang="en-US" dirty="0" smtClean="0">
+              <a:latin typeface="Ubuntu Mono" pitchFamily="49" charset="0"/>
+            </a:endParaRPr>
+          </a:p>
+          <a:p>
+            <a:pPr algn="ctr"/>
+            <a:r>
+              <a:rPr lang="en-US" dirty="0">
+                <a:latin typeface="Ubuntu Mono" pitchFamily="49" charset="0"/>
+              </a:rPr>
+              <a:t>1</a:t>
+            </a:r>
+            <a:endParaRPr lang="de-AT" dirty="0">
+              <a:latin typeface="Ubuntu Mono" pitchFamily="49" charset="0"/>
+            </a:endParaRPr>
+          </a:p>
+        </p:txBody>
+      </p:sp>
+      <p:sp>
+        <p:nvSpPr>
+          <p:cNvPr id="9" name="Textfeld 8"/>
+          <p:cNvSpPr txBox="1"/>
+          <p:nvPr/>
+        </p:nvSpPr>
+        <p:spPr>
+          <a:xfrm>
+            <a:off x="6012924" y="5671123"/>
+            <a:ext cx="1047600" cy="646331"/>
+          </a:xfrm>
+          <a:prstGeom prst="rect">
+            <a:avLst/>
+          </a:prstGeom>
+          <a:noFill/>
+          <a:ln>
+            <a:solidFill>
+              <a:schemeClr val="tx1"/>
+            </a:solidFill>
+          </a:ln>
+        </p:spPr>
+        <p:txBody>
+          <a:bodyPr wrap="square" rtlCol="0">
+            <a:spAutoFit/>
+          </a:bodyPr>
+          <a:lstStyle/>
+          <a:p>
+            <a:pPr algn="ctr"/>
+            <a:r>
+              <a:rPr lang="en-US" dirty="0" smtClean="0">
+                <a:latin typeface="Ubuntu Mono" pitchFamily="49" charset="0"/>
+              </a:rPr>
+              <a:t>the</a:t>
+            </a:r>
+          </a:p>
+          <a:p>
+            <a:pPr algn="ctr"/>
+            <a:r>
+              <a:rPr lang="en-US" dirty="0" smtClean="0">
+                <a:latin typeface="Ubuntu Mono" pitchFamily="49" charset="0"/>
+              </a:rPr>
+              <a:t>1, 1</a:t>
+            </a:r>
+            <a:endParaRPr lang="de-AT" dirty="0">
+              <a:latin typeface="Ubuntu Mono" pitchFamily="49" charset="0"/>
+            </a:endParaRPr>
+          </a:p>
+        </p:txBody>
+      </p:sp>
+      <p:sp>
+        <p:nvSpPr>
+          <p:cNvPr id="10" name="Textfeld 9"/>
+          <p:cNvSpPr txBox="1"/>
+          <p:nvPr/>
+        </p:nvSpPr>
+        <p:spPr>
+          <a:xfrm>
+            <a:off x="7211529" y="2257804"/>
+            <a:ext cx="1047600" cy="646331"/>
+          </a:xfrm>
+          <a:prstGeom prst="rect">
+            <a:avLst/>
+          </a:prstGeom>
+          <a:noFill/>
+          <a:ln>
+            <a:solidFill>
+              <a:schemeClr val="tx1"/>
+            </a:solidFill>
+          </a:ln>
+        </p:spPr>
+        <p:txBody>
+          <a:bodyPr wrap="square" rtlCol="0">
+            <a:spAutoFit/>
+          </a:bodyPr>
+          <a:lstStyle/>
+          <a:p>
+            <a:pPr algn="ctr"/>
+            <a:r>
+              <a:rPr lang="en-US" dirty="0" smtClean="0">
+                <a:latin typeface="Ubuntu Mono" pitchFamily="49" charset="0"/>
+              </a:rPr>
+              <a:t>dog</a:t>
+            </a:r>
+          </a:p>
+          <a:p>
+            <a:pPr algn="ctr"/>
+            <a:r>
+              <a:rPr lang="en-US" dirty="0" smtClean="0">
+                <a:latin typeface="Ubuntu Mono" pitchFamily="49" charset="0"/>
+              </a:rPr>
+              <a:t>1</a:t>
+            </a:r>
+            <a:endParaRPr lang="de-AT" dirty="0">
+              <a:latin typeface="Ubuntu Mono" pitchFamily="49" charset="0"/>
+            </a:endParaRPr>
+          </a:p>
+        </p:txBody>
+      </p:sp>
+      <p:sp>
+        <p:nvSpPr>
+          <p:cNvPr id="11" name="Textfeld 10"/>
+          <p:cNvSpPr txBox="1"/>
+          <p:nvPr/>
+        </p:nvSpPr>
+        <p:spPr>
+          <a:xfrm>
+            <a:off x="7211529" y="3040343"/>
+            <a:ext cx="1047600" cy="646331"/>
+          </a:xfrm>
+          <a:prstGeom prst="rect">
+            <a:avLst/>
+          </a:prstGeom>
+          <a:noFill/>
+          <a:ln>
+            <a:solidFill>
+              <a:schemeClr val="tx1"/>
+            </a:solidFill>
+          </a:ln>
+        </p:spPr>
+        <p:txBody>
+          <a:bodyPr wrap="square" rtlCol="0">
+            <a:spAutoFit/>
+          </a:bodyPr>
+          <a:lstStyle/>
+          <a:p>
+            <a:pPr algn="ctr"/>
+            <a:r>
+              <a:rPr lang="en-US" dirty="0" err="1" smtClean="0">
+                <a:latin typeface="Ubuntu Mono" pitchFamily="49" charset="0"/>
+              </a:rPr>
+              <a:t>finn</a:t>
+            </a:r>
+            <a:endParaRPr lang="en-US" dirty="0" smtClean="0">
+              <a:latin typeface="Ubuntu Mono" pitchFamily="49" charset="0"/>
+            </a:endParaRPr>
+          </a:p>
+          <a:p>
+            <a:pPr algn="ctr"/>
+            <a:r>
+              <a:rPr lang="en-US" dirty="0" smtClean="0">
+                <a:latin typeface="Ubuntu Mono" pitchFamily="49" charset="0"/>
+              </a:rPr>
+              <a:t>1</a:t>
+            </a:r>
+            <a:endParaRPr lang="de-AT" dirty="0">
+              <a:latin typeface="Ubuntu Mono" pitchFamily="49" charset="0"/>
+            </a:endParaRPr>
+          </a:p>
+        </p:txBody>
+      </p:sp>
+      <p:sp>
+        <p:nvSpPr>
+          <p:cNvPr id="12" name="Textfeld 11"/>
+          <p:cNvSpPr txBox="1"/>
+          <p:nvPr/>
+        </p:nvSpPr>
+        <p:spPr>
+          <a:xfrm>
+            <a:off x="7211529" y="3804573"/>
+            <a:ext cx="1047600" cy="646331"/>
+          </a:xfrm>
+          <a:prstGeom prst="rect">
+            <a:avLst/>
+          </a:prstGeom>
+          <a:noFill/>
+          <a:ln>
+            <a:solidFill>
+              <a:schemeClr val="tx1"/>
+            </a:solidFill>
+          </a:ln>
+        </p:spPr>
+        <p:txBody>
+          <a:bodyPr wrap="square" rtlCol="0">
+            <a:spAutoFit/>
+          </a:bodyPr>
+          <a:lstStyle/>
+          <a:p>
+            <a:pPr algn="ctr"/>
+            <a:r>
+              <a:rPr lang="en-US" dirty="0" smtClean="0">
+                <a:latin typeface="Ubuntu Mono" pitchFamily="49" charset="0"/>
+              </a:rPr>
+              <a:t>human</a:t>
+            </a:r>
+          </a:p>
+          <a:p>
+            <a:pPr algn="ctr"/>
+            <a:r>
+              <a:rPr lang="en-US" dirty="0" smtClean="0">
+                <a:latin typeface="Ubuntu Mono" pitchFamily="49" charset="0"/>
+              </a:rPr>
+              <a:t>1</a:t>
+            </a:r>
+            <a:endParaRPr lang="de-AT" dirty="0">
+              <a:latin typeface="Ubuntu Mono" pitchFamily="49" charset="0"/>
+            </a:endParaRPr>
+          </a:p>
+        </p:txBody>
+      </p:sp>
+      <p:sp>
+        <p:nvSpPr>
+          <p:cNvPr id="13" name="Textfeld 12"/>
+          <p:cNvSpPr txBox="1"/>
+          <p:nvPr/>
+        </p:nvSpPr>
+        <p:spPr>
+          <a:xfrm>
+            <a:off x="7211529" y="4569140"/>
+            <a:ext cx="1047600" cy="646331"/>
+          </a:xfrm>
+          <a:prstGeom prst="rect">
+            <a:avLst/>
+          </a:prstGeom>
+          <a:noFill/>
+          <a:ln>
+            <a:solidFill>
+              <a:schemeClr val="tx1"/>
+            </a:solidFill>
+          </a:ln>
+        </p:spPr>
+        <p:txBody>
+          <a:bodyPr wrap="square" rtlCol="0">
+            <a:spAutoFit/>
+          </a:bodyPr>
+          <a:lstStyle/>
+          <a:p>
+            <a:pPr algn="ctr"/>
+            <a:r>
+              <a:rPr lang="en-US" dirty="0" smtClean="0">
+                <a:latin typeface="Ubuntu Mono" pitchFamily="49" charset="0"/>
+              </a:rPr>
+              <a:t>hover</a:t>
+            </a:r>
+          </a:p>
+          <a:p>
+            <a:pPr algn="ctr"/>
+            <a:r>
+              <a:rPr lang="en-US" dirty="0" smtClean="0">
+                <a:latin typeface="Ubuntu Mono" pitchFamily="49" charset="0"/>
+              </a:rPr>
+              <a:t>1</a:t>
+            </a:r>
+            <a:endParaRPr lang="de-AT" dirty="0">
+              <a:latin typeface="Ubuntu Mono" pitchFamily="49" charset="0"/>
+            </a:endParaRPr>
+          </a:p>
+        </p:txBody>
+      </p:sp>
+      <p:sp>
+        <p:nvSpPr>
+          <p:cNvPr id="14" name="Textfeld 13"/>
+          <p:cNvSpPr txBox="1"/>
+          <p:nvPr/>
+        </p:nvSpPr>
+        <p:spPr>
+          <a:xfrm>
+            <a:off x="7211529" y="5315006"/>
+            <a:ext cx="1047600" cy="646331"/>
+          </a:xfrm>
+          <a:prstGeom prst="rect">
+            <a:avLst/>
+          </a:prstGeom>
+          <a:noFill/>
+          <a:ln>
+            <a:solidFill>
+              <a:schemeClr val="tx1"/>
+            </a:solidFill>
+          </a:ln>
+        </p:spPr>
+        <p:txBody>
+          <a:bodyPr wrap="square" rtlCol="0">
+            <a:spAutoFit/>
+          </a:bodyPr>
+          <a:lstStyle/>
+          <a:p>
+            <a:pPr algn="ctr"/>
+            <a:r>
+              <a:rPr lang="en-US" dirty="0" smtClean="0">
+                <a:latin typeface="Ubuntu Mono" pitchFamily="49" charset="0"/>
+              </a:rPr>
+              <a:t>grandma</a:t>
+            </a:r>
+          </a:p>
+          <a:p>
+            <a:pPr algn="ctr"/>
+            <a:r>
+              <a:rPr lang="en-US" dirty="0" smtClean="0">
+                <a:latin typeface="Ubuntu Mono" pitchFamily="49" charset="0"/>
+              </a:rPr>
+              <a:t>1</a:t>
+            </a:r>
+            <a:endParaRPr lang="de-AT" dirty="0">
+              <a:latin typeface="Ubuntu Mono" pitchFamily="49" charset="0"/>
+            </a:endParaRPr>
+          </a:p>
+        </p:txBody>
+      </p:sp>
+      <p:sp>
+        <p:nvSpPr>
+          <p:cNvPr id="15" name="Pfeil nach rechts 14"/>
+          <p:cNvSpPr/>
+          <p:nvPr/>
+        </p:nvSpPr>
+        <p:spPr>
+          <a:xfrm>
+            <a:off x="3097430" y="3552713"/>
+            <a:ext cx="2298357" cy="882466"/>
+          </a:xfrm>
+          <a:prstGeom prst="rightArrow">
+            <a:avLst/>
+          </a:prstGeom>
+        </p:spPr>
+        <p:style>
+          <a:lnRef idx="1">
+            <a:schemeClr val="accent1"/>
+          </a:lnRef>
+          <a:fillRef idx="3">
+            <a:schemeClr val="accent1"/>
+          </a:fillRef>
+          <a:effectRef idx="2">
+            <a:schemeClr val="accent1"/>
+          </a:effectRef>
+          <a:fontRef idx="minor">
+            <a:schemeClr val="lt1"/>
+          </a:fontRef>
+        </p:style>
+        <p:txBody>
+          <a:bodyPr rtlCol="0" anchor="ctr"/>
+          <a:lstStyle/>
+          <a:p>
+            <a:pPr algn="ctr"/>
+            <a:r>
+              <a:rPr lang="en-US" dirty="0" smtClean="0"/>
+              <a:t>shuffle</a:t>
+            </a:r>
+            <a:endParaRPr lang="de-AT" dirty="0"/>
           </a:p>
         </p:txBody>
       </p:sp>
     </p:spTree>
     <p:extLst>
       <p:ext uri="{BB962C8B-B14F-4D97-AF65-F5344CB8AC3E}">
-        <p14:creationId xmlns:p14="http://schemas.microsoft.com/office/powerpoint/2010/main" val="2055451195"/>
+        <p14:creationId xmlns:p14="http://schemas.microsoft.com/office/powerpoint/2010/main" val="94525830"/>
+      </p:ext>
+    </p:extLst>
+  </p:cSld>
+  <p:clrMapOvr>
+    <a:masterClrMapping/>
+  </p:clrMapOvr>
+  <p:timing>
+    <p:tnLst>
+      <p:par>
+        <p:cTn id="1" dur="indefinite" restart="never" nodeType="tmRoot"/>
+      </p:par>
+    </p:tnLst>
+  </p:timing>
+</p:sld>
+</file>
+
+<file path=ppt/slides/slide19.xml><?xml version="1.0" encoding="utf-8"?>
+<p:sld xmlns:a="http://schemas.openxmlformats.org/drawingml/2006/main" xmlns:r="http://schemas.openxmlformats.org/officeDocument/2006/relationships" xmlns:p="http://schemas.openxmlformats.org/presentationml/2006/main">
+  <p:cSld>
+    <p:spTree>
+      <p:nvGrpSpPr>
+        <p:cNvPr id="1" name=""/>
+        <p:cNvGrpSpPr/>
+        <p:nvPr/>
+      </p:nvGrpSpPr>
+      <p:grpSpPr>
+        <a:xfrm>
+          <a:off x="0" y="0"/>
+          <a:ext cx="0" cy="0"/>
+          <a:chOff x="0" y="0"/>
+          <a:chExt cx="0" cy="0"/>
+        </a:xfrm>
+      </p:grpSpPr>
+      <p:sp>
+        <p:nvSpPr>
+          <p:cNvPr id="2" name="Titel 1"/>
+          <p:cNvSpPr>
+            <a:spLocks noGrp="1"/>
+          </p:cNvSpPr>
+          <p:nvPr>
+            <p:ph type="title"/>
+          </p:nvPr>
+        </p:nvSpPr>
+        <p:spPr/>
+        <p:txBody>
+          <a:bodyPr/>
+          <a:lstStyle/>
+          <a:p>
+            <a:r>
+              <a:rPr lang="en-US" dirty="0" smtClean="0"/>
+              <a:t>Reduce phase</a:t>
+            </a:r>
+            <a:endParaRPr lang="de-AT" dirty="0"/>
+          </a:p>
+        </p:txBody>
+      </p:sp>
+      <p:sp>
+        <p:nvSpPr>
+          <p:cNvPr id="3" name="Inhaltsplatzhalter 2"/>
+          <p:cNvSpPr>
+            <a:spLocks noGrp="1"/>
+          </p:cNvSpPr>
+          <p:nvPr>
+            <p:ph idx="1"/>
+          </p:nvPr>
+        </p:nvSpPr>
+        <p:spPr/>
+        <p:txBody>
+          <a:bodyPr/>
+          <a:lstStyle/>
+          <a:p>
+            <a:endParaRPr lang="de-AT"/>
+          </a:p>
+        </p:txBody>
+      </p:sp>
+      <p:sp>
+        <p:nvSpPr>
+          <p:cNvPr id="4" name="Textfeld 3"/>
+          <p:cNvSpPr txBox="1"/>
+          <p:nvPr/>
+        </p:nvSpPr>
+        <p:spPr>
+          <a:xfrm>
+            <a:off x="1012555" y="2563232"/>
+            <a:ext cx="1047600" cy="646331"/>
+          </a:xfrm>
+          <a:prstGeom prst="rect">
+            <a:avLst/>
+          </a:prstGeom>
+          <a:noFill/>
+          <a:ln>
+            <a:solidFill>
+              <a:schemeClr val="tx1"/>
+            </a:solidFill>
+          </a:ln>
+        </p:spPr>
+        <p:txBody>
+          <a:bodyPr wrap="square" rtlCol="0">
+            <a:spAutoFit/>
+          </a:bodyPr>
+          <a:lstStyle/>
+          <a:p>
+            <a:pPr algn="ctr"/>
+            <a:r>
+              <a:rPr lang="en-US" dirty="0" smtClean="0">
+                <a:latin typeface="Ubuntu Mono" pitchFamily="49" charset="0"/>
+              </a:rPr>
+              <a:t>grumpy</a:t>
+            </a:r>
+          </a:p>
+          <a:p>
+            <a:pPr algn="ctr"/>
+            <a:r>
+              <a:rPr lang="en-US" dirty="0" smtClean="0">
+                <a:latin typeface="Ubuntu Mono" pitchFamily="49" charset="0"/>
+              </a:rPr>
+              <a:t>1, 1</a:t>
+            </a:r>
+            <a:endParaRPr lang="de-AT" dirty="0">
+              <a:latin typeface="Ubuntu Mono" pitchFamily="49" charset="0"/>
+            </a:endParaRPr>
+          </a:p>
+        </p:txBody>
+      </p:sp>
+      <p:sp>
+        <p:nvSpPr>
+          <p:cNvPr id="5" name="Textfeld 4"/>
+          <p:cNvSpPr txBox="1"/>
+          <p:nvPr/>
+        </p:nvSpPr>
+        <p:spPr>
+          <a:xfrm>
+            <a:off x="1012556" y="3325517"/>
+            <a:ext cx="1047600" cy="646331"/>
+          </a:xfrm>
+          <a:prstGeom prst="rect">
+            <a:avLst/>
+          </a:prstGeom>
+          <a:noFill/>
+          <a:ln>
+            <a:solidFill>
+              <a:schemeClr val="tx1"/>
+            </a:solidFill>
+          </a:ln>
+        </p:spPr>
+        <p:txBody>
+          <a:bodyPr wrap="square" rtlCol="0">
+            <a:spAutoFit/>
+          </a:bodyPr>
+          <a:lstStyle/>
+          <a:p>
+            <a:pPr algn="ctr"/>
+            <a:r>
+              <a:rPr lang="en-US" dirty="0" smtClean="0">
+                <a:latin typeface="Ubuntu Mono" pitchFamily="49" charset="0"/>
+              </a:rPr>
+              <a:t>cat</a:t>
+            </a:r>
+          </a:p>
+          <a:p>
+            <a:pPr algn="ctr"/>
+            <a:r>
+              <a:rPr lang="en-US" dirty="0" smtClean="0">
+                <a:latin typeface="Ubuntu Mono" pitchFamily="49" charset="0"/>
+              </a:rPr>
+              <a:t>1, 1</a:t>
+            </a:r>
+            <a:endParaRPr lang="de-AT" dirty="0">
+              <a:latin typeface="Ubuntu Mono" pitchFamily="49" charset="0"/>
+            </a:endParaRPr>
+          </a:p>
+        </p:txBody>
+      </p:sp>
+      <p:sp>
+        <p:nvSpPr>
+          <p:cNvPr id="6" name="Textfeld 5"/>
+          <p:cNvSpPr txBox="1"/>
+          <p:nvPr/>
+        </p:nvSpPr>
+        <p:spPr>
+          <a:xfrm>
+            <a:off x="1012555" y="4085628"/>
+            <a:ext cx="1047600" cy="646331"/>
+          </a:xfrm>
+          <a:prstGeom prst="rect">
+            <a:avLst/>
+          </a:prstGeom>
+          <a:noFill/>
+          <a:ln>
+            <a:solidFill>
+              <a:schemeClr val="tx1"/>
+            </a:solidFill>
+          </a:ln>
+        </p:spPr>
+        <p:txBody>
+          <a:bodyPr wrap="square" rtlCol="0">
+            <a:spAutoFit/>
+          </a:bodyPr>
+          <a:lstStyle/>
+          <a:p>
+            <a:pPr algn="ctr"/>
+            <a:r>
+              <a:rPr lang="en-US" dirty="0" err="1" smtClean="0">
+                <a:latin typeface="Ubuntu Mono" pitchFamily="49" charset="0"/>
+              </a:rPr>
+              <a:t>steven</a:t>
+            </a:r>
+            <a:endParaRPr lang="en-US" dirty="0" smtClean="0">
+              <a:latin typeface="Ubuntu Mono" pitchFamily="49" charset="0"/>
+            </a:endParaRPr>
+          </a:p>
+          <a:p>
+            <a:pPr algn="ctr"/>
+            <a:r>
+              <a:rPr lang="en-US" dirty="0" smtClean="0">
+                <a:latin typeface="Ubuntu Mono" pitchFamily="49" charset="0"/>
+              </a:rPr>
+              <a:t>1</a:t>
+            </a:r>
+            <a:endParaRPr lang="de-AT" dirty="0">
+              <a:latin typeface="Ubuntu Mono" pitchFamily="49" charset="0"/>
+            </a:endParaRPr>
+          </a:p>
+        </p:txBody>
+      </p:sp>
+      <p:sp>
+        <p:nvSpPr>
+          <p:cNvPr id="7" name="Textfeld 6"/>
+          <p:cNvSpPr txBox="1"/>
+          <p:nvPr/>
+        </p:nvSpPr>
+        <p:spPr>
+          <a:xfrm>
+            <a:off x="1012555" y="4833041"/>
+            <a:ext cx="1047600" cy="646331"/>
+          </a:xfrm>
+          <a:prstGeom prst="rect">
+            <a:avLst/>
+          </a:prstGeom>
+          <a:noFill/>
+          <a:ln>
+            <a:solidFill>
+              <a:schemeClr val="tx1"/>
+            </a:solidFill>
+          </a:ln>
+        </p:spPr>
+        <p:txBody>
+          <a:bodyPr wrap="square" rtlCol="0">
+            <a:spAutoFit/>
+          </a:bodyPr>
+          <a:lstStyle/>
+          <a:p>
+            <a:pPr algn="ctr"/>
+            <a:r>
+              <a:rPr lang="en-US" dirty="0" err="1" smtClean="0">
+                <a:latin typeface="Ubuntu Mono" pitchFamily="49" charset="0"/>
+              </a:rPr>
+              <a:t>seagal</a:t>
+            </a:r>
+            <a:endParaRPr lang="en-US" dirty="0" smtClean="0">
+              <a:latin typeface="Ubuntu Mono" pitchFamily="49" charset="0"/>
+            </a:endParaRPr>
+          </a:p>
+          <a:p>
+            <a:pPr algn="ctr"/>
+            <a:r>
+              <a:rPr lang="en-US" dirty="0" smtClean="0">
+                <a:latin typeface="Ubuntu Mono" pitchFamily="49" charset="0"/>
+              </a:rPr>
+              <a:t>1</a:t>
+            </a:r>
+            <a:endParaRPr lang="de-AT" dirty="0">
+              <a:latin typeface="Ubuntu Mono" pitchFamily="49" charset="0"/>
+            </a:endParaRPr>
+          </a:p>
+        </p:txBody>
+      </p:sp>
+      <p:sp>
+        <p:nvSpPr>
+          <p:cNvPr id="8" name="Abgerundetes Rechteck 7"/>
+          <p:cNvSpPr/>
+          <p:nvPr/>
+        </p:nvSpPr>
+        <p:spPr>
+          <a:xfrm>
+            <a:off x="5338116" y="2660480"/>
+            <a:ext cx="1458097" cy="691979"/>
+          </a:xfrm>
+          <a:prstGeom prst="roundRect">
+            <a:avLst/>
+          </a:prstGeom>
+        </p:spPr>
+        <p:style>
+          <a:lnRef idx="1">
+            <a:schemeClr val="accent1"/>
+          </a:lnRef>
+          <a:fillRef idx="3">
+            <a:schemeClr val="accent1"/>
+          </a:fillRef>
+          <a:effectRef idx="2">
+            <a:schemeClr val="accent1"/>
+          </a:effectRef>
+          <a:fontRef idx="minor">
+            <a:schemeClr val="lt1"/>
+          </a:fontRef>
+        </p:style>
+        <p:txBody>
+          <a:bodyPr rtlCol="0" anchor="ctr"/>
+          <a:lstStyle/>
+          <a:p>
+            <a:pPr algn="ctr"/>
+            <a:r>
+              <a:rPr lang="en-US" dirty="0" smtClean="0"/>
+              <a:t>Reduce 1</a:t>
+            </a:r>
+            <a:endParaRPr lang="de-AT" dirty="0"/>
+          </a:p>
+        </p:txBody>
+      </p:sp>
+      <p:sp>
+        <p:nvSpPr>
+          <p:cNvPr id="9" name="Abgerundetes Rechteck 8"/>
+          <p:cNvSpPr/>
+          <p:nvPr/>
+        </p:nvSpPr>
+        <p:spPr>
+          <a:xfrm>
+            <a:off x="5338114" y="3656920"/>
+            <a:ext cx="1458097" cy="691979"/>
+          </a:xfrm>
+          <a:prstGeom prst="roundRect">
+            <a:avLst/>
+          </a:prstGeom>
+        </p:spPr>
+        <p:style>
+          <a:lnRef idx="1">
+            <a:schemeClr val="accent1"/>
+          </a:lnRef>
+          <a:fillRef idx="3">
+            <a:schemeClr val="accent1"/>
+          </a:fillRef>
+          <a:effectRef idx="2">
+            <a:schemeClr val="accent1"/>
+          </a:effectRef>
+          <a:fontRef idx="minor">
+            <a:schemeClr val="lt1"/>
+          </a:fontRef>
+        </p:style>
+        <p:txBody>
+          <a:bodyPr rtlCol="0" anchor="ctr"/>
+          <a:lstStyle/>
+          <a:p>
+            <a:pPr algn="ctr"/>
+            <a:r>
+              <a:rPr lang="en-US" dirty="0" smtClean="0"/>
+              <a:t>Reduce 2</a:t>
+            </a:r>
+            <a:endParaRPr lang="de-AT" dirty="0"/>
+          </a:p>
+        </p:txBody>
+      </p:sp>
+      <p:sp>
+        <p:nvSpPr>
+          <p:cNvPr id="10" name="Abgerundetes Rechteck 9"/>
+          <p:cNvSpPr/>
+          <p:nvPr/>
+        </p:nvSpPr>
+        <p:spPr>
+          <a:xfrm>
+            <a:off x="5338115" y="4649240"/>
+            <a:ext cx="1458097" cy="691979"/>
+          </a:xfrm>
+          <a:prstGeom prst="roundRect">
+            <a:avLst/>
+          </a:prstGeom>
+        </p:spPr>
+        <p:style>
+          <a:lnRef idx="1">
+            <a:schemeClr val="accent1"/>
+          </a:lnRef>
+          <a:fillRef idx="3">
+            <a:schemeClr val="accent1"/>
+          </a:fillRef>
+          <a:effectRef idx="2">
+            <a:schemeClr val="accent1"/>
+          </a:effectRef>
+          <a:fontRef idx="minor">
+            <a:schemeClr val="lt1"/>
+          </a:fontRef>
+        </p:style>
+        <p:txBody>
+          <a:bodyPr rtlCol="0" anchor="ctr"/>
+          <a:lstStyle/>
+          <a:p>
+            <a:pPr algn="ctr"/>
+            <a:r>
+              <a:rPr lang="en-US" dirty="0" smtClean="0"/>
+              <a:t>Reduce 3</a:t>
+            </a:r>
+            <a:endParaRPr lang="de-AT" dirty="0"/>
+          </a:p>
+        </p:txBody>
+      </p:sp>
+      <p:cxnSp>
+        <p:nvCxnSpPr>
+          <p:cNvPr id="12" name="Gerade Verbindung mit Pfeil 11"/>
+          <p:cNvCxnSpPr/>
+          <p:nvPr/>
+        </p:nvCxnSpPr>
+        <p:spPr>
+          <a:xfrm>
+            <a:off x="2183027" y="2886397"/>
+            <a:ext cx="2965622" cy="120072"/>
+          </a:xfrm>
+          <a:prstGeom prst="straightConnector1">
+            <a:avLst/>
+          </a:prstGeom>
+          <a:ln>
+            <a:tailEnd type="arrow"/>
+          </a:ln>
+        </p:spPr>
+        <p:style>
+          <a:lnRef idx="2">
+            <a:schemeClr val="accent1"/>
+          </a:lnRef>
+          <a:fillRef idx="0">
+            <a:schemeClr val="accent1"/>
+          </a:fillRef>
+          <a:effectRef idx="1">
+            <a:schemeClr val="accent1"/>
+          </a:effectRef>
+          <a:fontRef idx="minor">
+            <a:schemeClr val="tx1"/>
+          </a:fontRef>
+        </p:style>
+      </p:cxnSp>
+      <p:cxnSp>
+        <p:nvCxnSpPr>
+          <p:cNvPr id="14" name="Gerade Verbindung mit Pfeil 13"/>
+          <p:cNvCxnSpPr/>
+          <p:nvPr/>
+        </p:nvCxnSpPr>
+        <p:spPr>
+          <a:xfrm>
+            <a:off x="2183027" y="3656920"/>
+            <a:ext cx="2965622" cy="1338309"/>
+          </a:xfrm>
+          <a:prstGeom prst="straightConnector1">
+            <a:avLst/>
+          </a:prstGeom>
+          <a:ln>
+            <a:tailEnd type="arrow"/>
+          </a:ln>
+        </p:spPr>
+        <p:style>
+          <a:lnRef idx="2">
+            <a:schemeClr val="accent1"/>
+          </a:lnRef>
+          <a:fillRef idx="0">
+            <a:schemeClr val="accent1"/>
+          </a:fillRef>
+          <a:effectRef idx="1">
+            <a:schemeClr val="accent1"/>
+          </a:effectRef>
+          <a:fontRef idx="minor">
+            <a:schemeClr val="tx1"/>
+          </a:fontRef>
+        </p:style>
+      </p:cxnSp>
+      <p:cxnSp>
+        <p:nvCxnSpPr>
+          <p:cNvPr id="16" name="Gerade Verbindung mit Pfeil 15"/>
+          <p:cNvCxnSpPr/>
+          <p:nvPr/>
+        </p:nvCxnSpPr>
+        <p:spPr>
+          <a:xfrm flipV="1">
+            <a:off x="2183027" y="3971848"/>
+            <a:ext cx="3023287" cy="436945"/>
+          </a:xfrm>
+          <a:prstGeom prst="straightConnector1">
+            <a:avLst/>
+          </a:prstGeom>
+          <a:ln>
+            <a:tailEnd type="arrow"/>
+          </a:ln>
+        </p:spPr>
+        <p:style>
+          <a:lnRef idx="2">
+            <a:schemeClr val="accent1"/>
+          </a:lnRef>
+          <a:fillRef idx="0">
+            <a:schemeClr val="accent1"/>
+          </a:fillRef>
+          <a:effectRef idx="1">
+            <a:schemeClr val="accent1"/>
+          </a:effectRef>
+          <a:fontRef idx="minor">
+            <a:schemeClr val="tx1"/>
+          </a:fontRef>
+        </p:style>
+      </p:cxnSp>
+      <p:cxnSp>
+        <p:nvCxnSpPr>
+          <p:cNvPr id="18" name="Gerade Verbindung mit Pfeil 17"/>
+          <p:cNvCxnSpPr/>
+          <p:nvPr/>
+        </p:nvCxnSpPr>
+        <p:spPr>
+          <a:xfrm flipV="1">
+            <a:off x="2183027" y="4190320"/>
+            <a:ext cx="3023287" cy="1048945"/>
+          </a:xfrm>
+          <a:prstGeom prst="straightConnector1">
+            <a:avLst/>
+          </a:prstGeom>
+          <a:ln>
+            <a:solidFill>
+              <a:schemeClr val="accent3"/>
+            </a:solidFill>
+            <a:tailEnd type="arrow"/>
+          </a:ln>
+        </p:spPr>
+        <p:style>
+          <a:lnRef idx="2">
+            <a:schemeClr val="accent1"/>
+          </a:lnRef>
+          <a:fillRef idx="0">
+            <a:schemeClr val="accent1"/>
+          </a:fillRef>
+          <a:effectRef idx="1">
+            <a:schemeClr val="accent1"/>
+          </a:effectRef>
+          <a:fontRef idx="minor">
+            <a:schemeClr val="tx1"/>
+          </a:fontRef>
+        </p:style>
+      </p:cxnSp>
+    </p:spTree>
+    <p:extLst>
+      <p:ext uri="{BB962C8B-B14F-4D97-AF65-F5344CB8AC3E}">
+        <p14:creationId xmlns:p14="http://schemas.microsoft.com/office/powerpoint/2010/main" val="3879574404"/>
       </p:ext>
     </p:extLst>
   </p:cSld>
@@ -4901,6 +8325,738 @@
     <p:extLst>
       <p:ext uri="{BB962C8B-B14F-4D97-AF65-F5344CB8AC3E}">
         <p14:creationId xmlns:p14="http://schemas.microsoft.com/office/powerpoint/2010/main" val="4193540369"/>
+      </p:ext>
+    </p:extLst>
+  </p:cSld>
+  <p:clrMapOvr>
+    <a:masterClrMapping/>
+  </p:clrMapOvr>
+  <p:timing>
+    <p:tnLst>
+      <p:par>
+        <p:cTn id="1" dur="indefinite" restart="never" nodeType="tmRoot"/>
+      </p:par>
+    </p:tnLst>
+  </p:timing>
+</p:sld>
+</file>
+
+<file path=ppt/slides/slide20.xml><?xml version="1.0" encoding="utf-8"?>
+<p:sld xmlns:a="http://schemas.openxmlformats.org/drawingml/2006/main" xmlns:r="http://schemas.openxmlformats.org/officeDocument/2006/relationships" xmlns:p="http://schemas.openxmlformats.org/presentationml/2006/main">
+  <p:cSld>
+    <p:spTree>
+      <p:nvGrpSpPr>
+        <p:cNvPr id="1" name=""/>
+        <p:cNvGrpSpPr/>
+        <p:nvPr/>
+      </p:nvGrpSpPr>
+      <p:grpSpPr>
+        <a:xfrm>
+          <a:off x="0" y="0"/>
+          <a:ext cx="0" cy="0"/>
+          <a:chOff x="0" y="0"/>
+          <a:chExt cx="0" cy="0"/>
+        </a:xfrm>
+      </p:grpSpPr>
+      <p:sp>
+        <p:nvSpPr>
+          <p:cNvPr id="2" name="Titel 1"/>
+          <p:cNvSpPr>
+            <a:spLocks noGrp="1"/>
+          </p:cNvSpPr>
+          <p:nvPr>
+            <p:ph type="title"/>
+          </p:nvPr>
+        </p:nvSpPr>
+        <p:spPr/>
+        <p:txBody>
+          <a:bodyPr/>
+          <a:lstStyle/>
+          <a:p>
+            <a:r>
+              <a:rPr lang="en-US" dirty="0" smtClean="0"/>
+              <a:t>Reduce function</a:t>
+            </a:r>
+            <a:endParaRPr lang="de-AT" dirty="0"/>
+          </a:p>
+        </p:txBody>
+      </p:sp>
+      <p:sp>
+        <p:nvSpPr>
+          <p:cNvPr id="3" name="Inhaltsplatzhalter 2"/>
+          <p:cNvSpPr>
+            <a:spLocks noGrp="1"/>
+          </p:cNvSpPr>
+          <p:nvPr>
+            <p:ph idx="1"/>
+          </p:nvPr>
+        </p:nvSpPr>
+        <p:spPr/>
+        <p:txBody>
+          <a:bodyPr>
+            <a:normAutofit/>
+          </a:bodyPr>
+          <a:lstStyle/>
+          <a:p>
+            <a:pPr marL="0" indent="0">
+              <a:buNone/>
+            </a:pPr>
+            <a:endParaRPr lang="en-US" sz="2800" dirty="0" smtClean="0">
+              <a:latin typeface="Ubuntu Mono" pitchFamily="49" charset="0"/>
+              <a:cs typeface="Courier New" pitchFamily="49" charset="0"/>
+            </a:endParaRPr>
+          </a:p>
+          <a:p>
+            <a:pPr marL="0" indent="0">
+              <a:buNone/>
+            </a:pPr>
+            <a:r>
+              <a:rPr lang="en-US" sz="2800" dirty="0" smtClean="0">
+                <a:latin typeface="Ubuntu Mono" pitchFamily="49" charset="0"/>
+                <a:cs typeface="Courier New" pitchFamily="49" charset="0"/>
+              </a:rPr>
+              <a:t>function reduce(key, values) {</a:t>
+            </a:r>
+          </a:p>
+          <a:p>
+            <a:pPr marL="0" indent="0">
+              <a:buNone/>
+            </a:pPr>
+            <a:r>
+              <a:rPr lang="en-US" sz="2800" dirty="0">
+                <a:latin typeface="Ubuntu Mono" pitchFamily="49" charset="0"/>
+                <a:cs typeface="Courier New" pitchFamily="49" charset="0"/>
+              </a:rPr>
+              <a:t>	</a:t>
+            </a:r>
+            <a:r>
+              <a:rPr lang="en-US" sz="2800" dirty="0" err="1" smtClean="0">
+                <a:latin typeface="Ubuntu Mono" pitchFamily="49" charset="0"/>
+                <a:cs typeface="Courier New" pitchFamily="49" charset="0"/>
+              </a:rPr>
+              <a:t>var</a:t>
+            </a:r>
+            <a:r>
+              <a:rPr lang="en-US" sz="2800" dirty="0" smtClean="0">
+                <a:latin typeface="Ubuntu Mono" pitchFamily="49" charset="0"/>
+                <a:cs typeface="Courier New" pitchFamily="49" charset="0"/>
+              </a:rPr>
+              <a:t> sum = 0;</a:t>
+            </a:r>
+            <a:endParaRPr lang="en-US" sz="2800" dirty="0" smtClean="0">
+              <a:latin typeface="Ubuntu Mono" pitchFamily="49" charset="0"/>
+              <a:cs typeface="Courier New" pitchFamily="49" charset="0"/>
+            </a:endParaRPr>
+          </a:p>
+          <a:p>
+            <a:pPr marL="0" indent="0">
+              <a:buNone/>
+            </a:pPr>
+            <a:r>
+              <a:rPr lang="en-US" sz="2800" dirty="0" smtClean="0">
+                <a:latin typeface="Ubuntu Mono" pitchFamily="49" charset="0"/>
+                <a:cs typeface="Courier New" pitchFamily="49" charset="0"/>
+              </a:rPr>
+              <a:t>	</a:t>
+            </a:r>
+            <a:r>
+              <a:rPr lang="en-US" sz="2800" dirty="0" err="1" smtClean="0">
+                <a:latin typeface="Ubuntu Mono" pitchFamily="49" charset="0"/>
+                <a:cs typeface="Courier New" pitchFamily="49" charset="0"/>
+              </a:rPr>
+              <a:t>values.forEach</a:t>
+            </a:r>
+            <a:r>
+              <a:rPr lang="en-US" sz="2800" dirty="0" smtClean="0">
+                <a:latin typeface="Ubuntu Mono" pitchFamily="49" charset="0"/>
+                <a:cs typeface="Courier New" pitchFamily="49" charset="0"/>
+              </a:rPr>
+              <a:t>(function (value) </a:t>
+            </a:r>
+            <a:r>
+              <a:rPr lang="en-US" sz="2800" dirty="0" smtClean="0">
+                <a:latin typeface="Ubuntu Mono" pitchFamily="49" charset="0"/>
+                <a:cs typeface="Courier New" pitchFamily="49" charset="0"/>
+              </a:rPr>
+              <a:t>{</a:t>
+            </a:r>
+          </a:p>
+          <a:p>
+            <a:pPr marL="0" indent="0">
+              <a:buNone/>
+            </a:pPr>
+            <a:r>
+              <a:rPr lang="en-US" sz="2800" dirty="0">
+                <a:latin typeface="Ubuntu Mono" pitchFamily="49" charset="0"/>
+                <a:cs typeface="Courier New" pitchFamily="49" charset="0"/>
+              </a:rPr>
+              <a:t>	</a:t>
+            </a:r>
+            <a:r>
+              <a:rPr lang="en-US" sz="2800" dirty="0" smtClean="0">
+                <a:latin typeface="Ubuntu Mono" pitchFamily="49" charset="0"/>
+                <a:cs typeface="Courier New" pitchFamily="49" charset="0"/>
+              </a:rPr>
+              <a:t>	</a:t>
+            </a:r>
+            <a:r>
+              <a:rPr lang="en-US" sz="2800" dirty="0" smtClean="0">
+                <a:latin typeface="Ubuntu Mono" pitchFamily="49" charset="0"/>
+                <a:cs typeface="Courier New" pitchFamily="49" charset="0"/>
+              </a:rPr>
+              <a:t>sum += value;</a:t>
+            </a:r>
+            <a:endParaRPr lang="en-US" sz="2800" dirty="0" smtClean="0">
+              <a:latin typeface="Ubuntu Mono" pitchFamily="49" charset="0"/>
+              <a:cs typeface="Courier New" pitchFamily="49" charset="0"/>
+            </a:endParaRPr>
+          </a:p>
+          <a:p>
+            <a:pPr marL="0" indent="0">
+              <a:buNone/>
+            </a:pPr>
+            <a:r>
+              <a:rPr lang="en-US" sz="2800" dirty="0" smtClean="0">
+                <a:latin typeface="Ubuntu Mono" pitchFamily="49" charset="0"/>
+                <a:cs typeface="Courier New" pitchFamily="49" charset="0"/>
+              </a:rPr>
+              <a:t>	</a:t>
+            </a:r>
+            <a:r>
+              <a:rPr lang="en-US" sz="2800" dirty="0" smtClean="0">
+                <a:latin typeface="Ubuntu Mono" pitchFamily="49" charset="0"/>
+                <a:cs typeface="Courier New" pitchFamily="49" charset="0"/>
+              </a:rPr>
+              <a:t>});</a:t>
+            </a:r>
+          </a:p>
+          <a:p>
+            <a:pPr marL="0" indent="0">
+              <a:buNone/>
+            </a:pPr>
+            <a:r>
+              <a:rPr lang="en-US" sz="2800" dirty="0">
+                <a:latin typeface="Ubuntu Mono" pitchFamily="49" charset="0"/>
+                <a:cs typeface="Courier New" pitchFamily="49" charset="0"/>
+              </a:rPr>
+              <a:t>	</a:t>
+            </a:r>
+            <a:r>
+              <a:rPr lang="en-US" sz="2800" dirty="0" smtClean="0">
+                <a:latin typeface="Ubuntu Mono" pitchFamily="49" charset="0"/>
+                <a:cs typeface="Courier New" pitchFamily="49" charset="0"/>
+              </a:rPr>
+              <a:t>return sum;</a:t>
+            </a:r>
+            <a:endParaRPr lang="en-US" sz="2800" dirty="0">
+              <a:latin typeface="Ubuntu Mono" pitchFamily="49" charset="0"/>
+              <a:cs typeface="Courier New" pitchFamily="49" charset="0"/>
+            </a:endParaRPr>
+          </a:p>
+          <a:p>
+            <a:pPr marL="0" indent="0">
+              <a:buNone/>
+            </a:pPr>
+            <a:r>
+              <a:rPr lang="en-US" sz="2800" dirty="0" smtClean="0">
+                <a:latin typeface="Ubuntu Mono" pitchFamily="49" charset="0"/>
+                <a:cs typeface="Courier New" pitchFamily="49" charset="0"/>
+              </a:rPr>
+              <a:t>}</a:t>
+            </a:r>
+            <a:endParaRPr lang="de-AT" sz="2800" dirty="0">
+              <a:latin typeface="Ubuntu Mono" pitchFamily="49" charset="0"/>
+              <a:cs typeface="Courier New" pitchFamily="49" charset="0"/>
+            </a:endParaRPr>
+          </a:p>
+        </p:txBody>
+      </p:sp>
+    </p:spTree>
+    <p:extLst>
+      <p:ext uri="{BB962C8B-B14F-4D97-AF65-F5344CB8AC3E}">
+        <p14:creationId xmlns:p14="http://schemas.microsoft.com/office/powerpoint/2010/main" val="3617426455"/>
+      </p:ext>
+    </p:extLst>
+  </p:cSld>
+  <p:clrMapOvr>
+    <a:masterClrMapping/>
+  </p:clrMapOvr>
+  <p:timing>
+    <p:tnLst>
+      <p:par>
+        <p:cTn id="1" dur="indefinite" restart="never" nodeType="tmRoot"/>
+      </p:par>
+    </p:tnLst>
+  </p:timing>
+</p:sld>
+</file>
+
+<file path=ppt/slides/slide21.xml><?xml version="1.0" encoding="utf-8"?>
+<p:sld xmlns:a="http://schemas.openxmlformats.org/drawingml/2006/main" xmlns:r="http://schemas.openxmlformats.org/officeDocument/2006/relationships" xmlns:p="http://schemas.openxmlformats.org/presentationml/2006/main">
+  <p:cSld>
+    <p:spTree>
+      <p:nvGrpSpPr>
+        <p:cNvPr id="1" name=""/>
+        <p:cNvGrpSpPr/>
+        <p:nvPr/>
+      </p:nvGrpSpPr>
+      <p:grpSpPr>
+        <a:xfrm>
+          <a:off x="0" y="0"/>
+          <a:ext cx="0" cy="0"/>
+          <a:chOff x="0" y="0"/>
+          <a:chExt cx="0" cy="0"/>
+        </a:xfrm>
+      </p:grpSpPr>
+      <p:sp>
+        <p:nvSpPr>
+          <p:cNvPr id="2" name="Titel 1"/>
+          <p:cNvSpPr>
+            <a:spLocks noGrp="1"/>
+          </p:cNvSpPr>
+          <p:nvPr>
+            <p:ph type="title"/>
+          </p:nvPr>
+        </p:nvSpPr>
+        <p:spPr/>
+        <p:txBody>
+          <a:bodyPr/>
+          <a:lstStyle/>
+          <a:p>
+            <a:r>
+              <a:rPr lang="en-US" dirty="0" smtClean="0"/>
+              <a:t>Output</a:t>
+            </a:r>
+            <a:endParaRPr lang="de-AT" dirty="0"/>
+          </a:p>
+        </p:txBody>
+      </p:sp>
+      <p:sp>
+        <p:nvSpPr>
+          <p:cNvPr id="3" name="Inhaltsplatzhalter 2"/>
+          <p:cNvSpPr>
+            <a:spLocks noGrp="1"/>
+          </p:cNvSpPr>
+          <p:nvPr>
+            <p:ph idx="1"/>
+          </p:nvPr>
+        </p:nvSpPr>
+        <p:spPr/>
+        <p:txBody>
+          <a:bodyPr>
+            <a:normAutofit/>
+          </a:bodyPr>
+          <a:lstStyle/>
+          <a:p>
+            <a:pPr marL="0" lvl="1" indent="0">
+              <a:buNone/>
+            </a:pPr>
+            <a:endParaRPr lang="en-US" sz="2400" dirty="0" smtClean="0">
+              <a:latin typeface="Ubuntu Mono" pitchFamily="49" charset="0"/>
+            </a:endParaRPr>
+          </a:p>
+          <a:p>
+            <a:pPr marL="400050" lvl="2" indent="0">
+              <a:buNone/>
+            </a:pPr>
+            <a:r>
+              <a:rPr lang="en-US" sz="2200" dirty="0" smtClean="0">
+                <a:latin typeface="Ubuntu Mono" pitchFamily="49" charset="0"/>
+              </a:rPr>
+              <a:t>grumpy</a:t>
+            </a:r>
+            <a:r>
+              <a:rPr lang="en-US" sz="2200" dirty="0">
+                <a:latin typeface="Ubuntu Mono" pitchFamily="49" charset="0"/>
+              </a:rPr>
+              <a:t>, </a:t>
+            </a:r>
+            <a:r>
+              <a:rPr lang="en-US" sz="2200" dirty="0" smtClean="0">
+                <a:latin typeface="Ubuntu Mono" pitchFamily="49" charset="0"/>
+              </a:rPr>
+              <a:t>2</a:t>
+            </a:r>
+            <a:r>
+              <a:rPr lang="en-US" sz="2200" dirty="0">
+                <a:latin typeface="Ubuntu Mono" pitchFamily="49" charset="0"/>
+              </a:rPr>
+              <a:t/>
+            </a:r>
+            <a:br>
+              <a:rPr lang="en-US" sz="2200" dirty="0">
+                <a:latin typeface="Ubuntu Mono" pitchFamily="49" charset="0"/>
+              </a:rPr>
+            </a:br>
+            <a:r>
+              <a:rPr lang="en-US" sz="2200" dirty="0">
+                <a:latin typeface="Ubuntu Mono" pitchFamily="49" charset="0"/>
+              </a:rPr>
+              <a:t>cat, </a:t>
+            </a:r>
+            <a:r>
+              <a:rPr lang="en-US" sz="2200" dirty="0" smtClean="0">
+                <a:latin typeface="Ubuntu Mono" pitchFamily="49" charset="0"/>
+              </a:rPr>
+              <a:t>2</a:t>
+            </a:r>
+            <a:r>
+              <a:rPr lang="en-US" sz="2200" dirty="0">
+                <a:latin typeface="Ubuntu Mono" pitchFamily="49" charset="0"/>
+              </a:rPr>
+              <a:t/>
+            </a:r>
+            <a:br>
+              <a:rPr lang="en-US" sz="2200" dirty="0">
+                <a:latin typeface="Ubuntu Mono" pitchFamily="49" charset="0"/>
+              </a:rPr>
+            </a:br>
+            <a:r>
+              <a:rPr lang="en-US" sz="2200" dirty="0" err="1">
+                <a:latin typeface="Ubuntu Mono" pitchFamily="49" charset="0"/>
+              </a:rPr>
+              <a:t>steven</a:t>
+            </a:r>
+            <a:r>
+              <a:rPr lang="en-US" sz="2200" dirty="0">
+                <a:latin typeface="Ubuntu Mono" pitchFamily="49" charset="0"/>
+              </a:rPr>
+              <a:t>, 1</a:t>
+            </a:r>
+            <a:br>
+              <a:rPr lang="en-US" sz="2200" dirty="0">
+                <a:latin typeface="Ubuntu Mono" pitchFamily="49" charset="0"/>
+              </a:rPr>
+            </a:br>
+            <a:r>
+              <a:rPr lang="en-US" sz="2200" dirty="0" err="1">
+                <a:latin typeface="Ubuntu Mono" pitchFamily="49" charset="0"/>
+              </a:rPr>
+              <a:t>seagal</a:t>
+            </a:r>
+            <a:r>
+              <a:rPr lang="en-US" sz="2200" dirty="0">
+                <a:latin typeface="Ubuntu Mono" pitchFamily="49" charset="0"/>
+              </a:rPr>
+              <a:t>, 1</a:t>
+            </a:r>
+            <a:br>
+              <a:rPr lang="en-US" sz="2200" dirty="0">
+                <a:latin typeface="Ubuntu Mono" pitchFamily="49" charset="0"/>
+              </a:rPr>
+            </a:br>
+            <a:r>
+              <a:rPr lang="en-US" sz="2200" dirty="0" err="1">
+                <a:latin typeface="Ubuntu Mono" pitchFamily="49" charset="0"/>
+              </a:rPr>
+              <a:t>jake</a:t>
+            </a:r>
+            <a:r>
+              <a:rPr lang="en-US" sz="2200" dirty="0">
+                <a:latin typeface="Ubuntu Mono" pitchFamily="49" charset="0"/>
+              </a:rPr>
+              <a:t>, 1</a:t>
+            </a:r>
+            <a:br>
+              <a:rPr lang="en-US" sz="2200" dirty="0">
+                <a:latin typeface="Ubuntu Mono" pitchFamily="49" charset="0"/>
+              </a:rPr>
+            </a:br>
+            <a:r>
+              <a:rPr lang="en-US" sz="2200" dirty="0">
+                <a:latin typeface="Ubuntu Mono" pitchFamily="49" charset="0"/>
+              </a:rPr>
+              <a:t>the, </a:t>
+            </a:r>
+            <a:r>
+              <a:rPr lang="en-US" sz="2200" dirty="0" smtClean="0">
+                <a:latin typeface="Ubuntu Mono" pitchFamily="49" charset="0"/>
+              </a:rPr>
+              <a:t>2</a:t>
+            </a:r>
+            <a:r>
+              <a:rPr lang="en-US" sz="2200" dirty="0">
+                <a:latin typeface="Ubuntu Mono" pitchFamily="49" charset="0"/>
+              </a:rPr>
+              <a:t/>
+            </a:r>
+            <a:br>
+              <a:rPr lang="en-US" sz="2200" dirty="0">
+                <a:latin typeface="Ubuntu Mono" pitchFamily="49" charset="0"/>
+              </a:rPr>
+            </a:br>
+            <a:r>
+              <a:rPr lang="en-US" sz="2200" dirty="0">
+                <a:latin typeface="Ubuntu Mono" pitchFamily="49" charset="0"/>
+              </a:rPr>
+              <a:t>dog, 1</a:t>
+            </a:r>
+            <a:br>
+              <a:rPr lang="en-US" sz="2200" dirty="0">
+                <a:latin typeface="Ubuntu Mono" pitchFamily="49" charset="0"/>
+              </a:rPr>
+            </a:br>
+            <a:r>
+              <a:rPr lang="en-US" sz="2200" dirty="0" err="1">
+                <a:latin typeface="Ubuntu Mono" pitchFamily="49" charset="0"/>
+              </a:rPr>
+              <a:t>finn</a:t>
+            </a:r>
+            <a:r>
+              <a:rPr lang="en-US" sz="2200" dirty="0">
+                <a:latin typeface="Ubuntu Mono" pitchFamily="49" charset="0"/>
+              </a:rPr>
+              <a:t>, </a:t>
+            </a:r>
+            <a:r>
+              <a:rPr lang="en-US" sz="2200" dirty="0" smtClean="0">
+                <a:latin typeface="Ubuntu Mono" pitchFamily="49" charset="0"/>
+              </a:rPr>
+              <a:t>1</a:t>
+            </a:r>
+            <a:r>
+              <a:rPr lang="en-US" sz="2200" dirty="0">
+                <a:latin typeface="Ubuntu Mono" pitchFamily="49" charset="0"/>
+              </a:rPr>
+              <a:t/>
+            </a:r>
+            <a:br>
+              <a:rPr lang="en-US" sz="2200" dirty="0">
+                <a:latin typeface="Ubuntu Mono" pitchFamily="49" charset="0"/>
+              </a:rPr>
+            </a:br>
+            <a:r>
+              <a:rPr lang="en-US" sz="2200" dirty="0">
+                <a:latin typeface="Ubuntu Mono" pitchFamily="49" charset="0"/>
+              </a:rPr>
+              <a:t>human, 1</a:t>
+            </a:r>
+            <a:br>
+              <a:rPr lang="en-US" sz="2200" dirty="0">
+                <a:latin typeface="Ubuntu Mono" pitchFamily="49" charset="0"/>
+              </a:rPr>
+            </a:br>
+            <a:r>
+              <a:rPr lang="en-US" sz="2200" dirty="0">
+                <a:latin typeface="Ubuntu Mono" pitchFamily="49" charset="0"/>
+              </a:rPr>
+              <a:t>hover, </a:t>
+            </a:r>
+            <a:r>
+              <a:rPr lang="en-US" sz="2200" dirty="0" smtClean="0">
+                <a:latin typeface="Ubuntu Mono" pitchFamily="49" charset="0"/>
+              </a:rPr>
+              <a:t>1</a:t>
+            </a:r>
+            <a:r>
+              <a:rPr lang="en-US" sz="2200" dirty="0">
+                <a:latin typeface="Ubuntu Mono" pitchFamily="49" charset="0"/>
+              </a:rPr>
+              <a:t/>
+            </a:r>
+            <a:br>
+              <a:rPr lang="en-US" sz="2200" dirty="0">
+                <a:latin typeface="Ubuntu Mono" pitchFamily="49" charset="0"/>
+              </a:rPr>
+            </a:br>
+            <a:r>
+              <a:rPr lang="en-US" sz="2200" dirty="0">
+                <a:latin typeface="Ubuntu Mono" pitchFamily="49" charset="0"/>
+              </a:rPr>
+              <a:t>grandma, 1</a:t>
+            </a:r>
+            <a:endParaRPr lang="de-AT" sz="2200" dirty="0">
+              <a:latin typeface="Ubuntu Mono" pitchFamily="49" charset="0"/>
+            </a:endParaRPr>
+          </a:p>
+          <a:p>
+            <a:endParaRPr lang="de-AT" dirty="0"/>
+          </a:p>
+        </p:txBody>
+      </p:sp>
+      <p:pic>
+        <p:nvPicPr>
+          <p:cNvPr id="4" name="Grafik 3"/>
+          <p:cNvPicPr>
+            <a:picLocks noChangeAspect="1"/>
+          </p:cNvPicPr>
+          <p:nvPr/>
+        </p:nvPicPr>
+        <p:blipFill>
+          <a:blip r:embed="rId2">
+            <a:extLst>
+              <a:ext uri="{28A0092B-C50C-407E-A947-70E740481C1C}">
+                <a14:useLocalDpi xmlns:a14="http://schemas.microsoft.com/office/drawing/2010/main" val="0"/>
+              </a:ext>
+            </a:extLst>
+          </a:blip>
+          <a:stretch>
+            <a:fillRect/>
+          </a:stretch>
+        </p:blipFill>
+        <p:spPr>
+          <a:xfrm>
+            <a:off x="5824692" y="2679897"/>
+            <a:ext cx="2862107" cy="2862107"/>
+          </a:xfrm>
+          <a:prstGeom prst="rect">
+            <a:avLst/>
+          </a:prstGeom>
+        </p:spPr>
+      </p:pic>
+    </p:spTree>
+    <p:extLst>
+      <p:ext uri="{BB962C8B-B14F-4D97-AF65-F5344CB8AC3E}">
+        <p14:creationId xmlns:p14="http://schemas.microsoft.com/office/powerpoint/2010/main" val="704690341"/>
+      </p:ext>
+    </p:extLst>
+  </p:cSld>
+  <p:clrMapOvr>
+    <a:masterClrMapping/>
+  </p:clrMapOvr>
+  <p:timing>
+    <p:tnLst>
+      <p:par>
+        <p:cTn id="1" dur="indefinite" restart="never" nodeType="tmRoot"/>
+      </p:par>
+    </p:tnLst>
+  </p:timing>
+</p:sld>
+</file>
+
+<file path=ppt/slides/slide22.xml><?xml version="1.0" encoding="utf-8"?>
+<p:sld xmlns:a="http://schemas.openxmlformats.org/drawingml/2006/main" xmlns:r="http://schemas.openxmlformats.org/officeDocument/2006/relationships" xmlns:p="http://schemas.openxmlformats.org/presentationml/2006/main">
+  <p:cSld>
+    <p:spTree>
+      <p:nvGrpSpPr>
+        <p:cNvPr id="1" name=""/>
+        <p:cNvGrpSpPr/>
+        <p:nvPr/>
+      </p:nvGrpSpPr>
+      <p:grpSpPr>
+        <a:xfrm>
+          <a:off x="0" y="0"/>
+          <a:ext cx="0" cy="0"/>
+          <a:chOff x="0" y="0"/>
+          <a:chExt cx="0" cy="0"/>
+        </a:xfrm>
+      </p:grpSpPr>
+      <p:sp>
+        <p:nvSpPr>
+          <p:cNvPr id="3" name="Textfeld 2"/>
+          <p:cNvSpPr txBox="1"/>
+          <p:nvPr/>
+        </p:nvSpPr>
+        <p:spPr>
+          <a:xfrm>
+            <a:off x="280588" y="1319497"/>
+            <a:ext cx="7760446" cy="2308324"/>
+          </a:xfrm>
+          <a:prstGeom prst="rect">
+            <a:avLst/>
+          </a:prstGeom>
+          <a:noFill/>
+        </p:spPr>
+        <p:txBody>
+          <a:bodyPr wrap="square" rtlCol="0">
+            <a:spAutoFit/>
+          </a:bodyPr>
+          <a:lstStyle/>
+          <a:p>
+            <a:r>
+              <a:rPr lang="de-DE" sz="4000" dirty="0" smtClean="0">
+                <a:solidFill>
+                  <a:schemeClr val="bg1"/>
+                </a:solidFill>
+              </a:rPr>
+              <a:t>Trennseite Calibri </a:t>
+            </a:r>
+            <a:r>
+              <a:rPr lang="de-DE" sz="4000" dirty="0">
+                <a:solidFill>
+                  <a:schemeClr val="bg1"/>
+                </a:solidFill>
+              </a:rPr>
+              <a:t>40 </a:t>
+            </a:r>
+            <a:r>
+              <a:rPr lang="de-DE" sz="4000" dirty="0" err="1">
+                <a:solidFill>
+                  <a:schemeClr val="bg1"/>
+                </a:solidFill>
+              </a:rPr>
+              <a:t>pkt</a:t>
+            </a:r>
+            <a:endParaRPr lang="de-DE" sz="4000" dirty="0">
+              <a:solidFill>
+                <a:schemeClr val="bg1"/>
+              </a:solidFill>
+            </a:endParaRPr>
+          </a:p>
+          <a:p>
+            <a:r>
+              <a:rPr lang="de-DE" sz="4000" dirty="0">
+                <a:solidFill>
+                  <a:schemeClr val="bg1"/>
+                </a:solidFill>
+              </a:rPr>
+              <a:t>FH JOANNEUM IN </a:t>
+            </a:r>
+            <a:r>
+              <a:rPr lang="de-DE" sz="4000" i="1" dirty="0" smtClean="0">
+                <a:solidFill>
+                  <a:schemeClr val="bg1"/>
+                </a:solidFill>
+                <a:latin typeface="Georgia"/>
+                <a:cs typeface="Georgia"/>
+              </a:rPr>
+              <a:t>Bewegung</a:t>
+            </a:r>
+          </a:p>
+          <a:p>
+            <a:endParaRPr lang="de-DE" sz="4000" i="1" dirty="0" smtClean="0">
+              <a:solidFill>
+                <a:schemeClr val="bg1"/>
+              </a:solidFill>
+              <a:latin typeface="Georgia"/>
+              <a:cs typeface="Georgia"/>
+            </a:endParaRPr>
+          </a:p>
+          <a:p>
+            <a:r>
+              <a:rPr lang="de-DE" sz="2400" i="1" dirty="0" smtClean="0">
+                <a:solidFill>
+                  <a:schemeClr val="bg1"/>
+                </a:solidFill>
+                <a:latin typeface="Georgia"/>
+                <a:cs typeface="Georgia"/>
+              </a:rPr>
+              <a:t>Auszeichnungen Georgia 24 </a:t>
+            </a:r>
+            <a:r>
+              <a:rPr lang="de-DE" sz="2400" i="1" dirty="0" err="1" smtClean="0">
+                <a:solidFill>
+                  <a:schemeClr val="bg1"/>
+                </a:solidFill>
+                <a:latin typeface="Georgia"/>
+                <a:cs typeface="Georgia"/>
+              </a:rPr>
+              <a:t>pkt</a:t>
+            </a:r>
+            <a:endParaRPr lang="de-DE" sz="2400" i="1" dirty="0">
+              <a:solidFill>
+                <a:schemeClr val="bg1"/>
+              </a:solidFill>
+              <a:latin typeface="Georgia"/>
+              <a:cs typeface="Georgia"/>
+            </a:endParaRPr>
+          </a:p>
+        </p:txBody>
+      </p:sp>
+    </p:spTree>
+    <p:extLst>
+      <p:ext uri="{BB962C8B-B14F-4D97-AF65-F5344CB8AC3E}">
+        <p14:creationId xmlns:p14="http://schemas.microsoft.com/office/powerpoint/2010/main" val="2055451195"/>
       </p:ext>
     </p:extLst>
   </p:cSld>

</xml_diff>

<commit_message>
Finished Graph slides. Added comparison + MongoDB + reading slides.
</commit_message>
<xml_diff>
--- a/Presentation/FHJ_guest_lecture_nosql.pptx
+++ b/Presentation/FHJ_guest_lecture_nosql.pptx
@@ -5,7 +5,7 @@
     <p:sldMasterId id="2147483648" r:id="rId1"/>
   </p:sldMasterIdLst>
   <p:notesMasterIdLst>
-    <p:notesMasterId r:id="rId43"/>
+    <p:notesMasterId r:id="rId52"/>
   </p:notesMasterIdLst>
   <p:sldIdLst>
     <p:sldId id="256" r:id="rId2"/>
@@ -45,10 +45,19 @@
     <p:sldId id="299" r:id="rId36"/>
     <p:sldId id="300" r:id="rId37"/>
     <p:sldId id="301" r:id="rId38"/>
-    <p:sldId id="296" r:id="rId39"/>
-    <p:sldId id="295" r:id="rId40"/>
-    <p:sldId id="297" r:id="rId41"/>
-    <p:sldId id="260" r:id="rId42"/>
+    <p:sldId id="302" r:id="rId39"/>
+    <p:sldId id="303" r:id="rId40"/>
+    <p:sldId id="296" r:id="rId41"/>
+    <p:sldId id="295" r:id="rId42"/>
+    <p:sldId id="297" r:id="rId43"/>
+    <p:sldId id="309" r:id="rId44"/>
+    <p:sldId id="310" r:id="rId45"/>
+    <p:sldId id="304" r:id="rId46"/>
+    <p:sldId id="305" r:id="rId47"/>
+    <p:sldId id="306" r:id="rId48"/>
+    <p:sldId id="307" r:id="rId49"/>
+    <p:sldId id="308" r:id="rId50"/>
+    <p:sldId id="260" r:id="rId51"/>
   </p:sldIdLst>
   <p:sldSz cx="9144000" cy="6858000" type="screen4x3"/>
   <p:notesSz cx="6858000" cy="9144000"/>
@@ -232,7 +241,7 @@
           <a:p>
             <a:fld id="{7A19BEE0-598C-4858-A439-753E34679212}" type="datetimeFigureOut">
               <a:rPr lang="de-AT" smtClean="0"/>
-              <a:t>02.06.2013</a:t>
+              <a:t>03.06.2013</a:t>
             </a:fld>
             <a:endParaRPr lang="de-AT"/>
           </a:p>
@@ -1508,7 +1517,28 @@
             </a:r>
             <a:r>
               <a:rPr lang="en-US" baseline="0" dirty="0" smtClean="0"/>
-              <a:t> reads and writes, Distribution and Replication</a:t>
+              <a:t> reads and writes, Distribution and </a:t>
+            </a:r>
+            <a:r>
+              <a:rPr lang="en-US" baseline="0" dirty="0" smtClean="0"/>
+              <a:t>Replication</a:t>
+            </a:r>
+          </a:p>
+          <a:p>
+            <a:pPr marL="171450" indent="-171450">
+              <a:buFont typeface="Arial" pitchFamily="34" charset="0"/>
+              <a:buChar char="•"/>
+            </a:pPr>
+            <a:endParaRPr lang="en-US" baseline="0" dirty="0" smtClean="0"/>
+          </a:p>
+          <a:p>
+            <a:pPr marL="171450" indent="-171450">
+              <a:buFont typeface="Arial" pitchFamily="34" charset="0"/>
+              <a:buChar char="•"/>
+            </a:pPr>
+            <a:r>
+              <a:rPr lang="en-US" baseline="0" dirty="0" smtClean="0"/>
+              <a:t>Simple key value retrieving tasks, aggregation, analysis</a:t>
             </a:r>
             <a:endParaRPr lang="de-AT" dirty="0"/>
           </a:p>
@@ -2138,7 +2168,36 @@
             </a:pPr>
             <a:r>
               <a:rPr lang="en-US" baseline="0" dirty="0" smtClean="0"/>
-              <a:t>Data format can be easily integrated into programming language, natural data structures, JSON -&gt; highly interoperable</a:t>
+              <a:t>Data </a:t>
+            </a:r>
+            <a:r>
+              <a:rPr lang="en-US" baseline="0" dirty="0" smtClean="0"/>
+              <a:t>format </a:t>
+            </a:r>
+            <a:r>
+              <a:rPr lang="en-US" baseline="0" dirty="0" smtClean="0"/>
+              <a:t>can be easily integrated into programming language, natural data structures, JSON -&gt; highly </a:t>
+            </a:r>
+            <a:r>
+              <a:rPr lang="en-US" baseline="0" dirty="0" smtClean="0"/>
+              <a:t>interoperable</a:t>
+            </a:r>
+          </a:p>
+          <a:p>
+            <a:pPr marL="171450" lvl="0" indent="-171450">
+              <a:buFont typeface="Arial" pitchFamily="34" charset="0"/>
+              <a:buChar char="•"/>
+            </a:pPr>
+            <a:endParaRPr lang="en-US" baseline="0" dirty="0" smtClean="0"/>
+          </a:p>
+          <a:p>
+            <a:pPr marL="171450" lvl="0" indent="-171450">
+              <a:buFont typeface="Arial" pitchFamily="34" charset="0"/>
+              <a:buChar char="•"/>
+            </a:pPr>
+            <a:r>
+              <a:rPr lang="en-US" baseline="0" dirty="0" smtClean="0"/>
+              <a:t>Basically applicable anywhere, sometimes other models are better</a:t>
             </a:r>
             <a:endParaRPr lang="de-AT" dirty="0"/>
           </a:p>
@@ -2447,7 +2506,28 @@
             </a:r>
             <a:r>
               <a:rPr lang="en-US" baseline="0" dirty="0" smtClean="0"/>
-              <a:t> access is very fast</a:t>
+              <a:t> access is very </a:t>
+            </a:r>
+            <a:r>
+              <a:rPr lang="en-US" baseline="0" dirty="0" smtClean="0"/>
+              <a:t>fast</a:t>
+            </a:r>
+          </a:p>
+          <a:p>
+            <a:pPr marL="171450" indent="-171450">
+              <a:buFont typeface="Arial" pitchFamily="34" charset="0"/>
+              <a:buChar char="•"/>
+            </a:pPr>
+            <a:endParaRPr lang="en-US" baseline="0" dirty="0" smtClean="0"/>
+          </a:p>
+          <a:p>
+            <a:pPr marL="171450" indent="-171450">
+              <a:buFont typeface="Arial" pitchFamily="34" charset="0"/>
+              <a:buChar char="•"/>
+            </a:pPr>
+            <a:r>
+              <a:rPr lang="en-US" baseline="0" dirty="0" smtClean="0"/>
+              <a:t>Facebook, Google</a:t>
             </a:r>
             <a:endParaRPr lang="de-AT" dirty="0"/>
           </a:p>
@@ -2480,6 +2560,1100 @@
     <p:extLst>
       <p:ext uri="{BB962C8B-B14F-4D97-AF65-F5344CB8AC3E}">
         <p14:creationId xmlns:p14="http://schemas.microsoft.com/office/powerpoint/2010/main" val="1530577827"/>
+      </p:ext>
+    </p:extLst>
+  </p:cSld>
+  <p:clrMapOvr>
+    <a:masterClrMapping/>
+  </p:clrMapOvr>
+</p:notes>
+</file>
+
+<file path=ppt/notesSlides/notesSlide23.xml><?xml version="1.0" encoding="utf-8"?>
+<p:notes xmlns:a="http://schemas.openxmlformats.org/drawingml/2006/main" xmlns:r="http://schemas.openxmlformats.org/officeDocument/2006/relationships" xmlns:p="http://schemas.openxmlformats.org/presentationml/2006/main">
+  <p:cSld>
+    <p:spTree>
+      <p:nvGrpSpPr>
+        <p:cNvPr id="1" name=""/>
+        <p:cNvGrpSpPr/>
+        <p:nvPr/>
+      </p:nvGrpSpPr>
+      <p:grpSpPr>
+        <a:xfrm>
+          <a:off x="0" y="0"/>
+          <a:ext cx="0" cy="0"/>
+          <a:chOff x="0" y="0"/>
+          <a:chExt cx="0" cy="0"/>
+        </a:xfrm>
+      </p:grpSpPr>
+      <p:sp>
+        <p:nvSpPr>
+          <p:cNvPr id="2" name="Folienbildplatzhalter 1"/>
+          <p:cNvSpPr>
+            <a:spLocks noGrp="1" noRot="1" noChangeAspect="1"/>
+          </p:cNvSpPr>
+          <p:nvPr>
+            <p:ph type="sldImg"/>
+          </p:nvPr>
+        </p:nvSpPr>
+        <p:spPr/>
+      </p:sp>
+      <p:sp>
+        <p:nvSpPr>
+          <p:cNvPr id="3" name="Notizenplatzhalter 2"/>
+          <p:cNvSpPr>
+            <a:spLocks noGrp="1"/>
+          </p:cNvSpPr>
+          <p:nvPr>
+            <p:ph type="body" idx="1"/>
+          </p:nvPr>
+        </p:nvSpPr>
+        <p:spPr/>
+        <p:txBody>
+          <a:bodyPr/>
+          <a:lstStyle/>
+          <a:p>
+            <a:pPr marL="171450" indent="-171450">
+              <a:buFont typeface="Arial" pitchFamily="34" charset="0"/>
+              <a:buChar char="•"/>
+            </a:pPr>
+            <a:r>
+              <a:rPr lang="en-US" dirty="0" smtClean="0"/>
+              <a:t>Data that</a:t>
+            </a:r>
+            <a:r>
+              <a:rPr lang="en-US" baseline="0" dirty="0" smtClean="0"/>
+              <a:t> holds a strong relationship. E.g. users in social network</a:t>
+            </a:r>
+          </a:p>
+          <a:p>
+            <a:pPr marL="171450" indent="-171450">
+              <a:buFont typeface="Arial" pitchFamily="34" charset="0"/>
+              <a:buChar char="•"/>
+            </a:pPr>
+            <a:r>
+              <a:rPr lang="en-US" baseline="0" dirty="0" smtClean="0"/>
+              <a:t>Flexible data model. Number and types of fields flexible in nodes and edges</a:t>
+            </a:r>
+          </a:p>
+          <a:p>
+            <a:pPr marL="171450" indent="-171450">
+              <a:buFont typeface="Arial" pitchFamily="34" charset="0"/>
+              <a:buChar char="•"/>
+            </a:pPr>
+            <a:r>
+              <a:rPr lang="en-US" baseline="0" dirty="0" smtClean="0"/>
+              <a:t>Stored as graph, efficient for graph operations</a:t>
+            </a:r>
+          </a:p>
+          <a:p>
+            <a:pPr marL="171450" indent="-171450">
+              <a:buFont typeface="Arial" pitchFamily="34" charset="0"/>
+              <a:buChar char="•"/>
+            </a:pPr>
+            <a:r>
+              <a:rPr lang="en-US" baseline="0" dirty="0" smtClean="0"/>
+              <a:t>Query = traversing the graph and calculating values</a:t>
+            </a:r>
+            <a:endParaRPr lang="de-AT" dirty="0"/>
+          </a:p>
+        </p:txBody>
+      </p:sp>
+      <p:sp>
+        <p:nvSpPr>
+          <p:cNvPr id="4" name="Foliennummernplatzhalter 3"/>
+          <p:cNvSpPr>
+            <a:spLocks noGrp="1"/>
+          </p:cNvSpPr>
+          <p:nvPr>
+            <p:ph type="sldNum" sz="quarter" idx="10"/>
+          </p:nvPr>
+        </p:nvSpPr>
+        <p:spPr/>
+        <p:txBody>
+          <a:bodyPr/>
+          <a:lstStyle/>
+          <a:p>
+            <a:fld id="{2AFEA223-4F50-4DD6-9CC4-15E4F51256E0}" type="slidenum">
+              <a:rPr lang="de-AT" smtClean="0"/>
+              <a:t>37</a:t>
+            </a:fld>
+            <a:endParaRPr lang="de-AT"/>
+          </a:p>
+        </p:txBody>
+      </p:sp>
+    </p:spTree>
+    <p:extLst>
+      <p:ext uri="{BB962C8B-B14F-4D97-AF65-F5344CB8AC3E}">
+        <p14:creationId xmlns:p14="http://schemas.microsoft.com/office/powerpoint/2010/main" val="1293039761"/>
+      </p:ext>
+    </p:extLst>
+  </p:cSld>
+  <p:clrMapOvr>
+    <a:masterClrMapping/>
+  </p:clrMapOvr>
+</p:notes>
+</file>
+
+<file path=ppt/notesSlides/notesSlide24.xml><?xml version="1.0" encoding="utf-8"?>
+<p:notes xmlns:a="http://schemas.openxmlformats.org/drawingml/2006/main" xmlns:r="http://schemas.openxmlformats.org/officeDocument/2006/relationships" xmlns:p="http://schemas.openxmlformats.org/presentationml/2006/main">
+  <p:cSld>
+    <p:spTree>
+      <p:nvGrpSpPr>
+        <p:cNvPr id="1" name=""/>
+        <p:cNvGrpSpPr/>
+        <p:nvPr/>
+      </p:nvGrpSpPr>
+      <p:grpSpPr>
+        <a:xfrm>
+          <a:off x="0" y="0"/>
+          <a:ext cx="0" cy="0"/>
+          <a:chOff x="0" y="0"/>
+          <a:chExt cx="0" cy="0"/>
+        </a:xfrm>
+      </p:grpSpPr>
+      <p:sp>
+        <p:nvSpPr>
+          <p:cNvPr id="2" name="Folienbildplatzhalter 1"/>
+          <p:cNvSpPr>
+            <a:spLocks noGrp="1" noRot="1" noChangeAspect="1"/>
+          </p:cNvSpPr>
+          <p:nvPr>
+            <p:ph type="sldImg"/>
+          </p:nvPr>
+        </p:nvSpPr>
+        <p:spPr/>
+      </p:sp>
+      <p:sp>
+        <p:nvSpPr>
+          <p:cNvPr id="3" name="Notizenplatzhalter 2"/>
+          <p:cNvSpPr>
+            <a:spLocks noGrp="1"/>
+          </p:cNvSpPr>
+          <p:nvPr>
+            <p:ph type="body" idx="1"/>
+          </p:nvPr>
+        </p:nvSpPr>
+        <p:spPr/>
+        <p:txBody>
+          <a:bodyPr/>
+          <a:lstStyle/>
+          <a:p>
+            <a:pPr marL="171450" indent="-171450">
+              <a:buFont typeface="Arial" pitchFamily="34" charset="0"/>
+              <a:buChar char="•"/>
+            </a:pPr>
+            <a:r>
+              <a:rPr lang="en-US" dirty="0" smtClean="0"/>
+              <a:t>Highly interconnected</a:t>
+            </a:r>
+            <a:r>
+              <a:rPr lang="en-US" baseline="0" dirty="0" smtClean="0"/>
+              <a:t> data</a:t>
+            </a:r>
+          </a:p>
+          <a:p>
+            <a:pPr marL="171450" indent="-171450">
+              <a:buFont typeface="Arial" pitchFamily="34" charset="0"/>
+              <a:buChar char="•"/>
+            </a:pPr>
+            <a:r>
+              <a:rPr lang="en-US" baseline="0" dirty="0" smtClean="0"/>
+              <a:t>Data forms graphs or trees</a:t>
+            </a:r>
+          </a:p>
+          <a:p>
+            <a:pPr marL="171450" indent="-171450">
+              <a:buFont typeface="Arial" pitchFamily="34" charset="0"/>
+              <a:buChar char="•"/>
+            </a:pPr>
+            <a:r>
+              <a:rPr lang="en-US" baseline="0" dirty="0" smtClean="0"/>
+              <a:t>E.g. biology or GPS data</a:t>
+            </a:r>
+          </a:p>
+          <a:p>
+            <a:pPr marL="171450" indent="-171450">
+              <a:buFont typeface="Arial" pitchFamily="34" charset="0"/>
+              <a:buChar char="•"/>
+            </a:pPr>
+            <a:r>
+              <a:rPr lang="en-US" baseline="0" dirty="0" smtClean="0"/>
+              <a:t>Queries are traversing and transforming the data to produce results</a:t>
+            </a:r>
+            <a:endParaRPr lang="de-AT" dirty="0"/>
+          </a:p>
+        </p:txBody>
+      </p:sp>
+      <p:sp>
+        <p:nvSpPr>
+          <p:cNvPr id="4" name="Foliennummernplatzhalter 3"/>
+          <p:cNvSpPr>
+            <a:spLocks noGrp="1"/>
+          </p:cNvSpPr>
+          <p:nvPr>
+            <p:ph type="sldNum" sz="quarter" idx="10"/>
+          </p:nvPr>
+        </p:nvSpPr>
+        <p:spPr/>
+        <p:txBody>
+          <a:bodyPr/>
+          <a:lstStyle/>
+          <a:p>
+            <a:fld id="{2AFEA223-4F50-4DD6-9CC4-15E4F51256E0}" type="slidenum">
+              <a:rPr lang="de-AT" smtClean="0"/>
+              <a:t>39</a:t>
+            </a:fld>
+            <a:endParaRPr lang="de-AT"/>
+          </a:p>
+        </p:txBody>
+      </p:sp>
+    </p:spTree>
+    <p:extLst>
+      <p:ext uri="{BB962C8B-B14F-4D97-AF65-F5344CB8AC3E}">
+        <p14:creationId xmlns:p14="http://schemas.microsoft.com/office/powerpoint/2010/main" val="1293039761"/>
+      </p:ext>
+    </p:extLst>
+  </p:cSld>
+  <p:clrMapOvr>
+    <a:masterClrMapping/>
+  </p:clrMapOvr>
+</p:notes>
+</file>
+
+<file path=ppt/notesSlides/notesSlide25.xml><?xml version="1.0" encoding="utf-8"?>
+<p:notes xmlns:a="http://schemas.openxmlformats.org/drawingml/2006/main" xmlns:r="http://schemas.openxmlformats.org/officeDocument/2006/relationships" xmlns:p="http://schemas.openxmlformats.org/presentationml/2006/main">
+  <p:cSld>
+    <p:spTree>
+      <p:nvGrpSpPr>
+        <p:cNvPr id="1" name=""/>
+        <p:cNvGrpSpPr/>
+        <p:nvPr/>
+      </p:nvGrpSpPr>
+      <p:grpSpPr>
+        <a:xfrm>
+          <a:off x="0" y="0"/>
+          <a:ext cx="0" cy="0"/>
+          <a:chOff x="0" y="0"/>
+          <a:chExt cx="0" cy="0"/>
+        </a:xfrm>
+      </p:grpSpPr>
+      <p:sp>
+        <p:nvSpPr>
+          <p:cNvPr id="2" name="Folienbildplatzhalter 1"/>
+          <p:cNvSpPr>
+            <a:spLocks noGrp="1" noRot="1" noChangeAspect="1"/>
+          </p:cNvSpPr>
+          <p:nvPr>
+            <p:ph type="sldImg"/>
+          </p:nvPr>
+        </p:nvSpPr>
+        <p:spPr/>
+      </p:sp>
+      <p:sp>
+        <p:nvSpPr>
+          <p:cNvPr id="3" name="Notizenplatzhalter 2"/>
+          <p:cNvSpPr>
+            <a:spLocks noGrp="1"/>
+          </p:cNvSpPr>
+          <p:nvPr>
+            <p:ph type="body" idx="1"/>
+          </p:nvPr>
+        </p:nvSpPr>
+        <p:spPr/>
+        <p:txBody>
+          <a:bodyPr/>
+          <a:lstStyle/>
+          <a:p>
+            <a:pPr marL="171450" indent="-171450">
+              <a:buFont typeface="Arial" pitchFamily="34" charset="0"/>
+              <a:buChar char="•"/>
+            </a:pPr>
+            <a:r>
+              <a:rPr lang="en-US" dirty="0" smtClean="0"/>
+              <a:t>Have been around a</a:t>
+            </a:r>
+            <a:r>
+              <a:rPr lang="en-US" baseline="0" dirty="0" smtClean="0"/>
+              <a:t> long time. Well tested, pretty much failsafe.</a:t>
+            </a:r>
+          </a:p>
+          <a:p>
+            <a:pPr marL="171450" indent="-171450">
+              <a:buFont typeface="Arial" pitchFamily="34" charset="0"/>
+              <a:buChar char="•"/>
+            </a:pPr>
+            <a:r>
+              <a:rPr lang="en-US" baseline="0" dirty="0" smtClean="0"/>
+              <a:t>Strong consistency desired in apps with crucial business data, e.g. bank software</a:t>
+            </a:r>
+          </a:p>
+          <a:p>
+            <a:pPr marL="171450" indent="-171450">
+              <a:buFont typeface="Arial" pitchFamily="34" charset="0"/>
+              <a:buChar char="•"/>
+            </a:pPr>
+            <a:r>
+              <a:rPr lang="en-US" baseline="0" dirty="0" smtClean="0"/>
+              <a:t>SQL is still the most mature and mighty query language</a:t>
+            </a:r>
+          </a:p>
+          <a:p>
+            <a:pPr marL="171450" indent="-171450">
+              <a:buFont typeface="Arial" pitchFamily="34" charset="0"/>
+              <a:buChar char="•"/>
+            </a:pPr>
+            <a:r>
+              <a:rPr lang="en-US" baseline="0" dirty="0" smtClean="0"/>
+              <a:t>Everyone knows it, can write SQL</a:t>
+            </a:r>
+          </a:p>
+          <a:p>
+            <a:pPr marL="171450" indent="-171450">
+              <a:buFont typeface="Arial" pitchFamily="34" charset="0"/>
+              <a:buChar char="•"/>
+            </a:pPr>
+            <a:r>
+              <a:rPr lang="en-US" dirty="0" smtClean="0"/>
+              <a:t>Almost anything can be modeled by tables</a:t>
+            </a:r>
+          </a:p>
+          <a:p>
+            <a:pPr marL="171450" indent="-171450">
+              <a:buFont typeface="Arial" pitchFamily="34" charset="0"/>
+              <a:buChar char="•"/>
+            </a:pPr>
+            <a:r>
+              <a:rPr lang="en-US" dirty="0" smtClean="0"/>
+              <a:t>Well</a:t>
+            </a:r>
+            <a:r>
+              <a:rPr lang="en-US" baseline="0" dirty="0" smtClean="0"/>
+              <a:t> optimized, great index structures</a:t>
+            </a:r>
+            <a:endParaRPr lang="de-AT" dirty="0"/>
+          </a:p>
+        </p:txBody>
+      </p:sp>
+      <p:sp>
+        <p:nvSpPr>
+          <p:cNvPr id="4" name="Foliennummernplatzhalter 3"/>
+          <p:cNvSpPr>
+            <a:spLocks noGrp="1"/>
+          </p:cNvSpPr>
+          <p:nvPr>
+            <p:ph type="sldNum" sz="quarter" idx="10"/>
+          </p:nvPr>
+        </p:nvSpPr>
+        <p:spPr/>
+        <p:txBody>
+          <a:bodyPr/>
+          <a:lstStyle/>
+          <a:p>
+            <a:fld id="{2AFEA223-4F50-4DD6-9CC4-15E4F51256E0}" type="slidenum">
+              <a:rPr lang="de-AT" smtClean="0"/>
+              <a:t>40</a:t>
+            </a:fld>
+            <a:endParaRPr lang="de-AT"/>
+          </a:p>
+        </p:txBody>
+      </p:sp>
+    </p:spTree>
+    <p:extLst>
+      <p:ext uri="{BB962C8B-B14F-4D97-AF65-F5344CB8AC3E}">
+        <p14:creationId xmlns:p14="http://schemas.microsoft.com/office/powerpoint/2010/main" val="3920727838"/>
+      </p:ext>
+    </p:extLst>
+  </p:cSld>
+  <p:clrMapOvr>
+    <a:masterClrMapping/>
+  </p:clrMapOvr>
+</p:notes>
+</file>
+
+<file path=ppt/notesSlides/notesSlide26.xml><?xml version="1.0" encoding="utf-8"?>
+<p:notes xmlns:a="http://schemas.openxmlformats.org/drawingml/2006/main" xmlns:r="http://schemas.openxmlformats.org/officeDocument/2006/relationships" xmlns:p="http://schemas.openxmlformats.org/presentationml/2006/main">
+  <p:cSld>
+    <p:spTree>
+      <p:nvGrpSpPr>
+        <p:cNvPr id="1" name=""/>
+        <p:cNvGrpSpPr/>
+        <p:nvPr/>
+      </p:nvGrpSpPr>
+      <p:grpSpPr>
+        <a:xfrm>
+          <a:off x="0" y="0"/>
+          <a:ext cx="0" cy="0"/>
+          <a:chOff x="0" y="0"/>
+          <a:chExt cx="0" cy="0"/>
+        </a:xfrm>
+      </p:grpSpPr>
+      <p:sp>
+        <p:nvSpPr>
+          <p:cNvPr id="2" name="Folienbildplatzhalter 1"/>
+          <p:cNvSpPr>
+            <a:spLocks noGrp="1" noRot="1" noChangeAspect="1"/>
+          </p:cNvSpPr>
+          <p:nvPr>
+            <p:ph type="sldImg"/>
+          </p:nvPr>
+        </p:nvSpPr>
+        <p:spPr/>
+      </p:sp>
+      <p:sp>
+        <p:nvSpPr>
+          <p:cNvPr id="3" name="Notizenplatzhalter 2"/>
+          <p:cNvSpPr>
+            <a:spLocks noGrp="1"/>
+          </p:cNvSpPr>
+          <p:nvPr>
+            <p:ph type="body" idx="1"/>
+          </p:nvPr>
+        </p:nvSpPr>
+        <p:spPr/>
+        <p:txBody>
+          <a:bodyPr/>
+          <a:lstStyle/>
+          <a:p>
+            <a:pPr marL="171450" indent="-171450">
+              <a:buFont typeface="Arial" pitchFamily="34" charset="0"/>
+              <a:buChar char="•"/>
+            </a:pPr>
+            <a:r>
+              <a:rPr lang="en-US" dirty="0" smtClean="0"/>
+              <a:t>Depends on system, many don’t implement more</a:t>
+            </a:r>
+            <a:r>
+              <a:rPr lang="en-US" baseline="0" dirty="0" smtClean="0"/>
+              <a:t> complex queries</a:t>
+            </a:r>
+          </a:p>
+          <a:p>
+            <a:pPr marL="171450" indent="-171450">
+              <a:buFont typeface="Arial" pitchFamily="34" charset="0"/>
+              <a:buChar char="•"/>
+            </a:pPr>
+            <a:r>
+              <a:rPr lang="en-US" dirty="0" smtClean="0"/>
+              <a:t>Many systems still under</a:t>
+            </a:r>
+            <a:r>
+              <a:rPr lang="en-US" baseline="0" dirty="0" smtClean="0"/>
+              <a:t> heavy development, not so many features</a:t>
+            </a:r>
+          </a:p>
+          <a:p>
+            <a:pPr marL="171450" indent="-171450">
+              <a:buFont typeface="Arial" pitchFamily="34" charset="0"/>
+              <a:buChar char="•"/>
+            </a:pPr>
+            <a:r>
+              <a:rPr lang="en-US" baseline="0" dirty="0" smtClean="0"/>
+              <a:t>Not as well tested as RDBMS</a:t>
+            </a:r>
+          </a:p>
+          <a:p>
+            <a:pPr marL="171450" indent="-171450">
+              <a:buFont typeface="Arial" pitchFamily="34" charset="0"/>
+              <a:buChar char="•"/>
+            </a:pPr>
+            <a:r>
+              <a:rPr lang="en-US" baseline="0" dirty="0" smtClean="0"/>
+              <a:t>Almost every single system is different with </a:t>
+            </a:r>
+            <a:r>
+              <a:rPr lang="en-US" baseline="0" dirty="0" err="1" smtClean="0"/>
+              <a:t>config</a:t>
+            </a:r>
+            <a:r>
+              <a:rPr lang="en-US" baseline="0" dirty="0" smtClean="0"/>
+              <a:t> and capabilities/features</a:t>
+            </a:r>
+          </a:p>
+          <a:p>
+            <a:pPr marL="171450" indent="-171450">
+              <a:buFont typeface="Arial" pitchFamily="34" charset="0"/>
+              <a:buChar char="•"/>
+            </a:pPr>
+            <a:r>
+              <a:rPr lang="en-US" baseline="0" dirty="0" smtClean="0"/>
+              <a:t>Different query APIs/Languages</a:t>
+            </a:r>
+          </a:p>
+        </p:txBody>
+      </p:sp>
+      <p:sp>
+        <p:nvSpPr>
+          <p:cNvPr id="4" name="Foliennummernplatzhalter 3"/>
+          <p:cNvSpPr>
+            <a:spLocks noGrp="1"/>
+          </p:cNvSpPr>
+          <p:nvPr>
+            <p:ph type="sldNum" sz="quarter" idx="10"/>
+          </p:nvPr>
+        </p:nvSpPr>
+        <p:spPr/>
+        <p:txBody>
+          <a:bodyPr/>
+          <a:lstStyle/>
+          <a:p>
+            <a:fld id="{2AFEA223-4F50-4DD6-9CC4-15E4F51256E0}" type="slidenum">
+              <a:rPr lang="de-AT" smtClean="0"/>
+              <a:t>41</a:t>
+            </a:fld>
+            <a:endParaRPr lang="de-AT"/>
+          </a:p>
+        </p:txBody>
+      </p:sp>
+    </p:spTree>
+    <p:extLst>
+      <p:ext uri="{BB962C8B-B14F-4D97-AF65-F5344CB8AC3E}">
+        <p14:creationId xmlns:p14="http://schemas.microsoft.com/office/powerpoint/2010/main" val="3454228357"/>
+      </p:ext>
+    </p:extLst>
+  </p:cSld>
+  <p:clrMapOvr>
+    <a:masterClrMapping/>
+  </p:clrMapOvr>
+</p:notes>
+</file>
+
+<file path=ppt/notesSlides/notesSlide27.xml><?xml version="1.0" encoding="utf-8"?>
+<p:notes xmlns:a="http://schemas.openxmlformats.org/drawingml/2006/main" xmlns:r="http://schemas.openxmlformats.org/officeDocument/2006/relationships" xmlns:p="http://schemas.openxmlformats.org/presentationml/2006/main">
+  <p:cSld>
+    <p:spTree>
+      <p:nvGrpSpPr>
+        <p:cNvPr id="1" name=""/>
+        <p:cNvGrpSpPr/>
+        <p:nvPr/>
+      </p:nvGrpSpPr>
+      <p:grpSpPr>
+        <a:xfrm>
+          <a:off x="0" y="0"/>
+          <a:ext cx="0" cy="0"/>
+          <a:chOff x="0" y="0"/>
+          <a:chExt cx="0" cy="0"/>
+        </a:xfrm>
+      </p:grpSpPr>
+      <p:sp>
+        <p:nvSpPr>
+          <p:cNvPr id="2" name="Folienbildplatzhalter 1"/>
+          <p:cNvSpPr>
+            <a:spLocks noGrp="1" noRot="1" noChangeAspect="1"/>
+          </p:cNvSpPr>
+          <p:nvPr>
+            <p:ph type="sldImg"/>
+          </p:nvPr>
+        </p:nvSpPr>
+        <p:spPr/>
+      </p:sp>
+      <p:sp>
+        <p:nvSpPr>
+          <p:cNvPr id="3" name="Notizenplatzhalter 2"/>
+          <p:cNvSpPr>
+            <a:spLocks noGrp="1"/>
+          </p:cNvSpPr>
+          <p:nvPr>
+            <p:ph type="body" idx="1"/>
+          </p:nvPr>
+        </p:nvSpPr>
+        <p:spPr/>
+        <p:txBody>
+          <a:bodyPr/>
+          <a:lstStyle/>
+          <a:p>
+            <a:r>
+              <a:rPr lang="en-US" dirty="0" smtClean="0"/>
+              <a:t>Name from “humongous”, written in C++, AGPL, Version 2.4.3</a:t>
+            </a:r>
+          </a:p>
+          <a:p>
+            <a:endParaRPr lang="en-US" dirty="0" smtClean="0"/>
+          </a:p>
+          <a:p>
+            <a:pPr marL="171450" indent="-171450">
+              <a:buFont typeface="Arial" pitchFamily="34" charset="0"/>
+              <a:buChar char="•"/>
+            </a:pPr>
+            <a:r>
+              <a:rPr lang="en-US" dirty="0" smtClean="0"/>
+              <a:t>Linux,</a:t>
+            </a:r>
+            <a:r>
+              <a:rPr lang="en-US" baseline="0" dirty="0" smtClean="0"/>
+              <a:t> Windows, Mac OSX, Solaris (64bit only) -&gt; Data in memory -&gt; 32bit limited to 2GB</a:t>
+            </a:r>
+          </a:p>
+          <a:p>
+            <a:pPr marL="171450" indent="-171450">
+              <a:buFont typeface="Arial" pitchFamily="34" charset="0"/>
+              <a:buChar char="•"/>
+            </a:pPr>
+            <a:r>
+              <a:rPr lang="en-US" baseline="0" dirty="0" smtClean="0"/>
+              <a:t>DBs with name, like in RDBMS</a:t>
+            </a:r>
+          </a:p>
+          <a:p>
+            <a:pPr marL="171450" indent="-171450">
+              <a:buFont typeface="Arial" pitchFamily="34" charset="0"/>
+              <a:buChar char="•"/>
+            </a:pPr>
+            <a:r>
+              <a:rPr lang="en-US" baseline="0" dirty="0" smtClean="0"/>
+              <a:t>The “tables” of </a:t>
+            </a:r>
+            <a:r>
+              <a:rPr lang="en-US" baseline="0" dirty="0" err="1" smtClean="0"/>
+              <a:t>MongoDB</a:t>
+            </a:r>
+            <a:r>
+              <a:rPr lang="en-US" baseline="0" dirty="0" smtClean="0"/>
+              <a:t>. Also Capped Collections -&gt; limited in size (ring buffer)</a:t>
+            </a:r>
+          </a:p>
+          <a:p>
+            <a:pPr marL="171450" indent="-171450">
+              <a:buFont typeface="Arial" pitchFamily="34" charset="0"/>
+              <a:buChar char="•"/>
+            </a:pPr>
+            <a:r>
+              <a:rPr lang="en-US" baseline="0" dirty="0" smtClean="0"/>
+              <a:t>Called </a:t>
+            </a:r>
+            <a:r>
+              <a:rPr lang="en-US" baseline="0" dirty="0" err="1" smtClean="0"/>
+              <a:t>DBRef</a:t>
+            </a:r>
+            <a:r>
+              <a:rPr lang="en-US" baseline="0" dirty="0" smtClean="0"/>
+              <a:t>, references other document. Can be resolved via drivers</a:t>
+            </a:r>
+          </a:p>
+          <a:p>
+            <a:pPr marL="171450" indent="-171450">
+              <a:buFont typeface="Arial" pitchFamily="34" charset="0"/>
+              <a:buChar char="•"/>
+            </a:pPr>
+            <a:r>
+              <a:rPr lang="en-US" baseline="0" dirty="0" err="1" smtClean="0"/>
+              <a:t>GridFS</a:t>
+            </a:r>
+            <a:r>
+              <a:rPr lang="en-US" baseline="0" dirty="0" smtClean="0"/>
+              <a:t> to store files. </a:t>
+            </a:r>
+            <a:r>
+              <a:rPr lang="en-US" baseline="0" dirty="0" err="1" smtClean="0"/>
+              <a:t>fs.files</a:t>
+            </a:r>
+            <a:r>
+              <a:rPr lang="en-US" baseline="0" dirty="0" smtClean="0"/>
+              <a:t> (length, </a:t>
+            </a:r>
+            <a:r>
+              <a:rPr lang="en-US" baseline="0" dirty="0" err="1" smtClean="0"/>
+              <a:t>chunkSize</a:t>
+            </a:r>
+            <a:r>
+              <a:rPr lang="en-US" baseline="0" dirty="0" smtClean="0"/>
+              <a:t>, </a:t>
+            </a:r>
+            <a:r>
+              <a:rPr lang="en-US" baseline="0" dirty="0" err="1" smtClean="0"/>
+              <a:t>uploadDate</a:t>
+            </a:r>
+            <a:r>
+              <a:rPr lang="en-US" baseline="0" dirty="0" smtClean="0"/>
+              <a:t>, md5), </a:t>
+            </a:r>
+            <a:r>
+              <a:rPr lang="en-US" baseline="0" dirty="0" err="1" smtClean="0"/>
+              <a:t>fs.chunks</a:t>
+            </a:r>
+            <a:endParaRPr lang="en-US" baseline="0" dirty="0" smtClean="0"/>
+          </a:p>
+          <a:p>
+            <a:pPr marL="171450" indent="-171450">
+              <a:buFont typeface="Arial" pitchFamily="34" charset="0"/>
+              <a:buChar char="•"/>
+            </a:pPr>
+            <a:r>
+              <a:rPr lang="en-US" baseline="0" dirty="0" smtClean="0"/>
+              <a:t>For many languages: e.g. C, C++, C#, Java, PHP, JavaScript, Node.js, </a:t>
+            </a:r>
+            <a:r>
+              <a:rPr lang="en-US" baseline="0" dirty="0" err="1" smtClean="0"/>
+              <a:t>Erlang</a:t>
+            </a:r>
+            <a:r>
+              <a:rPr lang="en-US" baseline="0" dirty="0" smtClean="0"/>
+              <a:t>, Perl, Python, Ruby, </a:t>
+            </a:r>
+            <a:r>
+              <a:rPr lang="en-US" baseline="0" dirty="0" err="1" smtClean="0"/>
+              <a:t>Scala</a:t>
+            </a:r>
+            <a:r>
+              <a:rPr lang="en-US" baseline="0" dirty="0" smtClean="0"/>
+              <a:t> + Community supported drivers.</a:t>
+            </a:r>
+          </a:p>
+          <a:p>
+            <a:pPr marL="171450" indent="-171450">
+              <a:buFont typeface="Arial" pitchFamily="34" charset="0"/>
+              <a:buChar char="•"/>
+            </a:pPr>
+            <a:endParaRPr lang="de-AT" dirty="0"/>
+          </a:p>
+        </p:txBody>
+      </p:sp>
+      <p:sp>
+        <p:nvSpPr>
+          <p:cNvPr id="4" name="Foliennummernplatzhalter 3"/>
+          <p:cNvSpPr>
+            <a:spLocks noGrp="1"/>
+          </p:cNvSpPr>
+          <p:nvPr>
+            <p:ph type="sldNum" sz="quarter" idx="10"/>
+          </p:nvPr>
+        </p:nvSpPr>
+        <p:spPr/>
+        <p:txBody>
+          <a:bodyPr/>
+          <a:lstStyle/>
+          <a:p>
+            <a:fld id="{2AFEA223-4F50-4DD6-9CC4-15E4F51256E0}" type="slidenum">
+              <a:rPr lang="de-AT" smtClean="0"/>
+              <a:t>42</a:t>
+            </a:fld>
+            <a:endParaRPr lang="de-AT"/>
+          </a:p>
+        </p:txBody>
+      </p:sp>
+    </p:spTree>
+    <p:extLst>
+      <p:ext uri="{BB962C8B-B14F-4D97-AF65-F5344CB8AC3E}">
+        <p14:creationId xmlns:p14="http://schemas.microsoft.com/office/powerpoint/2010/main" val="2598146490"/>
+      </p:ext>
+    </p:extLst>
+  </p:cSld>
+  <p:clrMapOvr>
+    <a:masterClrMapping/>
+  </p:clrMapOvr>
+</p:notes>
+</file>
+
+<file path=ppt/notesSlides/notesSlide28.xml><?xml version="1.0" encoding="utf-8"?>
+<p:notes xmlns:a="http://schemas.openxmlformats.org/drawingml/2006/main" xmlns:r="http://schemas.openxmlformats.org/officeDocument/2006/relationships" xmlns:p="http://schemas.openxmlformats.org/presentationml/2006/main">
+  <p:cSld>
+    <p:spTree>
+      <p:nvGrpSpPr>
+        <p:cNvPr id="1" name=""/>
+        <p:cNvGrpSpPr/>
+        <p:nvPr/>
+      </p:nvGrpSpPr>
+      <p:grpSpPr>
+        <a:xfrm>
+          <a:off x="0" y="0"/>
+          <a:ext cx="0" cy="0"/>
+          <a:chOff x="0" y="0"/>
+          <a:chExt cx="0" cy="0"/>
+        </a:xfrm>
+      </p:grpSpPr>
+      <p:sp>
+        <p:nvSpPr>
+          <p:cNvPr id="2" name="Folienbildplatzhalter 1"/>
+          <p:cNvSpPr>
+            <a:spLocks noGrp="1" noRot="1" noChangeAspect="1"/>
+          </p:cNvSpPr>
+          <p:nvPr>
+            <p:ph type="sldImg"/>
+          </p:nvPr>
+        </p:nvSpPr>
+        <p:spPr/>
+      </p:sp>
+      <p:sp>
+        <p:nvSpPr>
+          <p:cNvPr id="3" name="Notizenplatzhalter 2"/>
+          <p:cNvSpPr>
+            <a:spLocks noGrp="1"/>
+          </p:cNvSpPr>
+          <p:nvPr>
+            <p:ph type="body" idx="1"/>
+          </p:nvPr>
+        </p:nvSpPr>
+        <p:spPr/>
+        <p:txBody>
+          <a:bodyPr/>
+          <a:lstStyle/>
+          <a:p>
+            <a:pPr marL="171450" indent="-171450">
+              <a:buFont typeface="Arial" pitchFamily="34" charset="0"/>
+              <a:buChar char="•"/>
+            </a:pPr>
+            <a:r>
+              <a:rPr lang="en-US" dirty="0" smtClean="0"/>
+              <a:t>Sanity size, no real limitation.</a:t>
+            </a:r>
+            <a:r>
+              <a:rPr lang="en-US" baseline="0" dirty="0" smtClean="0"/>
+              <a:t> Bigger files -&gt; </a:t>
+            </a:r>
+            <a:r>
+              <a:rPr lang="en-US" baseline="0" dirty="0" err="1" smtClean="0"/>
+              <a:t>GridFS</a:t>
+            </a:r>
+            <a:endParaRPr lang="en-US" baseline="0" dirty="0" smtClean="0"/>
+          </a:p>
+          <a:p>
+            <a:pPr marL="171450" indent="-171450">
+              <a:buFont typeface="Arial" pitchFamily="34" charset="0"/>
+              <a:buChar char="•"/>
+            </a:pPr>
+            <a:r>
+              <a:rPr lang="en-US" baseline="0" dirty="0" smtClean="0"/>
+              <a:t>Also </a:t>
+            </a:r>
+            <a:r>
+              <a:rPr lang="en-US" baseline="0" dirty="0" err="1" smtClean="0"/>
+              <a:t>ReplicaSet</a:t>
+            </a:r>
+            <a:r>
+              <a:rPr lang="en-US" baseline="0" dirty="0" smtClean="0"/>
+              <a:t> configuration for bigger replication clusters</a:t>
+            </a:r>
+          </a:p>
+          <a:p>
+            <a:pPr marL="171450" indent="-171450">
+              <a:buFont typeface="Arial" pitchFamily="34" charset="0"/>
+              <a:buChar char="•"/>
+            </a:pPr>
+            <a:r>
+              <a:rPr lang="en-US" baseline="0" dirty="0" smtClean="0"/>
+              <a:t>Provide a shard key and the nodes </a:t>
+            </a:r>
+            <a:r>
+              <a:rPr lang="en-US" baseline="0" dirty="0" err="1" smtClean="0"/>
+              <a:t>config</a:t>
+            </a:r>
+            <a:r>
+              <a:rPr lang="en-US" baseline="0" dirty="0" smtClean="0"/>
+              <a:t> -&gt; </a:t>
+            </a:r>
+            <a:r>
+              <a:rPr lang="en-US" baseline="0" dirty="0" err="1" smtClean="0"/>
+              <a:t>MongoDB</a:t>
+            </a:r>
+            <a:r>
+              <a:rPr lang="en-US" baseline="0" dirty="0" smtClean="0"/>
+              <a:t> does the rest</a:t>
+            </a:r>
+          </a:p>
+          <a:p>
+            <a:pPr marL="171450" indent="-171450">
+              <a:buFont typeface="Arial" pitchFamily="34" charset="0"/>
+              <a:buChar char="•"/>
+            </a:pPr>
+            <a:r>
+              <a:rPr lang="en-US" baseline="0" dirty="0" smtClean="0"/>
+              <a:t>Arbitrary fields, even in nested documents/arrays. Compound indexes possible. Unique indexes, Geospatial</a:t>
+            </a:r>
+          </a:p>
+          <a:p>
+            <a:pPr marL="171450" indent="-171450">
+              <a:buFont typeface="Arial" pitchFamily="34" charset="0"/>
+              <a:buChar char="•"/>
+            </a:pPr>
+            <a:r>
+              <a:rPr lang="en-US" baseline="0" dirty="0" smtClean="0"/>
+              <a:t>JavaScript-like query language. A lot of different queries supported, including array operations</a:t>
+            </a:r>
+            <a:endParaRPr lang="de-AT" dirty="0"/>
+          </a:p>
+        </p:txBody>
+      </p:sp>
+      <p:sp>
+        <p:nvSpPr>
+          <p:cNvPr id="4" name="Foliennummernplatzhalter 3"/>
+          <p:cNvSpPr>
+            <a:spLocks noGrp="1"/>
+          </p:cNvSpPr>
+          <p:nvPr>
+            <p:ph type="sldNum" sz="quarter" idx="10"/>
+          </p:nvPr>
+        </p:nvSpPr>
+        <p:spPr/>
+        <p:txBody>
+          <a:bodyPr/>
+          <a:lstStyle/>
+          <a:p>
+            <a:fld id="{2AFEA223-4F50-4DD6-9CC4-15E4F51256E0}" type="slidenum">
+              <a:rPr lang="de-AT" smtClean="0"/>
+              <a:t>43</a:t>
+            </a:fld>
+            <a:endParaRPr lang="de-AT"/>
+          </a:p>
+        </p:txBody>
+      </p:sp>
+    </p:spTree>
+    <p:extLst>
+      <p:ext uri="{BB962C8B-B14F-4D97-AF65-F5344CB8AC3E}">
+        <p14:creationId xmlns:p14="http://schemas.microsoft.com/office/powerpoint/2010/main" val="1569297386"/>
+      </p:ext>
+    </p:extLst>
+  </p:cSld>
+  <p:clrMapOvr>
+    <a:masterClrMapping/>
+  </p:clrMapOvr>
+</p:notes>
+</file>
+
+<file path=ppt/notesSlides/notesSlide29.xml><?xml version="1.0" encoding="utf-8"?>
+<p:notes xmlns:a="http://schemas.openxmlformats.org/drawingml/2006/main" xmlns:r="http://schemas.openxmlformats.org/officeDocument/2006/relationships" xmlns:p="http://schemas.openxmlformats.org/presentationml/2006/main">
+  <p:cSld>
+    <p:spTree>
+      <p:nvGrpSpPr>
+        <p:cNvPr id="1" name=""/>
+        <p:cNvGrpSpPr/>
+        <p:nvPr/>
+      </p:nvGrpSpPr>
+      <p:grpSpPr>
+        <a:xfrm>
+          <a:off x="0" y="0"/>
+          <a:ext cx="0" cy="0"/>
+          <a:chOff x="0" y="0"/>
+          <a:chExt cx="0" cy="0"/>
+        </a:xfrm>
+      </p:grpSpPr>
+      <p:sp>
+        <p:nvSpPr>
+          <p:cNvPr id="2" name="Folienbildplatzhalter 1"/>
+          <p:cNvSpPr>
+            <a:spLocks noGrp="1" noRot="1" noChangeAspect="1"/>
+          </p:cNvSpPr>
+          <p:nvPr>
+            <p:ph type="sldImg"/>
+          </p:nvPr>
+        </p:nvSpPr>
+        <p:spPr/>
+      </p:sp>
+      <p:sp>
+        <p:nvSpPr>
+          <p:cNvPr id="3" name="Notizenplatzhalter 2"/>
+          <p:cNvSpPr>
+            <a:spLocks noGrp="1"/>
+          </p:cNvSpPr>
+          <p:nvPr>
+            <p:ph type="body" idx="1"/>
+          </p:nvPr>
+        </p:nvSpPr>
+        <p:spPr/>
+        <p:txBody>
+          <a:bodyPr/>
+          <a:lstStyle/>
+          <a:p>
+            <a:pPr marL="171450" indent="-171450">
+              <a:buFont typeface="Arial" pitchFamily="34" charset="0"/>
+              <a:buChar char="•"/>
+            </a:pPr>
+            <a:r>
+              <a:rPr lang="en-US" dirty="0" smtClean="0"/>
+              <a:t>Binary JSON</a:t>
+            </a:r>
+          </a:p>
+          <a:p>
+            <a:pPr marL="171450" indent="-171450">
+              <a:buFont typeface="Arial" pitchFamily="34" charset="0"/>
+              <a:buChar char="•"/>
+            </a:pPr>
+            <a:r>
+              <a:rPr lang="en-US" dirty="0" smtClean="0"/>
+              <a:t>Plain</a:t>
+            </a:r>
+            <a:r>
+              <a:rPr lang="en-US" baseline="0" dirty="0" smtClean="0"/>
+              <a:t> JSON types</a:t>
+            </a:r>
+          </a:p>
+          <a:p>
+            <a:pPr marL="171450" indent="-171450">
+              <a:buFont typeface="Arial" pitchFamily="34" charset="0"/>
+              <a:buChar char="•"/>
+            </a:pPr>
+            <a:r>
+              <a:rPr lang="en-US" baseline="0" dirty="0" smtClean="0"/>
+              <a:t>For times, dates</a:t>
+            </a:r>
+          </a:p>
+          <a:p>
+            <a:pPr marL="171450" indent="-171450">
+              <a:buFont typeface="Arial" pitchFamily="34" charset="0"/>
+              <a:buChar char="•"/>
+            </a:pPr>
+            <a:r>
+              <a:rPr lang="en-US" baseline="0" dirty="0" smtClean="0"/>
+              <a:t>Regular expressions</a:t>
+            </a:r>
+          </a:p>
+          <a:p>
+            <a:pPr marL="171450" indent="-171450">
+              <a:buFont typeface="Arial" pitchFamily="34" charset="0"/>
+              <a:buChar char="•"/>
+            </a:pPr>
+            <a:r>
+              <a:rPr lang="en-US" baseline="0" dirty="0" smtClean="0"/>
+              <a:t>For JavaScript code to run on the server (with evil </a:t>
+            </a:r>
+            <a:r>
+              <a:rPr lang="en-US" baseline="0" dirty="0" err="1" smtClean="0"/>
+              <a:t>eval</a:t>
+            </a:r>
+            <a:r>
+              <a:rPr lang="en-US" baseline="0" dirty="0" smtClean="0"/>
+              <a:t>() )</a:t>
+            </a:r>
+          </a:p>
+          <a:p>
+            <a:pPr marL="171450" indent="-171450">
+              <a:buFont typeface="Arial" pitchFamily="34" charset="0"/>
+              <a:buChar char="•"/>
+            </a:pPr>
+            <a:r>
+              <a:rPr lang="en-US" baseline="0" dirty="0" smtClean="0"/>
+              <a:t>Nesting of documents within documents</a:t>
+            </a:r>
+            <a:endParaRPr lang="de-AT" dirty="0"/>
+          </a:p>
+        </p:txBody>
+      </p:sp>
+      <p:sp>
+        <p:nvSpPr>
+          <p:cNvPr id="4" name="Foliennummernplatzhalter 3"/>
+          <p:cNvSpPr>
+            <a:spLocks noGrp="1"/>
+          </p:cNvSpPr>
+          <p:nvPr>
+            <p:ph type="sldNum" sz="quarter" idx="10"/>
+          </p:nvPr>
+        </p:nvSpPr>
+        <p:spPr/>
+        <p:txBody>
+          <a:bodyPr/>
+          <a:lstStyle/>
+          <a:p>
+            <a:fld id="{2AFEA223-4F50-4DD6-9CC4-15E4F51256E0}" type="slidenum">
+              <a:rPr lang="de-AT" smtClean="0"/>
+              <a:t>44</a:t>
+            </a:fld>
+            <a:endParaRPr lang="de-AT"/>
+          </a:p>
+        </p:txBody>
+      </p:sp>
+    </p:spTree>
+    <p:extLst>
+      <p:ext uri="{BB962C8B-B14F-4D97-AF65-F5344CB8AC3E}">
+        <p14:creationId xmlns:p14="http://schemas.microsoft.com/office/powerpoint/2010/main" val="2253184238"/>
       </p:ext>
     </p:extLst>
   </p:cSld>
@@ -3697,7 +4871,7 @@
           <a:p>
             <a:fld id="{BD334F44-700B-E44C-96AB-E83A6820DFD3}" type="datetimeFigureOut">
               <a:rPr lang="de-DE" smtClean="0"/>
-              <a:t>02.06.2013</a:t>
+              <a:t>03.06.2013</a:t>
             </a:fld>
             <a:endParaRPr lang="de-DE"/>
           </a:p>
@@ -3877,7 +5051,7 @@
           <a:p>
             <a:fld id="{BD334F44-700B-E44C-96AB-E83A6820DFD3}" type="datetimeFigureOut">
               <a:rPr lang="de-DE" smtClean="0"/>
-              <a:t>02.06.2013</a:t>
+              <a:t>03.06.2013</a:t>
             </a:fld>
             <a:endParaRPr lang="de-DE"/>
           </a:p>
@@ -4057,7 +5231,7 @@
           <a:p>
             <a:fld id="{BD334F44-700B-E44C-96AB-E83A6820DFD3}" type="datetimeFigureOut">
               <a:rPr lang="de-DE" smtClean="0"/>
-              <a:t>02.06.2013</a:t>
+              <a:t>03.06.2013</a:t>
             </a:fld>
             <a:endParaRPr lang="de-DE"/>
           </a:p>
@@ -4310,7 +5484,7 @@
           <a:p>
             <a:fld id="{BD334F44-700B-E44C-96AB-E83A6820DFD3}" type="datetimeFigureOut">
               <a:rPr lang="de-DE" smtClean="0"/>
-              <a:t>02.06.2013</a:t>
+              <a:t>03.06.2013</a:t>
             </a:fld>
             <a:endParaRPr lang="de-DE"/>
           </a:p>
@@ -4598,7 +5772,7 @@
           <a:p>
             <a:fld id="{BD334F44-700B-E44C-96AB-E83A6820DFD3}" type="datetimeFigureOut">
               <a:rPr lang="de-DE" smtClean="0"/>
-              <a:t>02.06.2013</a:t>
+              <a:t>03.06.2013</a:t>
             </a:fld>
             <a:endParaRPr lang="de-DE"/>
           </a:p>
@@ -5020,7 +6194,7 @@
           <a:p>
             <a:fld id="{BD334F44-700B-E44C-96AB-E83A6820DFD3}" type="datetimeFigureOut">
               <a:rPr lang="de-DE" smtClean="0"/>
-              <a:t>02.06.2013</a:t>
+              <a:t>03.06.2013</a:t>
             </a:fld>
             <a:endParaRPr lang="de-DE"/>
           </a:p>
@@ -5138,7 +6312,7 @@
           <a:p>
             <a:fld id="{BD334F44-700B-E44C-96AB-E83A6820DFD3}" type="datetimeFigureOut">
               <a:rPr lang="de-DE" smtClean="0"/>
-              <a:t>02.06.2013</a:t>
+              <a:t>03.06.2013</a:t>
             </a:fld>
             <a:endParaRPr lang="de-DE"/>
           </a:p>
@@ -5233,7 +6407,7 @@
           <a:p>
             <a:fld id="{BD334F44-700B-E44C-96AB-E83A6820DFD3}" type="datetimeFigureOut">
               <a:rPr lang="de-DE" smtClean="0"/>
-              <a:t>02.06.2013</a:t>
+              <a:t>03.06.2013</a:t>
             </a:fld>
             <a:endParaRPr lang="de-DE"/>
           </a:p>
@@ -5556,7 +6730,7 @@
           <a:p>
             <a:fld id="{BD334F44-700B-E44C-96AB-E83A6820DFD3}" type="datetimeFigureOut">
               <a:rPr lang="de-DE" smtClean="0"/>
-              <a:t>02.06.2013</a:t>
+              <a:t>03.06.2013</a:t>
             </a:fld>
             <a:endParaRPr lang="de-DE"/>
           </a:p>
@@ -5809,7 +6983,7 @@
           <a:p>
             <a:fld id="{BD334F44-700B-E44C-96AB-E83A6820DFD3}" type="datetimeFigureOut">
               <a:rPr lang="de-DE" smtClean="0"/>
-              <a:t>02.06.2013</a:t>
+              <a:t>03.06.2013</a:t>
             </a:fld>
             <a:endParaRPr lang="de-DE"/>
           </a:p>
@@ -6022,7 +7196,7 @@
           <a:p>
             <a:fld id="{BD334F44-700B-E44C-96AB-E83A6820DFD3}" type="datetimeFigureOut">
               <a:rPr lang="de-DE" smtClean="0"/>
-              <a:t>02.06.2013</a:t>
+              <a:t>03.06.2013</a:t>
             </a:fld>
             <a:endParaRPr lang="de-DE"/>
           </a:p>
@@ -11588,7 +12762,11 @@
           <a:p>
             <a:r>
               <a:rPr lang="en-US" dirty="0" smtClean="0"/>
-              <a:t>Key/Value – Data types</a:t>
+              <a:t>KVS – </a:t>
+            </a:r>
+            <a:r>
+              <a:rPr lang="en-US" dirty="0" smtClean="0"/>
+              <a:t>Data types</a:t>
             </a:r>
             <a:endParaRPr lang="de-AT" dirty="0"/>
           </a:p>
@@ -11728,7 +12906,11 @@
           <a:p>
             <a:r>
               <a:rPr lang="en-US" dirty="0" smtClean="0"/>
-              <a:t>Key/Value – Operations</a:t>
+              <a:t>KVS – </a:t>
+            </a:r>
+            <a:r>
+              <a:rPr lang="en-US" dirty="0" smtClean="0"/>
+              <a:t>Operations</a:t>
             </a:r>
             <a:endParaRPr lang="de-AT" dirty="0"/>
           </a:p>
@@ -11868,7 +13050,11 @@
           <a:p>
             <a:r>
               <a:rPr lang="en-US" dirty="0" smtClean="0"/>
-              <a:t>Key/Value – Scaling</a:t>
+              <a:t>KVS – </a:t>
+            </a:r>
+            <a:r>
+              <a:rPr lang="en-US" dirty="0" smtClean="0"/>
+              <a:t>Scaling</a:t>
             </a:r>
             <a:endParaRPr lang="de-AT" dirty="0"/>
           </a:p>
@@ -12290,7 +13476,11 @@
           <a:p>
             <a:r>
               <a:rPr lang="en-US" dirty="0" smtClean="0"/>
-              <a:t>Key/Value – Use</a:t>
+              <a:t>KVS – </a:t>
+            </a:r>
+            <a:r>
+              <a:rPr lang="en-US" dirty="0" smtClean="0"/>
+              <a:t>Use</a:t>
             </a:r>
             <a:endParaRPr lang="de-AT" dirty="0"/>
           </a:p>
@@ -12589,10 +13779,86 @@
           <a:bodyPr/>
           <a:lstStyle/>
           <a:p>
+            <a:endParaRPr lang="en-US" dirty="0" smtClean="0"/>
+          </a:p>
+          <a:p>
+            <a:r>
+              <a:rPr lang="en-US" dirty="0" smtClean="0"/>
+              <a:t>Overview &amp; Definition</a:t>
+            </a:r>
+          </a:p>
+          <a:p>
+            <a:r>
+              <a:rPr lang="en-US" dirty="0" smtClean="0"/>
+              <a:t>Consistency</a:t>
+            </a:r>
+          </a:p>
+          <a:p>
+            <a:r>
+              <a:rPr lang="en-US" dirty="0" smtClean="0"/>
+              <a:t>Scaling &amp; </a:t>
+            </a:r>
+            <a:r>
+              <a:rPr lang="en-US" dirty="0" err="1" smtClean="0"/>
+              <a:t>MapReduce</a:t>
+            </a:r>
+            <a:endParaRPr lang="en-US" dirty="0" smtClean="0"/>
+          </a:p>
+          <a:p>
+            <a:r>
+              <a:rPr lang="en-US" dirty="0" smtClean="0"/>
+              <a:t>Types of </a:t>
+            </a:r>
+            <a:r>
+              <a:rPr lang="en-US" dirty="0" err="1" smtClean="0"/>
+              <a:t>NoSQL</a:t>
+            </a:r>
+            <a:endParaRPr lang="en-US" dirty="0" smtClean="0"/>
+          </a:p>
+          <a:p>
+            <a:r>
+              <a:rPr lang="en-US" dirty="0" smtClean="0"/>
+              <a:t>Demo?</a:t>
+            </a:r>
+          </a:p>
+          <a:p>
+            <a:endParaRPr lang="en-US" dirty="0" smtClean="0"/>
+          </a:p>
+          <a:p>
             <a:endParaRPr lang="de-AT" dirty="0"/>
           </a:p>
         </p:txBody>
       </p:sp>
+      <p:pic>
+        <p:nvPicPr>
+          <p:cNvPr id="4" name="Grafik 3"/>
+          <p:cNvPicPr>
+            <a:picLocks noChangeAspect="1"/>
+          </p:cNvPicPr>
+          <p:nvPr/>
+        </p:nvPicPr>
+        <p:blipFill>
+          <a:blip r:embed="rId2">
+            <a:extLst>
+              <a:ext uri="{28A0092B-C50C-407E-A947-70E740481C1C}">
+                <a14:useLocalDpi xmlns:a14="http://schemas.microsoft.com/office/drawing/2010/main" val="0"/>
+              </a:ext>
+            </a:extLst>
+          </a:blip>
+          <a:stretch>
+            <a:fillRect/>
+          </a:stretch>
+        </p:blipFill>
+        <p:spPr>
+          <a:xfrm>
+            <a:off x="5966591" y="2634139"/>
+            <a:ext cx="2598882" cy="2539223"/>
+          </a:xfrm>
+          <a:prstGeom prst="rect">
+            <a:avLst/>
+          </a:prstGeom>
+        </p:spPr>
+      </p:pic>
     </p:spTree>
     <p:extLst>
       <p:ext uri="{BB962C8B-B14F-4D97-AF65-F5344CB8AC3E}">
@@ -12647,7 +13913,11 @@
           <a:p>
             <a:r>
               <a:rPr lang="en-US" dirty="0" smtClean="0"/>
-              <a:t>Document – Data format</a:t>
+              <a:t>DS – </a:t>
+            </a:r>
+            <a:r>
+              <a:rPr lang="en-US" dirty="0" smtClean="0"/>
+              <a:t>Data format</a:t>
             </a:r>
             <a:endParaRPr lang="de-AT" dirty="0"/>
           </a:p>
@@ -13256,7 +14526,11 @@
           <a:p>
             <a:r>
               <a:rPr lang="en-US" dirty="0" smtClean="0"/>
-              <a:t>Document – Features</a:t>
+              <a:t>DS – </a:t>
+            </a:r>
+            <a:r>
+              <a:rPr lang="en-US" dirty="0" smtClean="0"/>
+              <a:t>Features</a:t>
             </a:r>
             <a:endParaRPr lang="de-AT" dirty="0"/>
           </a:p>
@@ -13401,7 +14675,11 @@
           <a:p>
             <a:r>
               <a:rPr lang="en-US" dirty="0" smtClean="0"/>
-              <a:t>Document – Use</a:t>
+              <a:t>DS – </a:t>
+            </a:r>
+            <a:r>
+              <a:rPr lang="en-US" dirty="0" smtClean="0"/>
+              <a:t>Use</a:t>
             </a:r>
             <a:endParaRPr lang="de-AT" dirty="0"/>
           </a:p>
@@ -15412,7 +16690,7 @@
           <p:nvPr/>
         </p:nvPicPr>
         <p:blipFill>
-          <a:blip r:embed="rId2">
+          <a:blip r:embed="rId3">
             <a:extLst>
               <a:ext uri="{28A0092B-C50C-407E-A947-70E740481C1C}">
                 <a14:useLocalDpi xmlns:a14="http://schemas.microsoft.com/office/drawing/2010/main" val="0"/>
@@ -15487,7 +16765,7 @@
           <a:p>
             <a:r>
               <a:rPr lang="en-US" dirty="0" smtClean="0"/>
-              <a:t>RDMS – doomed to die?</a:t>
+              <a:t>GD – Data model</a:t>
             </a:r>
             <a:endParaRPr lang="de-AT" dirty="0"/>
           </a:p>
@@ -15508,14 +16786,951 @@
           <a:bodyPr/>
           <a:lstStyle/>
           <a:p>
-            <a:endParaRPr lang="de-AT"/>
+            <a:endParaRPr lang="de-AT" dirty="0"/>
+          </a:p>
+        </p:txBody>
+      </p:sp>
+      <p:graphicFrame>
+        <p:nvGraphicFramePr>
+          <p:cNvPr id="4" name="Tabelle 3"/>
+          <p:cNvGraphicFramePr>
+            <a:graphicFrameLocks noGrp="1"/>
+          </p:cNvGraphicFramePr>
+          <p:nvPr>
+            <p:extLst>
+              <p:ext uri="{D42A27DB-BD31-4B8C-83A1-F6EECF244321}">
+                <p14:modId xmlns:p14="http://schemas.microsoft.com/office/powerpoint/2010/main" val="204748624"/>
+              </p:ext>
+            </p:extLst>
+          </p:nvPr>
+        </p:nvGraphicFramePr>
+        <p:xfrm>
+          <a:off x="4036541" y="1831746"/>
+          <a:ext cx="2649475" cy="1112520"/>
+        </p:xfrm>
+        <a:graphic>
+          <a:graphicData uri="http://schemas.openxmlformats.org/drawingml/2006/table">
+            <a:tbl>
+              <a:tblPr firstRow="1" bandRow="1">
+                <a:tableStyleId>{5C22544A-7EE6-4342-B048-85BDC9FD1C3A}</a:tableStyleId>
+              </a:tblPr>
+              <a:tblGrid>
+                <a:gridCol w="762318"/>
+                <a:gridCol w="1887157"/>
+              </a:tblGrid>
+              <a:tr h="370840">
+                <a:tc>
+                  <a:txBody>
+                    <a:bodyPr/>
+                    <a:lstStyle/>
+                    <a:p>
+                      <a:r>
+                        <a:rPr lang="en-US" dirty="0" smtClean="0"/>
+                        <a:t>id</a:t>
+                      </a:r>
+                      <a:endParaRPr lang="de-AT" dirty="0"/>
+                    </a:p>
+                  </a:txBody>
+                  <a:tcPr/>
+                </a:tc>
+                <a:tc>
+                  <a:txBody>
+                    <a:bodyPr/>
+                    <a:lstStyle/>
+                    <a:p>
+                      <a:r>
+                        <a:rPr lang="en-US" dirty="0" smtClean="0"/>
+                        <a:t>movie_1</a:t>
+                      </a:r>
+                      <a:endParaRPr lang="de-AT" dirty="0"/>
+                    </a:p>
+                  </a:txBody>
+                  <a:tcPr/>
+                </a:tc>
+              </a:tr>
+              <a:tr h="370840">
+                <a:tc>
+                  <a:txBody>
+                    <a:bodyPr/>
+                    <a:lstStyle/>
+                    <a:p>
+                      <a:r>
+                        <a:rPr lang="en-US" dirty="0" smtClean="0"/>
+                        <a:t>name</a:t>
+                      </a:r>
+                      <a:endParaRPr lang="de-AT" dirty="0"/>
+                    </a:p>
+                  </a:txBody>
+                  <a:tcPr/>
+                </a:tc>
+                <a:tc>
+                  <a:txBody>
+                    <a:bodyPr/>
+                    <a:lstStyle/>
+                    <a:p>
+                      <a:r>
+                        <a:rPr lang="en-US" dirty="0" smtClean="0"/>
+                        <a:t>“The Delta Force”</a:t>
+                      </a:r>
+                      <a:endParaRPr lang="de-AT" dirty="0"/>
+                    </a:p>
+                  </a:txBody>
+                  <a:tcPr/>
+                </a:tc>
+              </a:tr>
+              <a:tr h="370840">
+                <a:tc>
+                  <a:txBody>
+                    <a:bodyPr/>
+                    <a:lstStyle/>
+                    <a:p>
+                      <a:r>
+                        <a:rPr lang="en-US" dirty="0" smtClean="0"/>
+                        <a:t>year</a:t>
+                      </a:r>
+                      <a:endParaRPr lang="de-AT" dirty="0"/>
+                    </a:p>
+                  </a:txBody>
+                  <a:tcPr/>
+                </a:tc>
+                <a:tc>
+                  <a:txBody>
+                    <a:bodyPr/>
+                    <a:lstStyle/>
+                    <a:p>
+                      <a:r>
+                        <a:rPr lang="en-US" dirty="0" smtClean="0"/>
+                        <a:t>1986</a:t>
+                      </a:r>
+                      <a:endParaRPr lang="de-AT" dirty="0"/>
+                    </a:p>
+                  </a:txBody>
+                  <a:tcPr/>
+                </a:tc>
+              </a:tr>
+            </a:tbl>
+          </a:graphicData>
+        </a:graphic>
+      </p:graphicFrame>
+      <p:graphicFrame>
+        <p:nvGraphicFramePr>
+          <p:cNvPr id="5" name="Tabelle 4"/>
+          <p:cNvGraphicFramePr>
+            <a:graphicFrameLocks noGrp="1"/>
+          </p:cNvGraphicFramePr>
+          <p:nvPr>
+            <p:extLst>
+              <p:ext uri="{D42A27DB-BD31-4B8C-83A1-F6EECF244321}">
+                <p14:modId xmlns:p14="http://schemas.microsoft.com/office/powerpoint/2010/main" val="201661767"/>
+              </p:ext>
+            </p:extLst>
+          </p:nvPr>
+        </p:nvGraphicFramePr>
+        <p:xfrm>
+          <a:off x="4271319" y="3749590"/>
+          <a:ext cx="2649475" cy="1112520"/>
+        </p:xfrm>
+        <a:graphic>
+          <a:graphicData uri="http://schemas.openxmlformats.org/drawingml/2006/table">
+            <a:tbl>
+              <a:tblPr firstRow="1" bandRow="1">
+                <a:tableStyleId>{5C22544A-7EE6-4342-B048-85BDC9FD1C3A}</a:tableStyleId>
+              </a:tblPr>
+              <a:tblGrid>
+                <a:gridCol w="762318"/>
+                <a:gridCol w="1887157"/>
+              </a:tblGrid>
+              <a:tr h="370840">
+                <a:tc>
+                  <a:txBody>
+                    <a:bodyPr/>
+                    <a:lstStyle/>
+                    <a:p>
+                      <a:r>
+                        <a:rPr lang="en-US" dirty="0" smtClean="0"/>
+                        <a:t>id</a:t>
+                      </a:r>
+                      <a:endParaRPr lang="de-AT" dirty="0"/>
+                    </a:p>
+                  </a:txBody>
+                  <a:tcPr/>
+                </a:tc>
+                <a:tc>
+                  <a:txBody>
+                    <a:bodyPr/>
+                    <a:lstStyle/>
+                    <a:p>
+                      <a:r>
+                        <a:rPr lang="en-US" dirty="0" smtClean="0"/>
+                        <a:t>movie_2</a:t>
+                      </a:r>
+                      <a:endParaRPr lang="de-AT" dirty="0"/>
+                    </a:p>
+                  </a:txBody>
+                  <a:tcPr/>
+                </a:tc>
+              </a:tr>
+              <a:tr h="370840">
+                <a:tc>
+                  <a:txBody>
+                    <a:bodyPr/>
+                    <a:lstStyle/>
+                    <a:p>
+                      <a:r>
+                        <a:rPr lang="en-US" dirty="0" smtClean="0"/>
+                        <a:t>name</a:t>
+                      </a:r>
+                      <a:endParaRPr lang="de-AT" dirty="0"/>
+                    </a:p>
+                  </a:txBody>
+                  <a:tcPr/>
+                </a:tc>
+                <a:tc>
+                  <a:txBody>
+                    <a:bodyPr/>
+                    <a:lstStyle/>
+                    <a:p>
+                      <a:r>
+                        <a:rPr lang="en-US" dirty="0" smtClean="0"/>
+                        <a:t>“Machete”</a:t>
+                      </a:r>
+                      <a:endParaRPr lang="de-AT" dirty="0"/>
+                    </a:p>
+                  </a:txBody>
+                  <a:tcPr/>
+                </a:tc>
+              </a:tr>
+              <a:tr h="370840">
+                <a:tc>
+                  <a:txBody>
+                    <a:bodyPr/>
+                    <a:lstStyle/>
+                    <a:p>
+                      <a:r>
+                        <a:rPr lang="en-US" dirty="0" smtClean="0"/>
+                        <a:t>year</a:t>
+                      </a:r>
+                      <a:endParaRPr lang="de-AT" dirty="0"/>
+                    </a:p>
+                  </a:txBody>
+                  <a:tcPr/>
+                </a:tc>
+                <a:tc>
+                  <a:txBody>
+                    <a:bodyPr/>
+                    <a:lstStyle/>
+                    <a:p>
+                      <a:r>
+                        <a:rPr lang="en-US" dirty="0" smtClean="0"/>
+                        <a:t>2010</a:t>
+                      </a:r>
+                      <a:endParaRPr lang="de-AT" dirty="0"/>
+                    </a:p>
+                  </a:txBody>
+                  <a:tcPr/>
+                </a:tc>
+              </a:tr>
+            </a:tbl>
+          </a:graphicData>
+        </a:graphic>
+      </p:graphicFrame>
+      <p:graphicFrame>
+        <p:nvGraphicFramePr>
+          <p:cNvPr id="6" name="Tabelle 5"/>
+          <p:cNvGraphicFramePr>
+            <a:graphicFrameLocks noGrp="1"/>
+          </p:cNvGraphicFramePr>
+          <p:nvPr>
+            <p:extLst>
+              <p:ext uri="{D42A27DB-BD31-4B8C-83A1-F6EECF244321}">
+                <p14:modId xmlns:p14="http://schemas.microsoft.com/office/powerpoint/2010/main" val="2155594712"/>
+              </p:ext>
+            </p:extLst>
+          </p:nvPr>
+        </p:nvGraphicFramePr>
+        <p:xfrm>
+          <a:off x="349004" y="2869865"/>
+          <a:ext cx="2737168" cy="1112520"/>
+        </p:xfrm>
+        <a:graphic>
+          <a:graphicData uri="http://schemas.openxmlformats.org/drawingml/2006/table">
+            <a:tbl>
+              <a:tblPr firstRow="1" bandRow="1">
+                <a:tableStyleId>{5C22544A-7EE6-4342-B048-85BDC9FD1C3A}</a:tableStyleId>
+              </a:tblPr>
+              <a:tblGrid>
+                <a:gridCol w="762318"/>
+                <a:gridCol w="1974850"/>
+              </a:tblGrid>
+              <a:tr h="370840">
+                <a:tc>
+                  <a:txBody>
+                    <a:bodyPr/>
+                    <a:lstStyle/>
+                    <a:p>
+                      <a:r>
+                        <a:rPr lang="en-US" dirty="0" smtClean="0"/>
+                        <a:t>id</a:t>
+                      </a:r>
+                      <a:endParaRPr lang="de-AT" dirty="0"/>
+                    </a:p>
+                  </a:txBody>
+                  <a:tcPr/>
+                </a:tc>
+                <a:tc>
+                  <a:txBody>
+                    <a:bodyPr/>
+                    <a:lstStyle/>
+                    <a:p>
+                      <a:r>
+                        <a:rPr lang="en-US" dirty="0" smtClean="0"/>
+                        <a:t>user_1</a:t>
+                      </a:r>
+                      <a:endParaRPr lang="de-AT" dirty="0"/>
+                    </a:p>
+                  </a:txBody>
+                  <a:tcPr/>
+                </a:tc>
+              </a:tr>
+              <a:tr h="370840">
+                <a:tc>
+                  <a:txBody>
+                    <a:bodyPr/>
+                    <a:lstStyle/>
+                    <a:p>
+                      <a:r>
+                        <a:rPr lang="en-US" dirty="0" smtClean="0"/>
+                        <a:t>name</a:t>
+                      </a:r>
+                      <a:endParaRPr lang="de-AT" dirty="0"/>
+                    </a:p>
+                  </a:txBody>
+                  <a:tcPr/>
+                </a:tc>
+                <a:tc>
+                  <a:txBody>
+                    <a:bodyPr/>
+                    <a:lstStyle/>
+                    <a:p>
+                      <a:r>
+                        <a:rPr lang="en-US" dirty="0" smtClean="0"/>
+                        <a:t>“Chuck Norris”</a:t>
+                      </a:r>
+                      <a:endParaRPr lang="de-AT" dirty="0"/>
+                    </a:p>
+                  </a:txBody>
+                  <a:tcPr/>
+                </a:tc>
+              </a:tr>
+              <a:tr h="370840">
+                <a:tc>
+                  <a:txBody>
+                    <a:bodyPr/>
+                    <a:lstStyle/>
+                    <a:p>
+                      <a:r>
+                        <a:rPr lang="en-US" dirty="0" smtClean="0"/>
+                        <a:t>email</a:t>
+                      </a:r>
+                      <a:endParaRPr lang="de-AT" dirty="0"/>
+                    </a:p>
+                  </a:txBody>
+                  <a:tcPr/>
+                </a:tc>
+                <a:tc>
+                  <a:txBody>
+                    <a:bodyPr/>
+                    <a:lstStyle/>
+                    <a:p>
+                      <a:r>
+                        <a:rPr lang="en-US" dirty="0" smtClean="0"/>
+                        <a:t>chuck@norris.com</a:t>
+                      </a:r>
+                      <a:endParaRPr lang="de-AT" dirty="0"/>
+                    </a:p>
+                  </a:txBody>
+                  <a:tcPr/>
+                </a:tc>
+              </a:tr>
+            </a:tbl>
+          </a:graphicData>
+        </a:graphic>
+      </p:graphicFrame>
+      <p:cxnSp>
+        <p:nvCxnSpPr>
+          <p:cNvPr id="8" name="Gerade Verbindung 7"/>
+          <p:cNvCxnSpPr>
+            <a:stCxn id="6" idx="3"/>
+            <a:endCxn id="4" idx="1"/>
+          </p:cNvCxnSpPr>
+          <p:nvPr/>
+        </p:nvCxnSpPr>
+        <p:spPr>
+          <a:xfrm flipV="1">
+            <a:off x="3086172" y="2388006"/>
+            <a:ext cx="950369" cy="1038119"/>
+          </a:xfrm>
+          <a:prstGeom prst="line">
+            <a:avLst/>
+          </a:prstGeom>
+        </p:spPr>
+        <p:style>
+          <a:lnRef idx="2">
+            <a:schemeClr val="accent1"/>
+          </a:lnRef>
+          <a:fillRef idx="0">
+            <a:schemeClr val="accent1"/>
+          </a:fillRef>
+          <a:effectRef idx="1">
+            <a:schemeClr val="accent1"/>
+          </a:effectRef>
+          <a:fontRef idx="minor">
+            <a:schemeClr val="tx1"/>
+          </a:fontRef>
+        </p:style>
+      </p:cxnSp>
+      <p:cxnSp>
+        <p:nvCxnSpPr>
+          <p:cNvPr id="11" name="Gerade Verbindung 10"/>
+          <p:cNvCxnSpPr>
+            <a:stCxn id="6" idx="3"/>
+            <a:endCxn id="5" idx="1"/>
+          </p:cNvCxnSpPr>
+          <p:nvPr/>
+        </p:nvCxnSpPr>
+        <p:spPr>
+          <a:xfrm>
+            <a:off x="3086172" y="3426125"/>
+            <a:ext cx="1185147" cy="879725"/>
+          </a:xfrm>
+          <a:prstGeom prst="line">
+            <a:avLst/>
+          </a:prstGeom>
+        </p:spPr>
+        <p:style>
+          <a:lnRef idx="2">
+            <a:schemeClr val="accent1"/>
+          </a:lnRef>
+          <a:fillRef idx="0">
+            <a:schemeClr val="accent1"/>
+          </a:fillRef>
+          <a:effectRef idx="1">
+            <a:schemeClr val="accent1"/>
+          </a:effectRef>
+          <a:fontRef idx="minor">
+            <a:schemeClr val="tx1"/>
+          </a:fontRef>
+        </p:style>
+      </p:cxnSp>
+      <p:sp>
+        <p:nvSpPr>
+          <p:cNvPr id="14" name="Textfeld 13"/>
+          <p:cNvSpPr txBox="1"/>
+          <p:nvPr/>
+        </p:nvSpPr>
+        <p:spPr>
+          <a:xfrm>
+            <a:off x="3286898" y="2654084"/>
+            <a:ext cx="1153297" cy="369332"/>
+          </a:xfrm>
+          <a:prstGeom prst="rect">
+            <a:avLst/>
+          </a:prstGeom>
+          <a:noFill/>
+        </p:spPr>
+        <p:txBody>
+          <a:bodyPr wrap="square" rtlCol="0">
+            <a:spAutoFit/>
+          </a:bodyPr>
+          <a:lstStyle/>
+          <a:p>
+            <a:r>
+              <a:rPr lang="en-US" dirty="0" smtClean="0"/>
+              <a:t>owns</a:t>
+            </a:r>
+            <a:endParaRPr lang="de-AT" dirty="0"/>
+          </a:p>
+        </p:txBody>
+      </p:sp>
+      <p:sp>
+        <p:nvSpPr>
+          <p:cNvPr id="15" name="Textfeld 14"/>
+          <p:cNvSpPr txBox="1"/>
+          <p:nvPr/>
+        </p:nvSpPr>
+        <p:spPr>
+          <a:xfrm>
+            <a:off x="3381635" y="3700162"/>
+            <a:ext cx="1153297" cy="369332"/>
+          </a:xfrm>
+          <a:prstGeom prst="rect">
+            <a:avLst/>
+          </a:prstGeom>
+          <a:noFill/>
+        </p:spPr>
+        <p:txBody>
+          <a:bodyPr wrap="square" rtlCol="0">
+            <a:spAutoFit/>
+          </a:bodyPr>
+          <a:lstStyle/>
+          <a:p>
+            <a:r>
+              <a:rPr lang="en-US" dirty="0" smtClean="0"/>
+              <a:t>likes</a:t>
+            </a:r>
+            <a:endParaRPr lang="de-AT" dirty="0"/>
+          </a:p>
+        </p:txBody>
+      </p:sp>
+      <p:graphicFrame>
+        <p:nvGraphicFramePr>
+          <p:cNvPr id="16" name="Tabelle 15"/>
+          <p:cNvGraphicFramePr>
+            <a:graphicFrameLocks noGrp="1"/>
+          </p:cNvGraphicFramePr>
+          <p:nvPr>
+            <p:extLst>
+              <p:ext uri="{D42A27DB-BD31-4B8C-83A1-F6EECF244321}">
+                <p14:modId xmlns:p14="http://schemas.microsoft.com/office/powerpoint/2010/main" val="1095718353"/>
+              </p:ext>
+            </p:extLst>
+          </p:nvPr>
+        </p:nvGraphicFramePr>
+        <p:xfrm>
+          <a:off x="6395671" y="5827173"/>
+          <a:ext cx="2649475" cy="741680"/>
+        </p:xfrm>
+        <a:graphic>
+          <a:graphicData uri="http://schemas.openxmlformats.org/drawingml/2006/table">
+            <a:tbl>
+              <a:tblPr firstRow="1" bandRow="1">
+                <a:tableStyleId>{5C22544A-7EE6-4342-B048-85BDC9FD1C3A}</a:tableStyleId>
+              </a:tblPr>
+              <a:tblGrid>
+                <a:gridCol w="762318"/>
+                <a:gridCol w="1887157"/>
+              </a:tblGrid>
+              <a:tr h="370840">
+                <a:tc>
+                  <a:txBody>
+                    <a:bodyPr/>
+                    <a:lstStyle/>
+                    <a:p>
+                      <a:r>
+                        <a:rPr lang="en-US" dirty="0" smtClean="0"/>
+                        <a:t>id</a:t>
+                      </a:r>
+                      <a:endParaRPr lang="de-AT" dirty="0"/>
+                    </a:p>
+                  </a:txBody>
+                  <a:tcPr/>
+                </a:tc>
+                <a:tc>
+                  <a:txBody>
+                    <a:bodyPr/>
+                    <a:lstStyle/>
+                    <a:p>
+                      <a:r>
+                        <a:rPr lang="en-US" dirty="0" smtClean="0"/>
+                        <a:t>genre_1</a:t>
+                      </a:r>
+                      <a:endParaRPr lang="de-AT" dirty="0"/>
+                    </a:p>
+                  </a:txBody>
+                  <a:tcPr/>
+                </a:tc>
+              </a:tr>
+              <a:tr h="370840">
+                <a:tc>
+                  <a:txBody>
+                    <a:bodyPr/>
+                    <a:lstStyle/>
+                    <a:p>
+                      <a:r>
+                        <a:rPr lang="en-US" dirty="0" smtClean="0"/>
+                        <a:t>name</a:t>
+                      </a:r>
+                      <a:endParaRPr lang="de-AT" dirty="0"/>
+                    </a:p>
+                  </a:txBody>
+                  <a:tcPr/>
+                </a:tc>
+                <a:tc>
+                  <a:txBody>
+                    <a:bodyPr/>
+                    <a:lstStyle/>
+                    <a:p>
+                      <a:r>
+                        <a:rPr lang="en-US" dirty="0" smtClean="0"/>
+                        <a:t>“Action”</a:t>
+                      </a:r>
+                      <a:endParaRPr lang="de-AT" dirty="0"/>
+                    </a:p>
+                  </a:txBody>
+                  <a:tcPr/>
+                </a:tc>
+              </a:tr>
+            </a:tbl>
+          </a:graphicData>
+        </a:graphic>
+      </p:graphicFrame>
+      <p:cxnSp>
+        <p:nvCxnSpPr>
+          <p:cNvPr id="18" name="Gerade Verbindung 17"/>
+          <p:cNvCxnSpPr>
+            <a:stCxn id="16" idx="0"/>
+            <a:endCxn id="5" idx="2"/>
+          </p:cNvCxnSpPr>
+          <p:nvPr/>
+        </p:nvCxnSpPr>
+        <p:spPr>
+          <a:xfrm flipH="1" flipV="1">
+            <a:off x="5596056" y="4862110"/>
+            <a:ext cx="2124352" cy="965063"/>
+          </a:xfrm>
+          <a:prstGeom prst="line">
+            <a:avLst/>
+          </a:prstGeom>
+        </p:spPr>
+        <p:style>
+          <a:lnRef idx="2">
+            <a:schemeClr val="accent3"/>
+          </a:lnRef>
+          <a:fillRef idx="0">
+            <a:schemeClr val="accent3"/>
+          </a:fillRef>
+          <a:effectRef idx="1">
+            <a:schemeClr val="accent3"/>
+          </a:effectRef>
+          <a:fontRef idx="minor">
+            <a:schemeClr val="tx1"/>
+          </a:fontRef>
+        </p:style>
+      </p:cxnSp>
+      <p:graphicFrame>
+        <p:nvGraphicFramePr>
+          <p:cNvPr id="20" name="Tabelle 19"/>
+          <p:cNvGraphicFramePr>
+            <a:graphicFrameLocks noGrp="1"/>
+          </p:cNvGraphicFramePr>
+          <p:nvPr>
+            <p:extLst>
+              <p:ext uri="{D42A27DB-BD31-4B8C-83A1-F6EECF244321}">
+                <p14:modId xmlns:p14="http://schemas.microsoft.com/office/powerpoint/2010/main" val="3114290622"/>
+              </p:ext>
+            </p:extLst>
+          </p:nvPr>
+        </p:nvGraphicFramePr>
+        <p:xfrm>
+          <a:off x="2563524" y="5827173"/>
+          <a:ext cx="2649475" cy="741680"/>
+        </p:xfrm>
+        <a:graphic>
+          <a:graphicData uri="http://schemas.openxmlformats.org/drawingml/2006/table">
+            <a:tbl>
+              <a:tblPr firstRow="1" bandRow="1">
+                <a:tableStyleId>{5C22544A-7EE6-4342-B048-85BDC9FD1C3A}</a:tableStyleId>
+              </a:tblPr>
+              <a:tblGrid>
+                <a:gridCol w="762318"/>
+                <a:gridCol w="1887157"/>
+              </a:tblGrid>
+              <a:tr h="370840">
+                <a:tc>
+                  <a:txBody>
+                    <a:bodyPr/>
+                    <a:lstStyle/>
+                    <a:p>
+                      <a:r>
+                        <a:rPr lang="en-US" dirty="0" smtClean="0"/>
+                        <a:t>id</a:t>
+                      </a:r>
+                      <a:endParaRPr lang="de-AT" dirty="0"/>
+                    </a:p>
+                  </a:txBody>
+                  <a:tcPr/>
+                </a:tc>
+                <a:tc>
+                  <a:txBody>
+                    <a:bodyPr/>
+                    <a:lstStyle/>
+                    <a:p>
+                      <a:r>
+                        <a:rPr lang="en-US" dirty="0" smtClean="0"/>
+                        <a:t>genre_2</a:t>
+                      </a:r>
+                      <a:endParaRPr lang="de-AT" dirty="0"/>
+                    </a:p>
+                  </a:txBody>
+                  <a:tcPr/>
+                </a:tc>
+              </a:tr>
+              <a:tr h="370840">
+                <a:tc>
+                  <a:txBody>
+                    <a:bodyPr/>
+                    <a:lstStyle/>
+                    <a:p>
+                      <a:r>
+                        <a:rPr lang="en-US" dirty="0" smtClean="0"/>
+                        <a:t>name</a:t>
+                      </a:r>
+                      <a:endParaRPr lang="de-AT" dirty="0"/>
+                    </a:p>
+                  </a:txBody>
+                  <a:tcPr/>
+                </a:tc>
+                <a:tc>
+                  <a:txBody>
+                    <a:bodyPr/>
+                    <a:lstStyle/>
+                    <a:p>
+                      <a:r>
+                        <a:rPr lang="en-US" dirty="0" smtClean="0"/>
+                        <a:t>“Thriller”</a:t>
+                      </a:r>
+                      <a:endParaRPr lang="de-AT" dirty="0"/>
+                    </a:p>
+                  </a:txBody>
+                  <a:tcPr/>
+                </a:tc>
+              </a:tr>
+            </a:tbl>
+          </a:graphicData>
+        </a:graphic>
+      </p:graphicFrame>
+      <p:cxnSp>
+        <p:nvCxnSpPr>
+          <p:cNvPr id="22" name="Gerade Verbindung 21"/>
+          <p:cNvCxnSpPr>
+            <a:stCxn id="20" idx="0"/>
+            <a:endCxn id="5" idx="2"/>
+          </p:cNvCxnSpPr>
+          <p:nvPr/>
+        </p:nvCxnSpPr>
+        <p:spPr>
+          <a:xfrm flipV="1">
+            <a:off x="3888261" y="4862110"/>
+            <a:ext cx="1707795" cy="965063"/>
+          </a:xfrm>
+          <a:prstGeom prst="line">
+            <a:avLst/>
+          </a:prstGeom>
+        </p:spPr>
+        <p:style>
+          <a:lnRef idx="2">
+            <a:schemeClr val="accent3"/>
+          </a:lnRef>
+          <a:fillRef idx="0">
+            <a:schemeClr val="accent3"/>
+          </a:fillRef>
+          <a:effectRef idx="1">
+            <a:schemeClr val="accent3"/>
+          </a:effectRef>
+          <a:fontRef idx="minor">
+            <a:schemeClr val="tx1"/>
+          </a:fontRef>
+        </p:style>
+      </p:cxnSp>
+      <p:cxnSp>
+        <p:nvCxnSpPr>
+          <p:cNvPr id="28" name="Gerade Verbindung 27"/>
+          <p:cNvCxnSpPr>
+            <a:stCxn id="16" idx="0"/>
+            <a:endCxn id="4" idx="3"/>
+          </p:cNvCxnSpPr>
+          <p:nvPr/>
+        </p:nvCxnSpPr>
+        <p:spPr>
+          <a:xfrm flipH="1" flipV="1">
+            <a:off x="6686016" y="2388006"/>
+            <a:ext cx="1034392" cy="3439167"/>
+          </a:xfrm>
+          <a:prstGeom prst="line">
+            <a:avLst/>
+          </a:prstGeom>
+        </p:spPr>
+        <p:style>
+          <a:lnRef idx="2">
+            <a:schemeClr val="accent3"/>
+          </a:lnRef>
+          <a:fillRef idx="0">
+            <a:schemeClr val="accent3"/>
+          </a:fillRef>
+          <a:effectRef idx="1">
+            <a:schemeClr val="accent3"/>
+          </a:effectRef>
+          <a:fontRef idx="minor">
+            <a:schemeClr val="tx1"/>
+          </a:fontRef>
+        </p:style>
+      </p:cxnSp>
+      <p:sp>
+        <p:nvSpPr>
+          <p:cNvPr id="32" name="Textfeld 31"/>
+          <p:cNvSpPr txBox="1"/>
+          <p:nvPr/>
+        </p:nvSpPr>
+        <p:spPr>
+          <a:xfrm>
+            <a:off x="4059702" y="5159975"/>
+            <a:ext cx="1153297" cy="369332"/>
+          </a:xfrm>
+          <a:prstGeom prst="rect">
+            <a:avLst/>
+          </a:prstGeom>
+          <a:noFill/>
+        </p:spPr>
+        <p:txBody>
+          <a:bodyPr wrap="square" rtlCol="0">
+            <a:spAutoFit/>
+          </a:bodyPr>
+          <a:lstStyle/>
+          <a:p>
+            <a:r>
+              <a:rPr lang="en-US" dirty="0" err="1" smtClean="0"/>
+              <a:t>has_genre</a:t>
+            </a:r>
+            <a:endParaRPr lang="de-AT" dirty="0"/>
+          </a:p>
+        </p:txBody>
+      </p:sp>
+      <p:sp>
+        <p:nvSpPr>
+          <p:cNvPr id="33" name="Textfeld 32"/>
+          <p:cNvSpPr txBox="1"/>
+          <p:nvPr/>
+        </p:nvSpPr>
+        <p:spPr>
+          <a:xfrm>
+            <a:off x="6920794" y="3849587"/>
+            <a:ext cx="1153297" cy="369332"/>
+          </a:xfrm>
+          <a:prstGeom prst="rect">
+            <a:avLst/>
+          </a:prstGeom>
+          <a:noFill/>
+        </p:spPr>
+        <p:txBody>
+          <a:bodyPr wrap="square" rtlCol="0">
+            <a:spAutoFit/>
+          </a:bodyPr>
+          <a:lstStyle/>
+          <a:p>
+            <a:r>
+              <a:rPr lang="en-US" dirty="0" err="1" smtClean="0"/>
+              <a:t>has_genre</a:t>
+            </a:r>
+            <a:endParaRPr lang="de-AT" dirty="0"/>
+          </a:p>
+        </p:txBody>
+      </p:sp>
+      <p:sp>
+        <p:nvSpPr>
+          <p:cNvPr id="34" name="Textfeld 33"/>
+          <p:cNvSpPr txBox="1"/>
+          <p:nvPr/>
+        </p:nvSpPr>
+        <p:spPr>
+          <a:xfrm>
+            <a:off x="6161905" y="5131831"/>
+            <a:ext cx="1153297" cy="369332"/>
+          </a:xfrm>
+          <a:prstGeom prst="rect">
+            <a:avLst/>
+          </a:prstGeom>
+          <a:noFill/>
+        </p:spPr>
+        <p:txBody>
+          <a:bodyPr wrap="square" rtlCol="0">
+            <a:spAutoFit/>
+          </a:bodyPr>
+          <a:lstStyle/>
+          <a:p>
+            <a:r>
+              <a:rPr lang="en-US" dirty="0" err="1" smtClean="0"/>
+              <a:t>has_genre</a:t>
+            </a:r>
+            <a:endParaRPr lang="de-AT" dirty="0"/>
+          </a:p>
+        </p:txBody>
+      </p:sp>
+      <p:cxnSp>
+        <p:nvCxnSpPr>
+          <p:cNvPr id="36" name="Gerade Verbindung 35"/>
+          <p:cNvCxnSpPr>
+            <a:stCxn id="6" idx="2"/>
+            <a:endCxn id="20" idx="1"/>
+          </p:cNvCxnSpPr>
+          <p:nvPr/>
+        </p:nvCxnSpPr>
+        <p:spPr>
+          <a:xfrm>
+            <a:off x="1717588" y="3982385"/>
+            <a:ext cx="845936" cy="2215628"/>
+          </a:xfrm>
+          <a:prstGeom prst="line">
+            <a:avLst/>
+          </a:prstGeom>
+        </p:spPr>
+        <p:style>
+          <a:lnRef idx="2">
+            <a:schemeClr val="accent2"/>
+          </a:lnRef>
+          <a:fillRef idx="0">
+            <a:schemeClr val="accent2"/>
+          </a:fillRef>
+          <a:effectRef idx="1">
+            <a:schemeClr val="accent2"/>
+          </a:effectRef>
+          <a:fontRef idx="minor">
+            <a:schemeClr val="tx1"/>
+          </a:fontRef>
+        </p:style>
+      </p:cxnSp>
+      <p:sp>
+        <p:nvSpPr>
+          <p:cNvPr id="38" name="Textfeld 37"/>
+          <p:cNvSpPr txBox="1"/>
+          <p:nvPr/>
+        </p:nvSpPr>
+        <p:spPr>
+          <a:xfrm>
+            <a:off x="1473289" y="4862110"/>
+            <a:ext cx="1459379" cy="646331"/>
+          </a:xfrm>
+          <a:prstGeom prst="rect">
+            <a:avLst/>
+          </a:prstGeom>
+          <a:noFill/>
+        </p:spPr>
+        <p:txBody>
+          <a:bodyPr wrap="square" rtlCol="0">
+            <a:spAutoFit/>
+          </a:bodyPr>
+          <a:lstStyle/>
+          <a:p>
+            <a:pPr algn="ctr"/>
+            <a:r>
+              <a:rPr lang="en-US" dirty="0" err="1" smtClean="0"/>
+              <a:t>interested_in</a:t>
+            </a:r>
+            <a:endParaRPr lang="en-US" dirty="0" smtClean="0"/>
+          </a:p>
+          <a:p>
+            <a:pPr algn="ctr"/>
+            <a:r>
+              <a:rPr lang="en-US" dirty="0" smtClean="0"/>
+              <a:t>potency: 50</a:t>
+            </a:r>
+            <a:endParaRPr lang="de-AT" dirty="0"/>
           </a:p>
         </p:txBody>
       </p:sp>
     </p:spTree>
     <p:extLst>
       <p:ext uri="{BB962C8B-B14F-4D97-AF65-F5344CB8AC3E}">
-        <p14:creationId xmlns:p14="http://schemas.microsoft.com/office/powerpoint/2010/main" val="1479044462"/>
+        <p14:creationId xmlns:p14="http://schemas.microsoft.com/office/powerpoint/2010/main" val="3859642350"/>
       </p:ext>
     </p:extLst>
   </p:cSld>
@@ -15566,11 +17781,7 @@
           <a:p>
             <a:r>
               <a:rPr lang="en-US" dirty="0" smtClean="0"/>
-              <a:t>Drawbacks of </a:t>
-            </a:r>
-            <a:r>
-              <a:rPr lang="en-US" dirty="0" err="1" smtClean="0"/>
-              <a:t>NoSQL</a:t>
+              <a:t>GD – Use</a:t>
             </a:r>
             <a:endParaRPr lang="de-AT" dirty="0"/>
           </a:p>
@@ -15591,14 +17802,69 @@
           <a:bodyPr/>
           <a:lstStyle/>
           <a:p>
-            <a:endParaRPr lang="de-AT"/>
-          </a:p>
-        </p:txBody>
-      </p:sp>
+            <a:endParaRPr lang="en-US" dirty="0" smtClean="0"/>
+          </a:p>
+          <a:p>
+            <a:r>
+              <a:rPr lang="en-US" dirty="0" smtClean="0"/>
+              <a:t>Interconnected data</a:t>
+            </a:r>
+          </a:p>
+          <a:p>
+            <a:r>
+              <a:rPr lang="en-US" dirty="0" smtClean="0"/>
+              <a:t>Graphs and trees</a:t>
+            </a:r>
+          </a:p>
+          <a:p>
+            <a:r>
+              <a:rPr lang="en-US" dirty="0" smtClean="0"/>
+              <a:t>Scientific data</a:t>
+            </a:r>
+          </a:p>
+          <a:p>
+            <a:r>
+              <a:rPr lang="en-US" dirty="0" smtClean="0"/>
+              <a:t>Traversing desirable</a:t>
+            </a:r>
+            <a:endParaRPr lang="en-US" dirty="0" smtClean="0"/>
+          </a:p>
+        </p:txBody>
+      </p:sp>
+      <p:pic>
+        <p:nvPicPr>
+          <p:cNvPr id="4" name="Grafik 3"/>
+          <p:cNvPicPr>
+            <a:picLocks noChangeAspect="1"/>
+          </p:cNvPicPr>
+          <p:nvPr/>
+        </p:nvPicPr>
+        <p:blipFill>
+          <a:blip r:embed="rId3">
+            <a:extLst>
+              <a:ext uri="{28A0092B-C50C-407E-A947-70E740481C1C}">
+                <a14:useLocalDpi xmlns:a14="http://schemas.microsoft.com/office/drawing/2010/main" val="0"/>
+              </a:ext>
+            </a:extLst>
+          </a:blip>
+          <a:stretch>
+            <a:fillRect/>
+          </a:stretch>
+        </p:blipFill>
+        <p:spPr>
+          <a:xfrm>
+            <a:off x="5427409" y="2767906"/>
+            <a:ext cx="3625974" cy="2888693"/>
+          </a:xfrm>
+          <a:prstGeom prst="rect">
+            <a:avLst/>
+          </a:prstGeom>
+        </p:spPr>
+      </p:pic>
     </p:spTree>
     <p:extLst>
       <p:ext uri="{BB962C8B-B14F-4D97-AF65-F5344CB8AC3E}">
-        <p14:creationId xmlns:p14="http://schemas.microsoft.com/office/powerpoint/2010/main" val="137541630"/>
+        <p14:creationId xmlns:p14="http://schemas.microsoft.com/office/powerpoint/2010/main" val="3717860152"/>
       </p:ext>
     </p:extLst>
   </p:cSld>
@@ -15792,6 +18058,36 @@
           <a:chExt cx="0" cy="0"/>
         </a:xfrm>
       </p:grpSpPr>
+      <p:pic>
+        <p:nvPicPr>
+          <p:cNvPr id="4" name="Grafik 3"/>
+          <p:cNvPicPr>
+            <a:picLocks noChangeAspect="1"/>
+          </p:cNvPicPr>
+          <p:nvPr/>
+        </p:nvPicPr>
+        <p:blipFill>
+          <a:blip r:embed="rId3">
+            <a:extLst>
+              <a:ext uri="{28A0092B-C50C-407E-A947-70E740481C1C}">
+                <a14:useLocalDpi xmlns:a14="http://schemas.microsoft.com/office/drawing/2010/main" val="0"/>
+              </a:ext>
+            </a:extLst>
+          </a:blip>
+          <a:stretch>
+            <a:fillRect/>
+          </a:stretch>
+        </p:blipFill>
+        <p:spPr>
+          <a:xfrm>
+            <a:off x="6127923" y="2687062"/>
+            <a:ext cx="2414722" cy="2665137"/>
+          </a:xfrm>
+          <a:prstGeom prst="rect">
+            <a:avLst/>
+          </a:prstGeom>
+        </p:spPr>
+      </p:pic>
       <p:sp>
         <p:nvSpPr>
           <p:cNvPr id="2" name="Titel 1"/>
@@ -15809,7 +18105,7 @@
           <a:p>
             <a:r>
               <a:rPr lang="en-US" dirty="0" smtClean="0"/>
-              <a:t>Demo</a:t>
+              <a:t>RDMS – doomed to die?</a:t>
             </a:r>
             <a:endParaRPr lang="de-AT" dirty="0"/>
           </a:p>
@@ -15830,20 +18126,64 @@
           <a:bodyPr/>
           <a:lstStyle/>
           <a:p>
-            <a:endParaRPr lang="de-AT"/>
+            <a:endParaRPr lang="en-US" dirty="0" smtClean="0"/>
+          </a:p>
+          <a:p>
+            <a:r>
+              <a:rPr lang="en-US" dirty="0" smtClean="0"/>
+              <a:t>Maturity</a:t>
+            </a:r>
+          </a:p>
+          <a:p>
+            <a:r>
+              <a:rPr lang="en-US" dirty="0" smtClean="0"/>
+              <a:t>Transactions</a:t>
+            </a:r>
+          </a:p>
+          <a:p>
+            <a:r>
+              <a:rPr lang="en-US" dirty="0" smtClean="0"/>
+              <a:t>Querying capabilities</a:t>
+            </a:r>
+          </a:p>
+          <a:p>
+            <a:r>
+              <a:rPr lang="en-US" dirty="0" smtClean="0"/>
+              <a:t>Knowledge</a:t>
+            </a:r>
+          </a:p>
+          <a:p>
+            <a:r>
+              <a:rPr lang="en-US" dirty="0" smtClean="0"/>
+              <a:t>Jack of all trades schemas</a:t>
+            </a:r>
+          </a:p>
+          <a:p>
+            <a:r>
+              <a:rPr lang="en-US" dirty="0" smtClean="0"/>
+              <a:t>Performance</a:t>
+            </a:r>
+            <a:endParaRPr lang="de-AT" dirty="0"/>
           </a:p>
         </p:txBody>
       </p:sp>
     </p:spTree>
     <p:extLst>
       <p:ext uri="{BB962C8B-B14F-4D97-AF65-F5344CB8AC3E}">
-        <p14:creationId xmlns:p14="http://schemas.microsoft.com/office/powerpoint/2010/main" val="2286009924"/>
+        <p14:creationId xmlns:p14="http://schemas.microsoft.com/office/powerpoint/2010/main" val="1479044462"/>
       </p:ext>
     </p:extLst>
   </p:cSld>
   <p:clrMapOvr>
     <a:masterClrMapping/>
   </p:clrMapOvr>
+  <p:timing>
+    <p:tnLst>
+      <p:par>
+        <p:cTn id="1" dur="indefinite" restart="never" nodeType="tmRoot"/>
+      </p:par>
+    </p:tnLst>
+  </p:timing>
 </p:sld>
 </file>
 
@@ -15864,122 +18204,1537 @@
           <a:chExt cx="0" cy="0"/>
         </a:xfrm>
       </p:grpSpPr>
-      <p:sp>
-        <p:nvSpPr>
-          <p:cNvPr id="3" name="Textfeld 2"/>
-          <p:cNvSpPr txBox="1"/>
+      <p:pic>
+        <p:nvPicPr>
+          <p:cNvPr id="5" name="Grafik 4"/>
+          <p:cNvPicPr>
+            <a:picLocks noChangeAspect="1"/>
+          </p:cNvPicPr>
           <p:nvPr/>
-        </p:nvSpPr>
+        </p:nvPicPr>
+        <p:blipFill>
+          <a:blip r:embed="rId3">
+            <a:extLst>
+              <a:ext uri="{28A0092B-C50C-407E-A947-70E740481C1C}">
+                <a14:useLocalDpi xmlns:a14="http://schemas.microsoft.com/office/drawing/2010/main" val="0"/>
+              </a:ext>
+            </a:extLst>
+          </a:blip>
+          <a:stretch>
+            <a:fillRect/>
+          </a:stretch>
+        </p:blipFill>
         <p:spPr>
           <a:xfrm>
-            <a:off x="280588" y="1319497"/>
-            <a:ext cx="7760446" cy="2308324"/>
+            <a:off x="6127923" y="2687062"/>
+            <a:ext cx="2414722" cy="2665137"/>
           </a:xfrm>
           <a:prstGeom prst="rect">
             <a:avLst/>
           </a:prstGeom>
-          <a:noFill/>
         </p:spPr>
-        <p:txBody>
-          <a:bodyPr wrap="square" rtlCol="0">
-            <a:spAutoFit/>
-          </a:bodyPr>
-          <a:lstStyle/>
-          <a:p>
-            <a:r>
-              <a:rPr lang="de-DE" sz="4000" dirty="0" smtClean="0">
-                <a:solidFill>
-                  <a:schemeClr val="bg1"/>
-                </a:solidFill>
-              </a:rPr>
-              <a:t>Trennseite Calibri </a:t>
-            </a:r>
-            <a:r>
-              <a:rPr lang="de-DE" sz="4000" dirty="0">
-                <a:solidFill>
-                  <a:schemeClr val="bg1"/>
-                </a:solidFill>
-              </a:rPr>
-              <a:t>40 </a:t>
-            </a:r>
-            <a:r>
-              <a:rPr lang="de-DE" sz="4000" dirty="0" err="1">
-                <a:solidFill>
-                  <a:schemeClr val="bg1"/>
-                </a:solidFill>
-              </a:rPr>
-              <a:t>pkt</a:t>
-            </a:r>
-            <a:endParaRPr lang="de-DE" sz="4000" dirty="0">
-              <a:solidFill>
-                <a:schemeClr val="bg1"/>
-              </a:solidFill>
-            </a:endParaRPr>
-          </a:p>
-          <a:p>
-            <a:r>
-              <a:rPr lang="de-DE" sz="4000" dirty="0">
-                <a:solidFill>
-                  <a:schemeClr val="bg1"/>
-                </a:solidFill>
-              </a:rPr>
-              <a:t>FH JOANNEUM IN </a:t>
-            </a:r>
-            <a:r>
-              <a:rPr lang="de-DE" sz="4000" i="1" dirty="0" smtClean="0">
-                <a:solidFill>
-                  <a:schemeClr val="bg1"/>
-                </a:solidFill>
-                <a:latin typeface="Georgia"/>
-                <a:cs typeface="Georgia"/>
-              </a:rPr>
-              <a:t>Bewegung</a:t>
-            </a:r>
-          </a:p>
-          <a:p>
-            <a:endParaRPr lang="de-DE" sz="4000" i="1" dirty="0" smtClean="0">
-              <a:solidFill>
-                <a:schemeClr val="bg1"/>
-              </a:solidFill>
-              <a:latin typeface="Georgia"/>
-              <a:cs typeface="Georgia"/>
-            </a:endParaRPr>
-          </a:p>
-          <a:p>
-            <a:r>
-              <a:rPr lang="de-DE" sz="2400" i="1" dirty="0" smtClean="0">
-                <a:solidFill>
-                  <a:schemeClr val="bg1"/>
-                </a:solidFill>
-                <a:latin typeface="Georgia"/>
-                <a:cs typeface="Georgia"/>
-              </a:rPr>
-              <a:t>Auszeichnungen Georgia 24 </a:t>
-            </a:r>
-            <a:r>
-              <a:rPr lang="de-DE" sz="2400" i="1" dirty="0" err="1" smtClean="0">
-                <a:solidFill>
-                  <a:schemeClr val="bg1"/>
-                </a:solidFill>
-                <a:latin typeface="Georgia"/>
-                <a:cs typeface="Georgia"/>
-              </a:rPr>
-              <a:t>pkt</a:t>
-            </a:r>
-            <a:endParaRPr lang="de-DE" sz="2400" i="1" dirty="0">
-              <a:solidFill>
-                <a:schemeClr val="bg1"/>
-              </a:solidFill>
-              <a:latin typeface="Georgia"/>
-              <a:cs typeface="Georgia"/>
-            </a:endParaRPr>
+      </p:pic>
+      <p:sp>
+        <p:nvSpPr>
+          <p:cNvPr id="2" name="Titel 1"/>
+          <p:cNvSpPr>
+            <a:spLocks noGrp="1"/>
+          </p:cNvSpPr>
+          <p:nvPr>
+            <p:ph type="title"/>
+          </p:nvPr>
+        </p:nvSpPr>
+        <p:spPr/>
+        <p:txBody>
+          <a:bodyPr/>
+          <a:lstStyle/>
+          <a:p>
+            <a:r>
+              <a:rPr lang="en-US" dirty="0" smtClean="0"/>
+              <a:t>Drawbacks of </a:t>
+            </a:r>
+            <a:r>
+              <a:rPr lang="en-US" dirty="0" err="1" smtClean="0"/>
+              <a:t>NoSQL</a:t>
+            </a:r>
+            <a:endParaRPr lang="de-AT" dirty="0"/>
+          </a:p>
+        </p:txBody>
+      </p:sp>
+      <p:sp>
+        <p:nvSpPr>
+          <p:cNvPr id="3" name="Inhaltsplatzhalter 2"/>
+          <p:cNvSpPr>
+            <a:spLocks noGrp="1"/>
+          </p:cNvSpPr>
+          <p:nvPr>
+            <p:ph idx="1"/>
+          </p:nvPr>
+        </p:nvSpPr>
+        <p:spPr/>
+        <p:txBody>
+          <a:bodyPr/>
+          <a:lstStyle/>
+          <a:p>
+            <a:endParaRPr lang="en-US" dirty="0" smtClean="0"/>
+          </a:p>
+          <a:p>
+            <a:r>
+              <a:rPr lang="en-US" dirty="0" smtClean="0"/>
+              <a:t>Querying capabilities</a:t>
+            </a:r>
+          </a:p>
+          <a:p>
+            <a:r>
+              <a:rPr lang="en-US" dirty="0" smtClean="0"/>
+              <a:t>Limited features</a:t>
+            </a:r>
+          </a:p>
+          <a:p>
+            <a:r>
+              <a:rPr lang="en-US" dirty="0" smtClean="0"/>
+              <a:t>Maturity</a:t>
+            </a:r>
+          </a:p>
+          <a:p>
+            <a:r>
+              <a:rPr lang="en-US" dirty="0" smtClean="0"/>
+              <a:t>Many different systems</a:t>
+            </a:r>
+          </a:p>
+          <a:p>
+            <a:r>
+              <a:rPr lang="en-US" dirty="0"/>
+              <a:t> </a:t>
+            </a:r>
+            <a:r>
+              <a:rPr lang="en-US" strike="sngStrike" dirty="0" smtClean="0"/>
+              <a:t>Interchangeability</a:t>
+            </a:r>
+          </a:p>
+          <a:p>
+            <a:endParaRPr lang="en-US" dirty="0" smtClean="0"/>
+          </a:p>
+          <a:p>
+            <a:endParaRPr lang="de-AT" dirty="0"/>
           </a:p>
         </p:txBody>
       </p:sp>
     </p:spTree>
     <p:extLst>
       <p:ext uri="{BB962C8B-B14F-4D97-AF65-F5344CB8AC3E}">
-        <p14:creationId xmlns:p14="http://schemas.microsoft.com/office/powerpoint/2010/main" val="2055451195"/>
+        <p14:creationId xmlns:p14="http://schemas.microsoft.com/office/powerpoint/2010/main" val="137541630"/>
+      </p:ext>
+    </p:extLst>
+  </p:cSld>
+  <p:clrMapOvr>
+    <a:masterClrMapping/>
+  </p:clrMapOvr>
+  <p:timing>
+    <p:tnLst>
+      <p:par>
+        <p:cTn id="1" dur="indefinite" restart="never" nodeType="tmRoot"/>
+      </p:par>
+    </p:tnLst>
+  </p:timing>
+</p:sld>
+</file>
+
+<file path=ppt/slides/slide42.xml><?xml version="1.0" encoding="utf-8"?>
+<p:sld xmlns:a="http://schemas.openxmlformats.org/drawingml/2006/main" xmlns:r="http://schemas.openxmlformats.org/officeDocument/2006/relationships" xmlns:p="http://schemas.openxmlformats.org/presentationml/2006/main">
+  <p:cSld>
+    <p:spTree>
+      <p:nvGrpSpPr>
+        <p:cNvPr id="1" name=""/>
+        <p:cNvGrpSpPr/>
+        <p:nvPr/>
+      </p:nvGrpSpPr>
+      <p:grpSpPr>
+        <a:xfrm>
+          <a:off x="0" y="0"/>
+          <a:ext cx="0" cy="0"/>
+          <a:chOff x="0" y="0"/>
+          <a:chExt cx="0" cy="0"/>
+        </a:xfrm>
+      </p:grpSpPr>
+      <p:sp>
+        <p:nvSpPr>
+          <p:cNvPr id="2" name="Titel 1"/>
+          <p:cNvSpPr>
+            <a:spLocks noGrp="1"/>
+          </p:cNvSpPr>
+          <p:nvPr>
+            <p:ph type="title"/>
+          </p:nvPr>
+        </p:nvSpPr>
+        <p:spPr/>
+        <p:txBody>
+          <a:bodyPr/>
+          <a:lstStyle/>
+          <a:p>
+            <a:r>
+              <a:rPr lang="en-US" smtClean="0"/>
+              <a:t>MongoDB</a:t>
+            </a:r>
+            <a:endParaRPr lang="de-AT" dirty="0"/>
+          </a:p>
+        </p:txBody>
+      </p:sp>
+      <p:sp>
+        <p:nvSpPr>
+          <p:cNvPr id="3" name="Inhaltsplatzhalter 2"/>
+          <p:cNvSpPr>
+            <a:spLocks noGrp="1"/>
+          </p:cNvSpPr>
+          <p:nvPr>
+            <p:ph idx="1"/>
+          </p:nvPr>
+        </p:nvSpPr>
+        <p:spPr/>
+        <p:txBody>
+          <a:bodyPr/>
+          <a:lstStyle/>
+          <a:p>
+            <a:endParaRPr lang="en-US" dirty="0"/>
+          </a:p>
+          <a:p>
+            <a:r>
+              <a:rPr lang="en-US" dirty="0" smtClean="0"/>
+              <a:t>Multi-Platform</a:t>
+            </a:r>
+            <a:endParaRPr lang="de-AT" dirty="0"/>
+          </a:p>
+          <a:p>
+            <a:r>
+              <a:rPr lang="en-US" dirty="0" smtClean="0"/>
+              <a:t>Databases</a:t>
+            </a:r>
+          </a:p>
+          <a:p>
+            <a:r>
+              <a:rPr lang="en-US" dirty="0" smtClean="0"/>
+              <a:t>Collections</a:t>
+            </a:r>
+          </a:p>
+          <a:p>
+            <a:r>
+              <a:rPr lang="en-US" dirty="0" smtClean="0"/>
+              <a:t>Relationships</a:t>
+            </a:r>
+          </a:p>
+          <a:p>
+            <a:r>
+              <a:rPr lang="en-US" dirty="0" smtClean="0"/>
+              <a:t>File store</a:t>
+            </a:r>
+          </a:p>
+          <a:p>
+            <a:r>
+              <a:rPr lang="en-US" dirty="0" smtClean="0"/>
+              <a:t>Drivers</a:t>
+            </a:r>
+          </a:p>
+        </p:txBody>
+      </p:sp>
+      <p:pic>
+        <p:nvPicPr>
+          <p:cNvPr id="5" name="Grafik 4"/>
+          <p:cNvPicPr>
+            <a:picLocks noChangeAspect="1"/>
+          </p:cNvPicPr>
+          <p:nvPr/>
+        </p:nvPicPr>
+        <p:blipFill>
+          <a:blip r:embed="rId3">
+            <a:extLst>
+              <a:ext uri="{28A0092B-C50C-407E-A947-70E740481C1C}">
+                <a14:useLocalDpi xmlns:a14="http://schemas.microsoft.com/office/drawing/2010/main" val="0"/>
+              </a:ext>
+            </a:extLst>
+          </a:blip>
+          <a:stretch>
+            <a:fillRect/>
+          </a:stretch>
+        </p:blipFill>
+        <p:spPr>
+          <a:xfrm>
+            <a:off x="6409037" y="2869896"/>
+            <a:ext cx="2297287" cy="2297287"/>
+          </a:xfrm>
+          <a:prstGeom prst="rect">
+            <a:avLst/>
+          </a:prstGeom>
+        </p:spPr>
+      </p:pic>
+    </p:spTree>
+    <p:extLst>
+      <p:ext uri="{BB962C8B-B14F-4D97-AF65-F5344CB8AC3E}">
+        <p14:creationId xmlns:p14="http://schemas.microsoft.com/office/powerpoint/2010/main" val="2286009924"/>
+      </p:ext>
+    </p:extLst>
+  </p:cSld>
+  <p:clrMapOvr>
+    <a:masterClrMapping/>
+  </p:clrMapOvr>
+  <p:timing>
+    <p:tnLst>
+      <p:par>
+        <p:cTn id="1" dur="indefinite" restart="never" nodeType="tmRoot"/>
+      </p:par>
+    </p:tnLst>
+  </p:timing>
+</p:sld>
+</file>
+
+<file path=ppt/slides/slide43.xml><?xml version="1.0" encoding="utf-8"?>
+<p:sld xmlns:a="http://schemas.openxmlformats.org/drawingml/2006/main" xmlns:r="http://schemas.openxmlformats.org/officeDocument/2006/relationships" xmlns:p="http://schemas.openxmlformats.org/presentationml/2006/main">
+  <p:cSld>
+    <p:spTree>
+      <p:nvGrpSpPr>
+        <p:cNvPr id="1" name=""/>
+        <p:cNvGrpSpPr/>
+        <p:nvPr/>
+      </p:nvGrpSpPr>
+      <p:grpSpPr>
+        <a:xfrm>
+          <a:off x="0" y="0"/>
+          <a:ext cx="0" cy="0"/>
+          <a:chOff x="0" y="0"/>
+          <a:chExt cx="0" cy="0"/>
+        </a:xfrm>
+      </p:grpSpPr>
+      <p:sp>
+        <p:nvSpPr>
+          <p:cNvPr id="2" name="Titel 1"/>
+          <p:cNvSpPr>
+            <a:spLocks noGrp="1"/>
+          </p:cNvSpPr>
+          <p:nvPr>
+            <p:ph type="title"/>
+          </p:nvPr>
+        </p:nvSpPr>
+        <p:spPr/>
+        <p:txBody>
+          <a:bodyPr/>
+          <a:lstStyle/>
+          <a:p>
+            <a:r>
+              <a:rPr lang="en-US" dirty="0" err="1" smtClean="0"/>
+              <a:t>MongoDB</a:t>
+            </a:r>
+            <a:r>
+              <a:rPr lang="en-US" dirty="0" smtClean="0"/>
+              <a:t> – Specs</a:t>
+            </a:r>
+            <a:endParaRPr lang="de-AT" dirty="0"/>
+          </a:p>
+        </p:txBody>
+      </p:sp>
+      <p:sp>
+        <p:nvSpPr>
+          <p:cNvPr id="3" name="Inhaltsplatzhalter 2"/>
+          <p:cNvSpPr>
+            <a:spLocks noGrp="1"/>
+          </p:cNvSpPr>
+          <p:nvPr>
+            <p:ph idx="1"/>
+          </p:nvPr>
+        </p:nvSpPr>
+        <p:spPr/>
+        <p:txBody>
+          <a:bodyPr/>
+          <a:lstStyle/>
+          <a:p>
+            <a:endParaRPr lang="en-US" dirty="0" smtClean="0"/>
+          </a:p>
+          <a:p>
+            <a:r>
+              <a:rPr lang="en-US" dirty="0" smtClean="0"/>
+              <a:t>Doc size 16MB</a:t>
+            </a:r>
+          </a:p>
+          <a:p>
+            <a:r>
+              <a:rPr lang="en-US" dirty="0" smtClean="0"/>
+              <a:t>Master-Slave</a:t>
+            </a:r>
+          </a:p>
+          <a:p>
+            <a:r>
+              <a:rPr lang="en-US" dirty="0" err="1" smtClean="0"/>
+              <a:t>Autosharding</a:t>
+            </a:r>
+            <a:endParaRPr lang="en-US" dirty="0" smtClean="0"/>
+          </a:p>
+          <a:p>
+            <a:r>
+              <a:rPr lang="en-US" dirty="0" smtClean="0"/>
+              <a:t>Indexes</a:t>
+            </a:r>
+          </a:p>
+          <a:p>
+            <a:r>
+              <a:rPr lang="en-US" dirty="0" smtClean="0"/>
+              <a:t>Queries on contents</a:t>
+            </a:r>
+            <a:endParaRPr lang="de-AT" dirty="0"/>
+          </a:p>
+        </p:txBody>
+      </p:sp>
+      <p:pic>
+        <p:nvPicPr>
+          <p:cNvPr id="4" name="Grafik 3"/>
+          <p:cNvPicPr>
+            <a:picLocks noChangeAspect="1"/>
+          </p:cNvPicPr>
+          <p:nvPr/>
+        </p:nvPicPr>
+        <p:blipFill>
+          <a:blip r:embed="rId3">
+            <a:extLst>
+              <a:ext uri="{28A0092B-C50C-407E-A947-70E740481C1C}">
+                <a14:useLocalDpi xmlns:a14="http://schemas.microsoft.com/office/drawing/2010/main" val="0"/>
+              </a:ext>
+            </a:extLst>
+          </a:blip>
+          <a:stretch>
+            <a:fillRect/>
+          </a:stretch>
+        </p:blipFill>
+        <p:spPr>
+          <a:xfrm>
+            <a:off x="6409037" y="2869896"/>
+            <a:ext cx="2297287" cy="2297287"/>
+          </a:xfrm>
+          <a:prstGeom prst="rect">
+            <a:avLst/>
+          </a:prstGeom>
+        </p:spPr>
+      </p:pic>
+    </p:spTree>
+    <p:extLst>
+      <p:ext uri="{BB962C8B-B14F-4D97-AF65-F5344CB8AC3E}">
+        <p14:creationId xmlns:p14="http://schemas.microsoft.com/office/powerpoint/2010/main" val="1117048059"/>
+      </p:ext>
+    </p:extLst>
+  </p:cSld>
+  <p:clrMapOvr>
+    <a:masterClrMapping/>
+  </p:clrMapOvr>
+  <p:timing>
+    <p:tnLst>
+      <p:par>
+        <p:cTn id="1" dur="indefinite" restart="never" nodeType="tmRoot"/>
+      </p:par>
+    </p:tnLst>
+  </p:timing>
+</p:sld>
+</file>
+
+<file path=ppt/slides/slide44.xml><?xml version="1.0" encoding="utf-8"?>
+<p:sld xmlns:a="http://schemas.openxmlformats.org/drawingml/2006/main" xmlns:r="http://schemas.openxmlformats.org/officeDocument/2006/relationships" xmlns:p="http://schemas.openxmlformats.org/presentationml/2006/main">
+  <p:cSld>
+    <p:spTree>
+      <p:nvGrpSpPr>
+        <p:cNvPr id="1" name=""/>
+        <p:cNvGrpSpPr/>
+        <p:nvPr/>
+      </p:nvGrpSpPr>
+      <p:grpSpPr>
+        <a:xfrm>
+          <a:off x="0" y="0"/>
+          <a:ext cx="0" cy="0"/>
+          <a:chOff x="0" y="0"/>
+          <a:chExt cx="0" cy="0"/>
+        </a:xfrm>
+      </p:grpSpPr>
+      <p:sp>
+        <p:nvSpPr>
+          <p:cNvPr id="2" name="Titel 1"/>
+          <p:cNvSpPr>
+            <a:spLocks noGrp="1"/>
+          </p:cNvSpPr>
+          <p:nvPr>
+            <p:ph type="title"/>
+          </p:nvPr>
+        </p:nvSpPr>
+        <p:spPr/>
+        <p:txBody>
+          <a:bodyPr/>
+          <a:lstStyle/>
+          <a:p>
+            <a:r>
+              <a:rPr lang="en-US" dirty="0" err="1" smtClean="0"/>
+              <a:t>MongoDB</a:t>
+            </a:r>
+            <a:r>
+              <a:rPr lang="en-US" dirty="0" smtClean="0"/>
+              <a:t> – Data types</a:t>
+            </a:r>
+            <a:endParaRPr lang="de-AT" dirty="0"/>
+          </a:p>
+        </p:txBody>
+      </p:sp>
+      <p:sp>
+        <p:nvSpPr>
+          <p:cNvPr id="3" name="Inhaltsplatzhalter 2"/>
+          <p:cNvSpPr>
+            <a:spLocks noGrp="1"/>
+          </p:cNvSpPr>
+          <p:nvPr>
+            <p:ph idx="1"/>
+          </p:nvPr>
+        </p:nvSpPr>
+        <p:spPr/>
+        <p:txBody>
+          <a:bodyPr/>
+          <a:lstStyle/>
+          <a:p>
+            <a:endParaRPr lang="en-US" dirty="0" smtClean="0"/>
+          </a:p>
+          <a:p>
+            <a:r>
+              <a:rPr lang="en-US" dirty="0" smtClean="0"/>
+              <a:t>BSON</a:t>
+            </a:r>
+          </a:p>
+          <a:p>
+            <a:r>
+              <a:rPr lang="en-US" dirty="0" smtClean="0"/>
+              <a:t>String, Array, </a:t>
+            </a:r>
+            <a:r>
+              <a:rPr lang="en-US" dirty="0" err="1" smtClean="0"/>
+              <a:t>Bool</a:t>
+            </a:r>
+            <a:r>
+              <a:rPr lang="en-US" dirty="0" smtClean="0"/>
+              <a:t>, Number</a:t>
+            </a:r>
+          </a:p>
+          <a:p>
+            <a:r>
+              <a:rPr lang="en-US" dirty="0" smtClean="0"/>
+              <a:t>Date / Timestamp</a:t>
+            </a:r>
+          </a:p>
+          <a:p>
+            <a:r>
+              <a:rPr lang="en-US" dirty="0" err="1" smtClean="0"/>
+              <a:t>RegEx</a:t>
+            </a:r>
+            <a:endParaRPr lang="en-US" dirty="0" smtClean="0"/>
+          </a:p>
+          <a:p>
+            <a:r>
+              <a:rPr lang="en-US" dirty="0" smtClean="0"/>
+              <a:t>Code</a:t>
+            </a:r>
+          </a:p>
+          <a:p>
+            <a:r>
+              <a:rPr lang="en-US" dirty="0" smtClean="0"/>
+              <a:t>Document</a:t>
+            </a:r>
+            <a:endParaRPr lang="de-AT" dirty="0"/>
+          </a:p>
+        </p:txBody>
+      </p:sp>
+      <p:pic>
+        <p:nvPicPr>
+          <p:cNvPr id="4" name="Grafik 3"/>
+          <p:cNvPicPr>
+            <a:picLocks noChangeAspect="1"/>
+          </p:cNvPicPr>
+          <p:nvPr/>
+        </p:nvPicPr>
+        <p:blipFill>
+          <a:blip r:embed="rId3">
+            <a:extLst>
+              <a:ext uri="{28A0092B-C50C-407E-A947-70E740481C1C}">
+                <a14:useLocalDpi xmlns:a14="http://schemas.microsoft.com/office/drawing/2010/main" val="0"/>
+              </a:ext>
+            </a:extLst>
+          </a:blip>
+          <a:stretch>
+            <a:fillRect/>
+          </a:stretch>
+        </p:blipFill>
+        <p:spPr>
+          <a:xfrm>
+            <a:off x="6409037" y="2869896"/>
+            <a:ext cx="2297287" cy="2297287"/>
+          </a:xfrm>
+          <a:prstGeom prst="rect">
+            <a:avLst/>
+          </a:prstGeom>
+        </p:spPr>
+      </p:pic>
+    </p:spTree>
+    <p:extLst>
+      <p:ext uri="{BB962C8B-B14F-4D97-AF65-F5344CB8AC3E}">
+        <p14:creationId xmlns:p14="http://schemas.microsoft.com/office/powerpoint/2010/main" val="3352376310"/>
+      </p:ext>
+    </p:extLst>
+  </p:cSld>
+  <p:clrMapOvr>
+    <a:masterClrMapping/>
+  </p:clrMapOvr>
+  <p:timing>
+    <p:tnLst>
+      <p:par>
+        <p:cTn id="1" dur="indefinite" restart="never" nodeType="tmRoot"/>
+      </p:par>
+    </p:tnLst>
+  </p:timing>
+</p:sld>
+</file>
+
+<file path=ppt/slides/slide45.xml><?xml version="1.0" encoding="utf-8"?>
+<p:sld xmlns:a="http://schemas.openxmlformats.org/drawingml/2006/main" xmlns:r="http://schemas.openxmlformats.org/officeDocument/2006/relationships" xmlns:p="http://schemas.openxmlformats.org/presentationml/2006/main">
+  <p:cSld>
+    <p:spTree>
+      <p:nvGrpSpPr>
+        <p:cNvPr id="1" name=""/>
+        <p:cNvGrpSpPr/>
+        <p:nvPr/>
+      </p:nvGrpSpPr>
+      <p:grpSpPr>
+        <a:xfrm>
+          <a:off x="0" y="0"/>
+          <a:ext cx="0" cy="0"/>
+          <a:chOff x="0" y="0"/>
+          <a:chExt cx="0" cy="0"/>
+        </a:xfrm>
+      </p:grpSpPr>
+      <p:sp>
+        <p:nvSpPr>
+          <p:cNvPr id="2" name="Titel 1"/>
+          <p:cNvSpPr>
+            <a:spLocks noGrp="1"/>
+          </p:cNvSpPr>
+          <p:nvPr>
+            <p:ph type="title"/>
+          </p:nvPr>
+        </p:nvSpPr>
+        <p:spPr/>
+        <p:txBody>
+          <a:bodyPr/>
+          <a:lstStyle/>
+          <a:p>
+            <a:r>
+              <a:rPr lang="en-US" dirty="0" smtClean="0"/>
+              <a:t>Reading</a:t>
+            </a:r>
+            <a:endParaRPr lang="de-AT" dirty="0"/>
+          </a:p>
+        </p:txBody>
+      </p:sp>
+      <p:sp>
+        <p:nvSpPr>
+          <p:cNvPr id="3" name="Inhaltsplatzhalter 2"/>
+          <p:cNvSpPr>
+            <a:spLocks noGrp="1"/>
+          </p:cNvSpPr>
+          <p:nvPr>
+            <p:ph idx="1"/>
+          </p:nvPr>
+        </p:nvSpPr>
+        <p:spPr/>
+        <p:txBody>
+          <a:bodyPr>
+            <a:normAutofit/>
+          </a:bodyPr>
+          <a:lstStyle/>
+          <a:p>
+            <a:pPr marL="0" indent="0">
+              <a:buNone/>
+            </a:pPr>
+            <a:endParaRPr lang="en-US" sz="2400" dirty="0" err="1"/>
+          </a:p>
+          <a:p>
+            <a:pPr marL="0" indent="0">
+              <a:buNone/>
+            </a:pPr>
+            <a:r>
+              <a:rPr lang="de-AT" sz="2400" dirty="0"/>
+              <a:t> </a:t>
+            </a:r>
+            <a:r>
+              <a:rPr lang="de-AT" sz="2400" b="1" dirty="0" err="1" smtClean="0"/>
+              <a:t>NoSQL</a:t>
+            </a:r>
+            <a:r>
+              <a:rPr lang="de-AT" sz="2400" dirty="0" smtClean="0"/>
+              <a:t> – </a:t>
+            </a:r>
+          </a:p>
+          <a:p>
+            <a:pPr marL="0" indent="0">
+              <a:buNone/>
+            </a:pPr>
+            <a:r>
+              <a:rPr lang="de-AT" sz="2400" dirty="0" smtClean="0"/>
+              <a:t>Einstieg </a:t>
+            </a:r>
+            <a:r>
+              <a:rPr lang="de-AT" sz="2400" dirty="0"/>
+              <a:t>in die Welt </a:t>
+            </a:r>
+            <a:r>
+              <a:rPr lang="de-AT" sz="2400" dirty="0" smtClean="0"/>
+              <a:t>nichtrelationaler</a:t>
+            </a:r>
+          </a:p>
+          <a:p>
+            <a:pPr marL="0" indent="0">
+              <a:buNone/>
+            </a:pPr>
+            <a:r>
+              <a:rPr lang="de-AT" sz="2400" dirty="0" smtClean="0"/>
+              <a:t>Web </a:t>
+            </a:r>
+            <a:r>
+              <a:rPr lang="de-AT" sz="2400" dirty="0"/>
+              <a:t>2.0 </a:t>
+            </a:r>
+            <a:r>
+              <a:rPr lang="de-AT" sz="2400" dirty="0" smtClean="0"/>
+              <a:t>Datenbanken</a:t>
+            </a:r>
+          </a:p>
+          <a:p>
+            <a:pPr marL="0" indent="0">
+              <a:buNone/>
+            </a:pPr>
+            <a:endParaRPr lang="de-AT" sz="2400" dirty="0" smtClean="0"/>
+          </a:p>
+          <a:p>
+            <a:pPr marL="0" indent="0">
+              <a:buNone/>
+            </a:pPr>
+            <a:r>
+              <a:rPr lang="en-US" sz="2000" dirty="0" smtClean="0"/>
+              <a:t>S. </a:t>
+            </a:r>
+            <a:r>
+              <a:rPr lang="en-US" sz="2000" dirty="0" err="1" smtClean="0"/>
+              <a:t>Edlich</a:t>
+            </a:r>
+            <a:r>
+              <a:rPr lang="en-US" sz="2000" dirty="0" smtClean="0"/>
+              <a:t>, A. </a:t>
+            </a:r>
+            <a:r>
+              <a:rPr lang="en-US" sz="2000" dirty="0" err="1" smtClean="0"/>
+              <a:t>Friedland</a:t>
+            </a:r>
+            <a:r>
+              <a:rPr lang="en-US" sz="2000" dirty="0" smtClean="0"/>
+              <a:t>, J. </a:t>
+            </a:r>
+            <a:r>
+              <a:rPr lang="en-US" sz="2000" dirty="0" err="1" smtClean="0"/>
+              <a:t>Hampe</a:t>
+            </a:r>
+            <a:r>
+              <a:rPr lang="en-US" sz="2000" dirty="0" smtClean="0"/>
+              <a:t>, B. </a:t>
+            </a:r>
+            <a:r>
+              <a:rPr lang="en-US" sz="2000" dirty="0" err="1" smtClean="0"/>
+              <a:t>Brauer</a:t>
+            </a:r>
+            <a:endParaRPr lang="en-US" sz="2000" dirty="0" smtClean="0"/>
+          </a:p>
+          <a:p>
+            <a:pPr marL="0" indent="0">
+              <a:buNone/>
+            </a:pPr>
+            <a:r>
+              <a:rPr lang="en-US" sz="2400" dirty="0" smtClean="0"/>
+              <a:t>2010</a:t>
+            </a:r>
+          </a:p>
+          <a:p>
+            <a:pPr marL="0" indent="0">
+              <a:buNone/>
+            </a:pPr>
+            <a:r>
+              <a:rPr lang="en-US" sz="2400" dirty="0" smtClean="0"/>
+              <a:t>2</a:t>
+            </a:r>
+            <a:r>
+              <a:rPr lang="en-US" sz="2400" baseline="30000" dirty="0" smtClean="0"/>
+              <a:t>nd</a:t>
+            </a:r>
+            <a:r>
+              <a:rPr lang="en-US" sz="2400" dirty="0" smtClean="0"/>
+              <a:t> Edition (2011)</a:t>
+            </a:r>
+          </a:p>
+          <a:p>
+            <a:pPr marL="0" indent="0">
+              <a:buNone/>
+            </a:pPr>
+            <a:r>
+              <a:rPr lang="en-US" sz="2400" dirty="0" err="1" smtClean="0"/>
+              <a:t>Hanser</a:t>
+            </a:r>
+            <a:r>
+              <a:rPr lang="en-US" sz="2400" dirty="0" smtClean="0"/>
+              <a:t>, </a:t>
+            </a:r>
+            <a:r>
+              <a:rPr lang="en-US" sz="2400" dirty="0"/>
+              <a:t>ISBN: </a:t>
+            </a:r>
+            <a:r>
+              <a:rPr lang="en-US" sz="2400" dirty="0" smtClean="0"/>
+              <a:t>978-3-446-42753-2</a:t>
+            </a:r>
+            <a:endParaRPr lang="en-US" sz="2400" dirty="0"/>
+          </a:p>
+        </p:txBody>
+      </p:sp>
+      <p:pic>
+        <p:nvPicPr>
+          <p:cNvPr id="4" name="Grafik 3"/>
+          <p:cNvPicPr>
+            <a:picLocks noChangeAspect="1"/>
+          </p:cNvPicPr>
+          <p:nvPr/>
+        </p:nvPicPr>
+        <p:blipFill>
+          <a:blip r:embed="rId2">
+            <a:extLst>
+              <a:ext uri="{28A0092B-C50C-407E-A947-70E740481C1C}">
+                <a14:useLocalDpi xmlns:a14="http://schemas.microsoft.com/office/drawing/2010/main" val="0"/>
+              </a:ext>
+            </a:extLst>
+          </a:blip>
+          <a:stretch>
+            <a:fillRect/>
+          </a:stretch>
+        </p:blipFill>
+        <p:spPr>
+          <a:xfrm>
+            <a:off x="6081187" y="2328532"/>
+            <a:ext cx="2635407" cy="3330862"/>
+          </a:xfrm>
+          <a:prstGeom prst="rect">
+            <a:avLst/>
+          </a:prstGeom>
+        </p:spPr>
+      </p:pic>
+    </p:spTree>
+    <p:extLst>
+      <p:ext uri="{BB962C8B-B14F-4D97-AF65-F5344CB8AC3E}">
+        <p14:creationId xmlns:p14="http://schemas.microsoft.com/office/powerpoint/2010/main" val="1595185377"/>
+      </p:ext>
+    </p:extLst>
+  </p:cSld>
+  <p:clrMapOvr>
+    <a:masterClrMapping/>
+  </p:clrMapOvr>
+  <p:timing>
+    <p:tnLst>
+      <p:par>
+        <p:cTn id="1" dur="indefinite" restart="never" nodeType="tmRoot"/>
+      </p:par>
+    </p:tnLst>
+  </p:timing>
+</p:sld>
+</file>
+
+<file path=ppt/slides/slide46.xml><?xml version="1.0" encoding="utf-8"?>
+<p:sld xmlns:a="http://schemas.openxmlformats.org/drawingml/2006/main" xmlns:r="http://schemas.openxmlformats.org/officeDocument/2006/relationships" xmlns:p="http://schemas.openxmlformats.org/presentationml/2006/main">
+  <p:cSld>
+    <p:spTree>
+      <p:nvGrpSpPr>
+        <p:cNvPr id="1" name=""/>
+        <p:cNvGrpSpPr/>
+        <p:nvPr/>
+      </p:nvGrpSpPr>
+      <p:grpSpPr>
+        <a:xfrm>
+          <a:off x="0" y="0"/>
+          <a:ext cx="0" cy="0"/>
+          <a:chOff x="0" y="0"/>
+          <a:chExt cx="0" cy="0"/>
+        </a:xfrm>
+      </p:grpSpPr>
+      <p:pic>
+        <p:nvPicPr>
+          <p:cNvPr id="5" name="Grafik 4"/>
+          <p:cNvPicPr>
+            <a:picLocks noChangeAspect="1"/>
+          </p:cNvPicPr>
+          <p:nvPr/>
+        </p:nvPicPr>
+        <p:blipFill>
+          <a:blip r:embed="rId2">
+            <a:extLst>
+              <a:ext uri="{28A0092B-C50C-407E-A947-70E740481C1C}">
+                <a14:useLocalDpi xmlns:a14="http://schemas.microsoft.com/office/drawing/2010/main" val="0"/>
+              </a:ext>
+            </a:extLst>
+          </a:blip>
+          <a:stretch>
+            <a:fillRect/>
+          </a:stretch>
+        </p:blipFill>
+        <p:spPr>
+          <a:xfrm>
+            <a:off x="6081187" y="2328532"/>
+            <a:ext cx="2635407" cy="3513876"/>
+          </a:xfrm>
+          <a:prstGeom prst="rect">
+            <a:avLst/>
+          </a:prstGeom>
+        </p:spPr>
+      </p:pic>
+      <p:sp>
+        <p:nvSpPr>
+          <p:cNvPr id="2" name="Titel 1"/>
+          <p:cNvSpPr>
+            <a:spLocks noGrp="1"/>
+          </p:cNvSpPr>
+          <p:nvPr>
+            <p:ph type="title"/>
+          </p:nvPr>
+        </p:nvSpPr>
+        <p:spPr/>
+        <p:txBody>
+          <a:bodyPr/>
+          <a:lstStyle/>
+          <a:p>
+            <a:r>
+              <a:rPr lang="en-US" dirty="0" smtClean="0"/>
+              <a:t>Reading</a:t>
+            </a:r>
+            <a:endParaRPr lang="de-AT" dirty="0"/>
+          </a:p>
+        </p:txBody>
+      </p:sp>
+      <p:sp>
+        <p:nvSpPr>
+          <p:cNvPr id="3" name="Inhaltsplatzhalter 2"/>
+          <p:cNvSpPr>
+            <a:spLocks noGrp="1"/>
+          </p:cNvSpPr>
+          <p:nvPr>
+            <p:ph idx="1"/>
+          </p:nvPr>
+        </p:nvSpPr>
+        <p:spPr/>
+        <p:txBody>
+          <a:bodyPr>
+            <a:normAutofit/>
+          </a:bodyPr>
+          <a:lstStyle/>
+          <a:p>
+            <a:pPr marL="0" indent="0">
+              <a:buNone/>
+            </a:pPr>
+            <a:endParaRPr lang="en-US" sz="2400" dirty="0" err="1"/>
+          </a:p>
+          <a:p>
+            <a:pPr marL="0" indent="0">
+              <a:buNone/>
+            </a:pPr>
+            <a:r>
+              <a:rPr lang="de-AT" sz="2400" dirty="0"/>
+              <a:t> </a:t>
+            </a:r>
+            <a:r>
+              <a:rPr lang="de-AT" sz="2400" b="1" dirty="0" smtClean="0"/>
+              <a:t>Professional </a:t>
+            </a:r>
+            <a:r>
+              <a:rPr lang="de-AT" sz="2400" b="1" dirty="0" err="1" smtClean="0"/>
+              <a:t>NoSQL</a:t>
+            </a:r>
+            <a:endParaRPr lang="de-AT" sz="2400" dirty="0" smtClean="0"/>
+          </a:p>
+          <a:p>
+            <a:pPr marL="0" indent="0">
+              <a:buNone/>
+            </a:pPr>
+            <a:endParaRPr lang="en-US" sz="2400" dirty="0" smtClean="0"/>
+          </a:p>
+          <a:p>
+            <a:pPr marL="0" indent="0">
+              <a:buNone/>
+            </a:pPr>
+            <a:r>
+              <a:rPr lang="en-US" sz="2400" dirty="0" smtClean="0"/>
+              <a:t>S. </a:t>
+            </a:r>
+            <a:r>
+              <a:rPr lang="en-US" sz="2400" dirty="0" err="1" smtClean="0"/>
+              <a:t>Tiwari</a:t>
+            </a:r>
+            <a:endParaRPr lang="en-US" sz="2400" dirty="0" smtClean="0"/>
+          </a:p>
+          <a:p>
+            <a:pPr marL="0" indent="0">
+              <a:buNone/>
+            </a:pPr>
+            <a:r>
+              <a:rPr lang="en-US" sz="2400" dirty="0" smtClean="0"/>
+              <a:t>2011</a:t>
+            </a:r>
+          </a:p>
+          <a:p>
+            <a:pPr marL="0" indent="0">
+              <a:buNone/>
+            </a:pPr>
+            <a:r>
+              <a:rPr lang="en-US" sz="2400" dirty="0" err="1" smtClean="0"/>
+              <a:t>Wrox</a:t>
+            </a:r>
+            <a:r>
+              <a:rPr lang="en-US" sz="2400" dirty="0"/>
+              <a:t>, </a:t>
+            </a:r>
+            <a:r>
+              <a:rPr lang="en-US" sz="2400" dirty="0" smtClean="0"/>
+              <a:t>ISBN: 978-1-4571-0685-9</a:t>
+            </a:r>
+          </a:p>
+          <a:p>
+            <a:pPr marL="0" indent="0">
+              <a:buNone/>
+            </a:pPr>
+            <a:r>
+              <a:rPr lang="en-US" sz="2400" dirty="0" smtClean="0">
+                <a:hlinkClick r:id="rId3"/>
+              </a:rPr>
+              <a:t>http://it-ebooks.info/book/812/</a:t>
+            </a:r>
+            <a:endParaRPr lang="en-US" sz="2400" dirty="0" smtClean="0"/>
+          </a:p>
+        </p:txBody>
+      </p:sp>
+    </p:spTree>
+    <p:extLst>
+      <p:ext uri="{BB962C8B-B14F-4D97-AF65-F5344CB8AC3E}">
+        <p14:creationId xmlns:p14="http://schemas.microsoft.com/office/powerpoint/2010/main" val="2369248850"/>
+      </p:ext>
+    </p:extLst>
+  </p:cSld>
+  <p:clrMapOvr>
+    <a:masterClrMapping/>
+  </p:clrMapOvr>
+  <p:timing>
+    <p:tnLst>
+      <p:par>
+        <p:cTn id="1" dur="indefinite" restart="never" nodeType="tmRoot"/>
+      </p:par>
+    </p:tnLst>
+  </p:timing>
+</p:sld>
+</file>
+
+<file path=ppt/slides/slide47.xml><?xml version="1.0" encoding="utf-8"?>
+<p:sld xmlns:a="http://schemas.openxmlformats.org/drawingml/2006/main" xmlns:r="http://schemas.openxmlformats.org/officeDocument/2006/relationships" xmlns:p="http://schemas.openxmlformats.org/presentationml/2006/main">
+  <p:cSld>
+    <p:spTree>
+      <p:nvGrpSpPr>
+        <p:cNvPr id="1" name=""/>
+        <p:cNvGrpSpPr/>
+        <p:nvPr/>
+      </p:nvGrpSpPr>
+      <p:grpSpPr>
+        <a:xfrm>
+          <a:off x="0" y="0"/>
+          <a:ext cx="0" cy="0"/>
+          <a:chOff x="0" y="0"/>
+          <a:chExt cx="0" cy="0"/>
+        </a:xfrm>
+      </p:grpSpPr>
+      <p:pic>
+        <p:nvPicPr>
+          <p:cNvPr id="4" name="Grafik 3"/>
+          <p:cNvPicPr>
+            <a:picLocks noChangeAspect="1"/>
+          </p:cNvPicPr>
+          <p:nvPr/>
+        </p:nvPicPr>
+        <p:blipFill>
+          <a:blip r:embed="rId2">
+            <a:extLst>
+              <a:ext uri="{28A0092B-C50C-407E-A947-70E740481C1C}">
+                <a14:useLocalDpi xmlns:a14="http://schemas.microsoft.com/office/drawing/2010/main" val="0"/>
+              </a:ext>
+            </a:extLst>
+          </a:blip>
+          <a:stretch>
+            <a:fillRect/>
+          </a:stretch>
+        </p:blipFill>
+        <p:spPr>
+          <a:xfrm>
+            <a:off x="6091019" y="2328532"/>
+            <a:ext cx="2625575" cy="3429001"/>
+          </a:xfrm>
+          <a:prstGeom prst="rect">
+            <a:avLst/>
+          </a:prstGeom>
+        </p:spPr>
+      </p:pic>
+      <p:sp>
+        <p:nvSpPr>
+          <p:cNvPr id="2" name="Titel 1"/>
+          <p:cNvSpPr>
+            <a:spLocks noGrp="1"/>
+          </p:cNvSpPr>
+          <p:nvPr>
+            <p:ph type="title"/>
+          </p:nvPr>
+        </p:nvSpPr>
+        <p:spPr/>
+        <p:txBody>
+          <a:bodyPr/>
+          <a:lstStyle/>
+          <a:p>
+            <a:r>
+              <a:rPr lang="en-US" dirty="0" smtClean="0"/>
+              <a:t>Reading</a:t>
+            </a:r>
+            <a:endParaRPr lang="de-AT" dirty="0"/>
+          </a:p>
+        </p:txBody>
+      </p:sp>
+      <p:sp>
+        <p:nvSpPr>
+          <p:cNvPr id="3" name="Inhaltsplatzhalter 2"/>
+          <p:cNvSpPr>
+            <a:spLocks noGrp="1"/>
+          </p:cNvSpPr>
+          <p:nvPr>
+            <p:ph idx="1"/>
+          </p:nvPr>
+        </p:nvSpPr>
+        <p:spPr/>
+        <p:txBody>
+          <a:bodyPr>
+            <a:normAutofit/>
+          </a:bodyPr>
+          <a:lstStyle/>
+          <a:p>
+            <a:pPr marL="0" indent="0">
+              <a:buNone/>
+            </a:pPr>
+            <a:endParaRPr lang="en-US" sz="2400" dirty="0" err="1"/>
+          </a:p>
+          <a:p>
+            <a:pPr marL="0" indent="0">
+              <a:buNone/>
+            </a:pPr>
+            <a:r>
+              <a:rPr lang="de-AT" sz="2400" b="1" dirty="0" err="1" smtClean="0"/>
+              <a:t>NoSQL</a:t>
+            </a:r>
+            <a:r>
+              <a:rPr lang="de-AT" sz="2400" b="1" dirty="0" smtClean="0"/>
+              <a:t> </a:t>
+            </a:r>
+            <a:r>
+              <a:rPr lang="de-AT" sz="2400" b="1" dirty="0" err="1" smtClean="0"/>
+              <a:t>Distilled</a:t>
+            </a:r>
+            <a:endParaRPr lang="de-AT" sz="2400" dirty="0" smtClean="0"/>
+          </a:p>
+          <a:p>
+            <a:pPr marL="0" indent="0">
+              <a:buNone/>
+            </a:pPr>
+            <a:endParaRPr lang="en-US" sz="2400" dirty="0" smtClean="0"/>
+          </a:p>
+          <a:p>
+            <a:pPr marL="0" indent="0">
+              <a:buNone/>
+            </a:pPr>
+            <a:r>
+              <a:rPr lang="en-US" sz="2400" dirty="0" smtClean="0"/>
+              <a:t>P. J. </a:t>
+            </a:r>
+            <a:r>
+              <a:rPr lang="en-US" sz="2400" dirty="0" err="1" smtClean="0"/>
+              <a:t>Sadalage</a:t>
+            </a:r>
+            <a:r>
+              <a:rPr lang="en-US" sz="2400" dirty="0" smtClean="0"/>
+              <a:t>, M. Fowler</a:t>
+            </a:r>
+          </a:p>
+          <a:p>
+            <a:pPr marL="0" indent="0">
+              <a:buNone/>
+            </a:pPr>
+            <a:r>
+              <a:rPr lang="en-US" sz="2400" dirty="0" smtClean="0"/>
+              <a:t>2012</a:t>
+            </a:r>
+          </a:p>
+          <a:p>
+            <a:pPr marL="0" indent="0">
+              <a:buNone/>
+            </a:pPr>
+            <a:r>
+              <a:rPr lang="en-US" sz="2400" dirty="0"/>
+              <a:t>Addison-Wesley, </a:t>
+            </a:r>
+            <a:r>
+              <a:rPr lang="en-US" sz="2400" dirty="0" smtClean="0"/>
+              <a:t>ISBN: 978-0321826626</a:t>
+            </a:r>
+          </a:p>
+        </p:txBody>
+      </p:sp>
+    </p:spTree>
+    <p:extLst>
+      <p:ext uri="{BB962C8B-B14F-4D97-AF65-F5344CB8AC3E}">
+        <p14:creationId xmlns:p14="http://schemas.microsoft.com/office/powerpoint/2010/main" val="3610914170"/>
+      </p:ext>
+    </p:extLst>
+  </p:cSld>
+  <p:clrMapOvr>
+    <a:masterClrMapping/>
+  </p:clrMapOvr>
+  <p:timing>
+    <p:tnLst>
+      <p:par>
+        <p:cTn id="1" dur="indefinite" restart="never" nodeType="tmRoot"/>
+      </p:par>
+    </p:tnLst>
+  </p:timing>
+</p:sld>
+</file>
+
+<file path=ppt/slides/slide48.xml><?xml version="1.0" encoding="utf-8"?>
+<p:sld xmlns:a="http://schemas.openxmlformats.org/drawingml/2006/main" xmlns:r="http://schemas.openxmlformats.org/officeDocument/2006/relationships" xmlns:p="http://schemas.openxmlformats.org/presentationml/2006/main">
+  <p:cSld>
+    <p:spTree>
+      <p:nvGrpSpPr>
+        <p:cNvPr id="1" name=""/>
+        <p:cNvGrpSpPr/>
+        <p:nvPr/>
+      </p:nvGrpSpPr>
+      <p:grpSpPr>
+        <a:xfrm>
+          <a:off x="0" y="0"/>
+          <a:ext cx="0" cy="0"/>
+          <a:chOff x="0" y="0"/>
+          <a:chExt cx="0" cy="0"/>
+        </a:xfrm>
+      </p:grpSpPr>
+      <p:pic>
+        <p:nvPicPr>
+          <p:cNvPr id="5" name="Grafik 4"/>
+          <p:cNvPicPr>
+            <a:picLocks noChangeAspect="1"/>
+          </p:cNvPicPr>
+          <p:nvPr/>
+        </p:nvPicPr>
+        <p:blipFill rotWithShape="1">
+          <a:blip r:embed="rId2">
+            <a:extLst>
+              <a:ext uri="{28A0092B-C50C-407E-A947-70E740481C1C}">
+                <a14:useLocalDpi xmlns:a14="http://schemas.microsoft.com/office/drawing/2010/main" val="0"/>
+              </a:ext>
+            </a:extLst>
+          </a:blip>
+          <a:srcRect r="8027" b="7466"/>
+          <a:stretch/>
+        </p:blipFill>
+        <p:spPr>
+          <a:xfrm>
+            <a:off x="6091019" y="2328532"/>
+            <a:ext cx="2595781" cy="3273198"/>
+          </a:xfrm>
+          <a:prstGeom prst="rect">
+            <a:avLst/>
+          </a:prstGeom>
+        </p:spPr>
+      </p:pic>
+      <p:sp>
+        <p:nvSpPr>
+          <p:cNvPr id="2" name="Titel 1"/>
+          <p:cNvSpPr>
+            <a:spLocks noGrp="1"/>
+          </p:cNvSpPr>
+          <p:nvPr>
+            <p:ph type="title"/>
+          </p:nvPr>
+        </p:nvSpPr>
+        <p:spPr/>
+        <p:txBody>
+          <a:bodyPr/>
+          <a:lstStyle/>
+          <a:p>
+            <a:r>
+              <a:rPr lang="en-US" dirty="0" smtClean="0"/>
+              <a:t>Reading</a:t>
+            </a:r>
+            <a:endParaRPr lang="de-AT" dirty="0"/>
+          </a:p>
+        </p:txBody>
+      </p:sp>
+      <p:sp>
+        <p:nvSpPr>
+          <p:cNvPr id="3" name="Inhaltsplatzhalter 2"/>
+          <p:cNvSpPr>
+            <a:spLocks noGrp="1"/>
+          </p:cNvSpPr>
+          <p:nvPr>
+            <p:ph idx="1"/>
+          </p:nvPr>
+        </p:nvSpPr>
+        <p:spPr/>
+        <p:txBody>
+          <a:bodyPr>
+            <a:normAutofit/>
+          </a:bodyPr>
+          <a:lstStyle/>
+          <a:p>
+            <a:pPr marL="0" indent="0">
+              <a:buNone/>
+            </a:pPr>
+            <a:endParaRPr lang="en-US" sz="2400" dirty="0" err="1"/>
+          </a:p>
+          <a:p>
+            <a:pPr marL="0" indent="0">
+              <a:buNone/>
+            </a:pPr>
+            <a:r>
+              <a:rPr lang="de-AT" sz="2400" b="1" dirty="0" smtClean="0"/>
+              <a:t>Making sense </a:t>
+            </a:r>
+            <a:r>
+              <a:rPr lang="de-AT" sz="2400" b="1" dirty="0" err="1" smtClean="0"/>
+              <a:t>of</a:t>
+            </a:r>
+            <a:r>
+              <a:rPr lang="de-AT" sz="2400" b="1" dirty="0" smtClean="0"/>
+              <a:t> </a:t>
+            </a:r>
+            <a:r>
+              <a:rPr lang="de-AT" sz="2400" b="1" dirty="0" err="1" smtClean="0"/>
+              <a:t>NoSQL</a:t>
+            </a:r>
+            <a:endParaRPr lang="de-AT" sz="2400" dirty="0" smtClean="0"/>
+          </a:p>
+          <a:p>
+            <a:pPr marL="0" indent="0">
+              <a:buNone/>
+            </a:pPr>
+            <a:endParaRPr lang="en-US" sz="2400" dirty="0" smtClean="0"/>
+          </a:p>
+          <a:p>
+            <a:pPr marL="0" indent="0">
+              <a:buNone/>
+            </a:pPr>
+            <a:r>
+              <a:rPr lang="en-US" sz="2400" dirty="0" smtClean="0"/>
+              <a:t>D. McCreary, A. Kelly</a:t>
+            </a:r>
+          </a:p>
+          <a:p>
+            <a:pPr marL="0" indent="0">
+              <a:buNone/>
+            </a:pPr>
+            <a:r>
+              <a:rPr lang="en-US" sz="2400" dirty="0" smtClean="0"/>
+              <a:t>August 2013 (est.)</a:t>
+            </a:r>
+          </a:p>
+          <a:p>
+            <a:pPr marL="0" indent="0">
+              <a:buNone/>
+            </a:pPr>
+            <a:r>
+              <a:rPr lang="en-US" sz="2400" dirty="0" smtClean="0"/>
+              <a:t>Manning</a:t>
+            </a:r>
+            <a:r>
+              <a:rPr lang="en-US" sz="2400" dirty="0"/>
+              <a:t>, ISBN: 9781617291074</a:t>
+            </a:r>
+            <a:endParaRPr lang="en-US" sz="2400" dirty="0" smtClean="0"/>
+          </a:p>
+        </p:txBody>
+      </p:sp>
+    </p:spTree>
+    <p:extLst>
+      <p:ext uri="{BB962C8B-B14F-4D97-AF65-F5344CB8AC3E}">
+        <p14:creationId xmlns:p14="http://schemas.microsoft.com/office/powerpoint/2010/main" val="778298105"/>
+      </p:ext>
+    </p:extLst>
+  </p:cSld>
+  <p:clrMapOvr>
+    <a:masterClrMapping/>
+  </p:clrMapOvr>
+  <p:timing>
+    <p:tnLst>
+      <p:par>
+        <p:cTn id="1" dur="indefinite" restart="never" nodeType="tmRoot"/>
+      </p:par>
+    </p:tnLst>
+  </p:timing>
+</p:sld>
+</file>
+
+<file path=ppt/slides/slide49.xml><?xml version="1.0" encoding="utf-8"?>
+<p:sld xmlns:a="http://schemas.openxmlformats.org/drawingml/2006/main" xmlns:r="http://schemas.openxmlformats.org/officeDocument/2006/relationships" xmlns:p="http://schemas.openxmlformats.org/presentationml/2006/main">
+  <p:cSld>
+    <p:spTree>
+      <p:nvGrpSpPr>
+        <p:cNvPr id="1" name=""/>
+        <p:cNvGrpSpPr/>
+        <p:nvPr/>
+      </p:nvGrpSpPr>
+      <p:grpSpPr>
+        <a:xfrm>
+          <a:off x="0" y="0"/>
+          <a:ext cx="0" cy="0"/>
+          <a:chOff x="0" y="0"/>
+          <a:chExt cx="0" cy="0"/>
+        </a:xfrm>
+      </p:grpSpPr>
+      <p:pic>
+        <p:nvPicPr>
+          <p:cNvPr id="5" name="Grafik 4"/>
+          <p:cNvPicPr>
+            <a:picLocks noChangeAspect="1"/>
+          </p:cNvPicPr>
+          <p:nvPr/>
+        </p:nvPicPr>
+        <p:blipFill>
+          <a:blip r:embed="rId2">
+            <a:extLst>
+              <a:ext uri="{28A0092B-C50C-407E-A947-70E740481C1C}">
+                <a14:useLocalDpi xmlns:a14="http://schemas.microsoft.com/office/drawing/2010/main" val="0"/>
+              </a:ext>
+            </a:extLst>
+          </a:blip>
+          <a:stretch>
+            <a:fillRect/>
+          </a:stretch>
+        </p:blipFill>
+        <p:spPr>
+          <a:xfrm>
+            <a:off x="5697623" y="1876426"/>
+            <a:ext cx="3355761" cy="4443198"/>
+          </a:xfrm>
+          <a:prstGeom prst="rect">
+            <a:avLst/>
+          </a:prstGeom>
+        </p:spPr>
+      </p:pic>
+      <p:sp>
+        <p:nvSpPr>
+          <p:cNvPr id="2" name="Titel 1"/>
+          <p:cNvSpPr>
+            <a:spLocks noGrp="1"/>
+          </p:cNvSpPr>
+          <p:nvPr>
+            <p:ph type="title"/>
+          </p:nvPr>
+        </p:nvSpPr>
+        <p:spPr/>
+        <p:txBody>
+          <a:bodyPr/>
+          <a:lstStyle/>
+          <a:p>
+            <a:r>
+              <a:rPr lang="en-US" dirty="0" smtClean="0"/>
+              <a:t>Reading</a:t>
+            </a:r>
+            <a:endParaRPr lang="de-AT" dirty="0"/>
+          </a:p>
+        </p:txBody>
+      </p:sp>
+      <p:sp>
+        <p:nvSpPr>
+          <p:cNvPr id="3" name="Inhaltsplatzhalter 2"/>
+          <p:cNvSpPr>
+            <a:spLocks noGrp="1"/>
+          </p:cNvSpPr>
+          <p:nvPr>
+            <p:ph idx="1"/>
+          </p:nvPr>
+        </p:nvSpPr>
+        <p:spPr/>
+        <p:txBody>
+          <a:bodyPr>
+            <a:normAutofit/>
+          </a:bodyPr>
+          <a:lstStyle/>
+          <a:p>
+            <a:pPr marL="0" indent="0">
+              <a:buNone/>
+            </a:pPr>
+            <a:endParaRPr lang="en-US" sz="2400" dirty="0" err="1"/>
+          </a:p>
+          <a:p>
+            <a:pPr marL="0" indent="0">
+              <a:buNone/>
+            </a:pPr>
+            <a:r>
+              <a:rPr lang="de-AT" sz="2400" b="1" dirty="0" err="1" smtClean="0"/>
+              <a:t>NoSQL</a:t>
+            </a:r>
+            <a:r>
+              <a:rPr lang="de-AT" sz="2400" b="1" dirty="0" smtClean="0"/>
+              <a:t> Handbook</a:t>
+            </a:r>
+            <a:endParaRPr lang="de-AT" sz="2400" dirty="0" smtClean="0"/>
+          </a:p>
+          <a:p>
+            <a:pPr marL="0" indent="0">
+              <a:buNone/>
+            </a:pPr>
+            <a:endParaRPr lang="en-US" sz="2400" dirty="0" smtClean="0"/>
+          </a:p>
+          <a:p>
+            <a:pPr marL="0" indent="0">
+              <a:buNone/>
+            </a:pPr>
+            <a:r>
+              <a:rPr lang="en-US" sz="2400" dirty="0" smtClean="0"/>
+              <a:t>M. Mayer</a:t>
+            </a:r>
+          </a:p>
+          <a:p>
+            <a:pPr marL="0" indent="0">
+              <a:buNone/>
+            </a:pPr>
+            <a:r>
+              <a:rPr lang="en-US" sz="2400" dirty="0" smtClean="0"/>
+              <a:t>(not fixed yet)</a:t>
+            </a:r>
+          </a:p>
+          <a:p>
+            <a:pPr marL="0" indent="0">
+              <a:buNone/>
+            </a:pPr>
+            <a:r>
+              <a:rPr lang="en-US" sz="2400" dirty="0" smtClean="0">
+                <a:hlinkClick r:id="rId3"/>
+              </a:rPr>
+              <a:t>http://nosqlhandbook.com/</a:t>
+            </a:r>
+            <a:endParaRPr lang="en-US" sz="2400" dirty="0" smtClean="0"/>
+          </a:p>
+        </p:txBody>
+      </p:sp>
+    </p:spTree>
+    <p:extLst>
+      <p:ext uri="{BB962C8B-B14F-4D97-AF65-F5344CB8AC3E}">
+        <p14:creationId xmlns:p14="http://schemas.microsoft.com/office/powerpoint/2010/main" val="3327479946"/>
       </p:ext>
     </p:extLst>
   </p:cSld>
@@ -16170,6 +19925,155 @@
     <p:extLst>
       <p:ext uri="{BB962C8B-B14F-4D97-AF65-F5344CB8AC3E}">
         <p14:creationId xmlns:p14="http://schemas.microsoft.com/office/powerpoint/2010/main" val="2495700292"/>
+      </p:ext>
+    </p:extLst>
+  </p:cSld>
+  <p:clrMapOvr>
+    <a:masterClrMapping/>
+  </p:clrMapOvr>
+  <p:timing>
+    <p:tnLst>
+      <p:par>
+        <p:cTn id="1" dur="indefinite" restart="never" nodeType="tmRoot"/>
+      </p:par>
+    </p:tnLst>
+  </p:timing>
+</p:sld>
+</file>
+
+<file path=ppt/slides/slide50.xml><?xml version="1.0" encoding="utf-8"?>
+<p:sld xmlns:a="http://schemas.openxmlformats.org/drawingml/2006/main" xmlns:r="http://schemas.openxmlformats.org/officeDocument/2006/relationships" xmlns:p="http://schemas.openxmlformats.org/presentationml/2006/main">
+  <p:cSld>
+    <p:spTree>
+      <p:nvGrpSpPr>
+        <p:cNvPr id="1" name=""/>
+        <p:cNvGrpSpPr/>
+        <p:nvPr/>
+      </p:nvGrpSpPr>
+      <p:grpSpPr>
+        <a:xfrm>
+          <a:off x="0" y="0"/>
+          <a:ext cx="0" cy="0"/>
+          <a:chOff x="0" y="0"/>
+          <a:chExt cx="0" cy="0"/>
+        </a:xfrm>
+      </p:grpSpPr>
+      <p:sp>
+        <p:nvSpPr>
+          <p:cNvPr id="3" name="Textfeld 2"/>
+          <p:cNvSpPr txBox="1"/>
+          <p:nvPr/>
+        </p:nvSpPr>
+        <p:spPr>
+          <a:xfrm>
+            <a:off x="280588" y="1319497"/>
+            <a:ext cx="7760446" cy="2308324"/>
+          </a:xfrm>
+          <a:prstGeom prst="rect">
+            <a:avLst/>
+          </a:prstGeom>
+          <a:noFill/>
+        </p:spPr>
+        <p:txBody>
+          <a:bodyPr wrap="square" rtlCol="0">
+            <a:spAutoFit/>
+          </a:bodyPr>
+          <a:lstStyle/>
+          <a:p>
+            <a:r>
+              <a:rPr lang="de-DE" sz="4000" dirty="0" smtClean="0">
+                <a:solidFill>
+                  <a:schemeClr val="bg1"/>
+                </a:solidFill>
+              </a:rPr>
+              <a:t>Trennseite Calibri </a:t>
+            </a:r>
+            <a:r>
+              <a:rPr lang="de-DE" sz="4000" dirty="0">
+                <a:solidFill>
+                  <a:schemeClr val="bg1"/>
+                </a:solidFill>
+              </a:rPr>
+              <a:t>40 </a:t>
+            </a:r>
+            <a:r>
+              <a:rPr lang="de-DE" sz="4000" dirty="0" err="1">
+                <a:solidFill>
+                  <a:schemeClr val="bg1"/>
+                </a:solidFill>
+              </a:rPr>
+              <a:t>pkt</a:t>
+            </a:r>
+            <a:endParaRPr lang="de-DE" sz="4000" dirty="0">
+              <a:solidFill>
+                <a:schemeClr val="bg1"/>
+              </a:solidFill>
+            </a:endParaRPr>
+          </a:p>
+          <a:p>
+            <a:r>
+              <a:rPr lang="de-DE" sz="4000" dirty="0">
+                <a:solidFill>
+                  <a:schemeClr val="bg1"/>
+                </a:solidFill>
+              </a:rPr>
+              <a:t>FH JOANNEUM IN </a:t>
+            </a:r>
+            <a:r>
+              <a:rPr lang="de-DE" sz="4000" i="1" dirty="0" smtClean="0">
+                <a:solidFill>
+                  <a:schemeClr val="bg1"/>
+                </a:solidFill>
+                <a:latin typeface="Georgia"/>
+                <a:cs typeface="Georgia"/>
+              </a:rPr>
+              <a:t>Bewegung</a:t>
+            </a:r>
+          </a:p>
+          <a:p>
+            <a:endParaRPr lang="de-DE" sz="4000" i="1" dirty="0" smtClean="0">
+              <a:solidFill>
+                <a:schemeClr val="bg1"/>
+              </a:solidFill>
+              <a:latin typeface="Georgia"/>
+              <a:cs typeface="Georgia"/>
+            </a:endParaRPr>
+          </a:p>
+          <a:p>
+            <a:r>
+              <a:rPr lang="de-DE" sz="2400" i="1" dirty="0" smtClean="0">
+                <a:solidFill>
+                  <a:schemeClr val="bg1"/>
+                </a:solidFill>
+                <a:latin typeface="Georgia"/>
+                <a:cs typeface="Georgia"/>
+              </a:rPr>
+              <a:t>Auszeichnungen Georgia 24 </a:t>
+            </a:r>
+            <a:r>
+              <a:rPr lang="de-DE" sz="2400" i="1" dirty="0" err="1" smtClean="0">
+                <a:solidFill>
+                  <a:schemeClr val="bg1"/>
+                </a:solidFill>
+                <a:latin typeface="Georgia"/>
+                <a:cs typeface="Georgia"/>
+              </a:rPr>
+              <a:t>pkt</a:t>
+            </a:r>
+            <a:endParaRPr lang="de-DE" sz="2400" i="1" dirty="0">
+              <a:solidFill>
+                <a:schemeClr val="bg1"/>
+              </a:solidFill>
+              <a:latin typeface="Georgia"/>
+              <a:cs typeface="Georgia"/>
+            </a:endParaRPr>
+          </a:p>
+        </p:txBody>
+      </p:sp>
+    </p:spTree>
+    <p:extLst>
+      <p:ext uri="{BB962C8B-B14F-4D97-AF65-F5344CB8AC3E}">
+        <p14:creationId xmlns:p14="http://schemas.microsoft.com/office/powerpoint/2010/main" val="2055451195"/>
       </p:ext>
     </p:extLst>
   </p:cSld>

</xml_diff>

<commit_message>
corrected font size on some graphics.
</commit_message>
<xml_diff>
--- a/Presentation/FHJ_guest_lecture_nosql.pptx
+++ b/Presentation/FHJ_guest_lecture_nosql.pptx
@@ -241,7 +241,7 @@
           <a:p>
             <a:fld id="{7A19BEE0-598C-4858-A439-753E34679212}" type="datetimeFigureOut">
               <a:rPr lang="de-AT" smtClean="0"/>
-              <a:t>04.06.2013</a:t>
+              <a:t>05.06.2013</a:t>
             </a:fld>
             <a:endParaRPr lang="de-AT"/>
           </a:p>
@@ -5109,7 +5109,7 @@
           <a:p>
             <a:fld id="{BD334F44-700B-E44C-96AB-E83A6820DFD3}" type="datetimeFigureOut">
               <a:rPr lang="de-DE" smtClean="0"/>
-              <a:t>04.06.2013</a:t>
+              <a:t>05.06.2013</a:t>
             </a:fld>
             <a:endParaRPr lang="de-DE"/>
           </a:p>
@@ -5289,7 +5289,7 @@
           <a:p>
             <a:fld id="{BD334F44-700B-E44C-96AB-E83A6820DFD3}" type="datetimeFigureOut">
               <a:rPr lang="de-DE" smtClean="0"/>
-              <a:t>04.06.2013</a:t>
+              <a:t>05.06.2013</a:t>
             </a:fld>
             <a:endParaRPr lang="de-DE"/>
           </a:p>
@@ -5469,7 +5469,7 @@
           <a:p>
             <a:fld id="{BD334F44-700B-E44C-96AB-E83A6820DFD3}" type="datetimeFigureOut">
               <a:rPr lang="de-DE" smtClean="0"/>
-              <a:t>04.06.2013</a:t>
+              <a:t>05.06.2013</a:t>
             </a:fld>
             <a:endParaRPr lang="de-DE"/>
           </a:p>
@@ -6079,7 +6079,7 @@
           <a:p>
             <a:fld id="{BD334F44-700B-E44C-96AB-E83A6820DFD3}" type="datetimeFigureOut">
               <a:rPr lang="de-DE" smtClean="0"/>
-              <a:t>04.06.2013</a:t>
+              <a:t>05.06.2013</a:t>
             </a:fld>
             <a:endParaRPr lang="de-DE"/>
           </a:p>
@@ -6367,7 +6367,7 @@
           <a:p>
             <a:fld id="{BD334F44-700B-E44C-96AB-E83A6820DFD3}" type="datetimeFigureOut">
               <a:rPr lang="de-DE" smtClean="0"/>
-              <a:t>04.06.2013</a:t>
+              <a:t>05.06.2013</a:t>
             </a:fld>
             <a:endParaRPr lang="de-DE"/>
           </a:p>
@@ -6789,7 +6789,7 @@
           <a:p>
             <a:fld id="{BD334F44-700B-E44C-96AB-E83A6820DFD3}" type="datetimeFigureOut">
               <a:rPr lang="de-DE" smtClean="0"/>
-              <a:t>04.06.2013</a:t>
+              <a:t>05.06.2013</a:t>
             </a:fld>
             <a:endParaRPr lang="de-DE"/>
           </a:p>
@@ -6907,7 +6907,7 @@
           <a:p>
             <a:fld id="{BD334F44-700B-E44C-96AB-E83A6820DFD3}" type="datetimeFigureOut">
               <a:rPr lang="de-DE" smtClean="0"/>
-              <a:t>04.06.2013</a:t>
+              <a:t>05.06.2013</a:t>
             </a:fld>
             <a:endParaRPr lang="de-DE"/>
           </a:p>
@@ -7002,7 +7002,7 @@
           <a:p>
             <a:fld id="{BD334F44-700B-E44C-96AB-E83A6820DFD3}" type="datetimeFigureOut">
               <a:rPr lang="de-DE" smtClean="0"/>
-              <a:t>04.06.2013</a:t>
+              <a:t>05.06.2013</a:t>
             </a:fld>
             <a:endParaRPr lang="de-DE"/>
           </a:p>
@@ -7325,7 +7325,7 @@
           <a:p>
             <a:fld id="{BD334F44-700B-E44C-96AB-E83A6820DFD3}" type="datetimeFigureOut">
               <a:rPr lang="de-DE" smtClean="0"/>
-              <a:t>04.06.2013</a:t>
+              <a:t>05.06.2013</a:t>
             </a:fld>
             <a:endParaRPr lang="de-DE"/>
           </a:p>
@@ -7578,7 +7578,7 @@
           <a:p>
             <a:fld id="{BD334F44-700B-E44C-96AB-E83A6820DFD3}" type="datetimeFigureOut">
               <a:rPr lang="de-DE" smtClean="0"/>
-              <a:t>04.06.2013</a:t>
+              <a:t>05.06.2013</a:t>
             </a:fld>
             <a:endParaRPr lang="de-DE"/>
           </a:p>
@@ -7791,7 +7791,7 @@
           <a:p>
             <a:fld id="{BD334F44-700B-E44C-96AB-E83A6820DFD3}" type="datetimeFigureOut">
               <a:rPr lang="de-DE" smtClean="0"/>
-              <a:t>04.06.2013</a:t>
+              <a:t>05.06.2013</a:t>
             </a:fld>
             <a:endParaRPr lang="de-DE"/>
           </a:p>
@@ -10780,7 +10780,7 @@
             <a:pPr marL="0" indent="0">
               <a:buNone/>
             </a:pPr>
-            <a:endParaRPr lang="en-US" sz="2800" dirty="0" smtClean="0">
+            <a:endParaRPr lang="en-US" sz="2400" dirty="0" smtClean="0">
               <a:latin typeface="Ubuntu Mono" pitchFamily="49" charset="0"/>
               <a:cs typeface="Courier New" pitchFamily="49" charset="0"/>
             </a:endParaRPr>
@@ -10790,7 +10790,7 @@
               <a:buNone/>
             </a:pPr>
             <a:r>
-              <a:rPr lang="en-US" sz="2800" dirty="0" smtClean="0">
+              <a:rPr lang="en-US" sz="2400" dirty="0" smtClean="0">
                 <a:latin typeface="Ubuntu Mono" pitchFamily="49" charset="0"/>
                 <a:cs typeface="Courier New" pitchFamily="49" charset="0"/>
               </a:rPr>
@@ -10802,35 +10802,35 @@
               <a:buNone/>
             </a:pPr>
             <a:r>
-              <a:rPr lang="en-US" sz="2800" dirty="0" smtClean="0">
+              <a:rPr lang="en-US" sz="2400" dirty="0" smtClean="0">
                 <a:latin typeface="Ubuntu Mono" pitchFamily="49" charset="0"/>
                 <a:cs typeface="Courier New" pitchFamily="49" charset="0"/>
               </a:rPr>
               <a:t>	</a:t>
             </a:r>
             <a:r>
-              <a:rPr lang="en-US" sz="2800" dirty="0" err="1" smtClean="0">
+              <a:rPr lang="en-US" sz="2400" dirty="0" err="1" smtClean="0">
                 <a:latin typeface="Ubuntu Mono" pitchFamily="49" charset="0"/>
                 <a:cs typeface="Courier New" pitchFamily="49" charset="0"/>
               </a:rPr>
               <a:t>line.split</a:t>
             </a:r>
             <a:r>
-              <a:rPr lang="en-US" sz="2800" dirty="0" smtClean="0">
+              <a:rPr lang="en-US" sz="2400" dirty="0" smtClean="0">
                 <a:latin typeface="Ubuntu Mono" pitchFamily="49" charset="0"/>
                 <a:cs typeface="Courier New" pitchFamily="49" charset="0"/>
               </a:rPr>
               <a:t>(“ ”).</a:t>
             </a:r>
             <a:r>
-              <a:rPr lang="en-US" sz="2800" dirty="0" err="1" smtClean="0">
+              <a:rPr lang="en-US" sz="2400" dirty="0" err="1" smtClean="0">
                 <a:latin typeface="Ubuntu Mono" pitchFamily="49" charset="0"/>
                 <a:cs typeface="Courier New" pitchFamily="49" charset="0"/>
               </a:rPr>
               <a:t>forEach</a:t>
             </a:r>
             <a:r>
-              <a:rPr lang="en-US" sz="2800" dirty="0" smtClean="0">
+              <a:rPr lang="en-US" sz="2400" dirty="0" smtClean="0">
                 <a:latin typeface="Ubuntu Mono" pitchFamily="49" charset="0"/>
                 <a:cs typeface="Courier New" pitchFamily="49" charset="0"/>
               </a:rPr>
@@ -10842,28 +10842,28 @@
               <a:buNone/>
             </a:pPr>
             <a:r>
-              <a:rPr lang="en-US" sz="2800" dirty="0">
+              <a:rPr lang="en-US" sz="2400" dirty="0">
                 <a:latin typeface="Ubuntu Mono" pitchFamily="49" charset="0"/>
                 <a:cs typeface="Courier New" pitchFamily="49" charset="0"/>
               </a:rPr>
               <a:t>	</a:t>
             </a:r>
             <a:r>
-              <a:rPr lang="en-US" sz="2800" dirty="0" smtClean="0">
+              <a:rPr lang="en-US" sz="2400" dirty="0" smtClean="0">
                 <a:latin typeface="Ubuntu Mono" pitchFamily="49" charset="0"/>
                 <a:cs typeface="Courier New" pitchFamily="49" charset="0"/>
               </a:rPr>
               <a:t>	emit(word, </a:t>
             </a:r>
             <a:r>
-              <a:rPr lang="en-US" sz="2800" dirty="0">
+              <a:rPr lang="en-US" sz="2400" dirty="0">
                 <a:latin typeface="Ubuntu Mono" pitchFamily="49" charset="0"/>
                 <a:cs typeface="Courier New" pitchFamily="49" charset="0"/>
               </a:rPr>
               <a:t>1</a:t>
             </a:r>
             <a:r>
-              <a:rPr lang="en-US" sz="2800" dirty="0" smtClean="0">
+              <a:rPr lang="en-US" sz="2400" dirty="0" smtClean="0">
                 <a:latin typeface="Ubuntu Mono" pitchFamily="49" charset="0"/>
                 <a:cs typeface="Courier New" pitchFamily="49" charset="0"/>
               </a:rPr>
@@ -10875,13 +10875,13 @@
               <a:buNone/>
             </a:pPr>
             <a:r>
-              <a:rPr lang="en-US" sz="2800" dirty="0" smtClean="0">
+              <a:rPr lang="en-US" sz="2400" dirty="0" smtClean="0">
                 <a:latin typeface="Ubuntu Mono" pitchFamily="49" charset="0"/>
                 <a:cs typeface="Courier New" pitchFamily="49" charset="0"/>
               </a:rPr>
               <a:t>	});</a:t>
             </a:r>
-            <a:endParaRPr lang="en-US" sz="2800" dirty="0">
+            <a:endParaRPr lang="en-US" sz="2400" dirty="0">
               <a:latin typeface="Ubuntu Mono" pitchFamily="49" charset="0"/>
               <a:cs typeface="Courier New" pitchFamily="49" charset="0"/>
             </a:endParaRPr>
@@ -10891,13 +10891,13 @@
               <a:buNone/>
             </a:pPr>
             <a:r>
-              <a:rPr lang="en-US" sz="2800" dirty="0" smtClean="0">
+              <a:rPr lang="en-US" sz="2400" dirty="0" smtClean="0">
                 <a:latin typeface="Ubuntu Mono" pitchFamily="49" charset="0"/>
                 <a:cs typeface="Courier New" pitchFamily="49" charset="0"/>
               </a:rPr>
               <a:t>}</a:t>
             </a:r>
-            <a:endParaRPr lang="de-AT" sz="2800" dirty="0">
+            <a:endParaRPr lang="de-AT" sz="2400" dirty="0">
               <a:latin typeface="Ubuntu Mono" pitchFamily="49" charset="0"/>
               <a:cs typeface="Courier New" pitchFamily="49" charset="0"/>
             </a:endParaRPr>
@@ -11803,7 +11803,7 @@
         <p:spPr>
           <a:xfrm>
             <a:off x="7211529" y="5315006"/>
-            <a:ext cx="1047600" cy="646331"/>
+            <a:ext cx="1047600" cy="584775"/>
           </a:xfrm>
           <a:prstGeom prst="rect">
             <a:avLst/>
@@ -11823,7 +11823,7 @@
           <a:p>
             <a:pPr algn="ctr"/>
             <a:r>
-              <a:rPr lang="en-US" dirty="0" smtClean="0">
+              <a:rPr lang="en-US" sz="1600" dirty="0" smtClean="0">
                 <a:latin typeface="Ubuntu Mono" pitchFamily="49" charset="0"/>
               </a:rPr>
               <a:t>grandma</a:t>
@@ -11832,12 +11832,12 @@
           <a:p>
             <a:pPr algn="ctr"/>
             <a:r>
-              <a:rPr lang="en-US" dirty="0" smtClean="0">
+              <a:rPr lang="en-US" sz="1600" dirty="0" smtClean="0">
                 <a:latin typeface="Ubuntu Mono" pitchFamily="49" charset="0"/>
               </a:rPr>
               <a:t>1</a:t>
             </a:r>
-            <a:endParaRPr lang="de-AT" dirty="0">
+            <a:endParaRPr lang="de-AT" sz="1600" dirty="0">
               <a:latin typeface="Ubuntu Mono" pitchFamily="49" charset="0"/>
             </a:endParaRPr>
           </a:p>
@@ -15639,7 +15639,7 @@
         <p:spPr>
           <a:xfrm>
             <a:off x="5263978" y="2394706"/>
-            <a:ext cx="3253945" cy="1323439"/>
+            <a:ext cx="3253945" cy="1169551"/>
           </a:xfrm>
           <a:prstGeom prst="rect">
             <a:avLst/>
@@ -15653,7 +15653,7 @@
           <a:lstStyle/>
           <a:p>
             <a:r>
-              <a:rPr lang="en-US" sz="1600" dirty="0" smtClean="0">
+              <a:rPr lang="en-US" sz="1400" dirty="0" smtClean="0">
                 <a:latin typeface="Ubuntu Mono" pitchFamily="49" charset="0"/>
               </a:rPr>
               <a:t>{</a:t>
@@ -15661,13 +15661,13 @@
           </a:p>
           <a:p>
             <a:r>
-              <a:rPr lang="en-US" sz="1600" dirty="0">
+              <a:rPr lang="en-US" sz="1400" dirty="0">
                 <a:latin typeface="Ubuntu Mono" pitchFamily="49" charset="0"/>
               </a:rPr>
               <a:t>	</a:t>
             </a:r>
             <a:r>
-              <a:rPr lang="en-US" sz="1600" dirty="0" smtClean="0">
+              <a:rPr lang="en-US" sz="1400" dirty="0" smtClean="0">
                 <a:latin typeface="Ubuntu Mono" pitchFamily="49" charset="0"/>
               </a:rPr>
               <a:t>_id:	1,</a:t>
@@ -15675,13 +15675,13 @@
           </a:p>
           <a:p>
             <a:r>
-              <a:rPr lang="en-US" sz="1600" dirty="0">
+              <a:rPr lang="en-US" sz="1400" dirty="0">
                 <a:latin typeface="Ubuntu Mono" pitchFamily="49" charset="0"/>
               </a:rPr>
               <a:t>	</a:t>
             </a:r>
             <a:r>
-              <a:rPr lang="en-US" sz="1600" dirty="0" smtClean="0">
+              <a:rPr lang="en-US" sz="1400" dirty="0" smtClean="0">
                 <a:latin typeface="Ubuntu Mono" pitchFamily="49" charset="0"/>
               </a:rPr>
               <a:t>name:	“Chuck Norris”,</a:t>
@@ -15689,19 +15689,19 @@
           </a:p>
           <a:p>
             <a:r>
-              <a:rPr lang="en-US" sz="1600" dirty="0">
+              <a:rPr lang="en-US" sz="1400" dirty="0">
                 <a:latin typeface="Ubuntu Mono" pitchFamily="49" charset="0"/>
               </a:rPr>
               <a:t>	</a:t>
             </a:r>
             <a:r>
-              <a:rPr lang="en-US" sz="1600" dirty="0" err="1" smtClean="0">
+              <a:rPr lang="en-US" sz="1400" dirty="0" err="1" smtClean="0">
                 <a:latin typeface="Ubuntu Mono" pitchFamily="49" charset="0"/>
               </a:rPr>
               <a:t>tel</a:t>
             </a:r>
             <a:r>
-              <a:rPr lang="en-US" sz="1600" dirty="0" smtClean="0">
+              <a:rPr lang="en-US" sz="1400" dirty="0" smtClean="0">
                 <a:latin typeface="Ubuntu Mono" pitchFamily="49" charset="0"/>
               </a:rPr>
               <a:t>:	01234</a:t>
@@ -15709,12 +15709,12 @@
           </a:p>
           <a:p>
             <a:r>
-              <a:rPr lang="en-US" sz="1600" dirty="0">
+              <a:rPr lang="en-US" sz="1400" dirty="0">
                 <a:latin typeface="Ubuntu Mono" pitchFamily="49" charset="0"/>
               </a:rPr>
               <a:t>}</a:t>
             </a:r>
-            <a:endParaRPr lang="de-AT" sz="1600" dirty="0">
+            <a:endParaRPr lang="de-AT" sz="1400" dirty="0">
               <a:latin typeface="Ubuntu Mono" pitchFamily="49" charset="0"/>
             </a:endParaRPr>
           </a:p>

</xml_diff>